<commit_message>
added more to case tudy svm slides
</commit_message>
<xml_diff>
--- a/Slides_Notes/TextTutorial_Slides.pptx
+++ b/Slides_Notes/TextTutorial_Slides.pptx
@@ -21,7 +21,7 @@
     <p:sldId id="269" r:id="rId15"/>
     <p:sldId id="270" r:id="rId16"/>
     <p:sldId id="271" r:id="rId17"/>
-    <p:sldId id="273" r:id="rId18"/>
+    <p:sldId id="274" r:id="rId18"/>
     <p:sldId id="272" r:id="rId19"/>
   </p:sldIdLst>
   <p:sldSz cx="12192000" cy="6858000"/>
@@ -121,6 +121,11 @@
       </a:defRPr>
     </a:lvl9pPr>
   </p:defaultTextStyle>
+  <p:extLst>
+    <p:ext uri="{EFAFB233-063F-42B5-8137-9DF3F51BA10A}">
+      <p15:sldGuideLst xmlns:p15="http://schemas.microsoft.com/office/powerpoint/2012/main"/>
+    </p:ext>
+  </p:extLst>
 </p:presentation>
 </file>
 
@@ -869,7 +874,7 @@
           <a:p>
             <a:fld id="{53DDECB8-4058-4570-8002-7526A1C799DD}" type="datetimeFigureOut">
               <a:rPr lang="en-GB" smtClean="0"/>
-              <a:t>15/03/2021</a:t>
+              <a:t>16/03/2021</a:t>
             </a:fld>
             <a:endParaRPr lang="en-GB"/>
           </a:p>
@@ -1120,7 +1125,7 @@
           <a:p>
             <a:fld id="{53DDECB8-4058-4570-8002-7526A1C799DD}" type="datetimeFigureOut">
               <a:rPr lang="en-GB" smtClean="0"/>
-              <a:t>15/03/2021</a:t>
+              <a:t>16/03/2021</a:t>
             </a:fld>
             <a:endParaRPr lang="en-GB"/>
           </a:p>
@@ -1434,7 +1439,7 @@
           <a:p>
             <a:fld id="{53DDECB8-4058-4570-8002-7526A1C799DD}" type="datetimeFigureOut">
               <a:rPr lang="en-GB" smtClean="0"/>
-              <a:t>15/03/2021</a:t>
+              <a:t>16/03/2021</a:t>
             </a:fld>
             <a:endParaRPr lang="en-GB"/>
           </a:p>
@@ -1767,7 +1772,7 @@
           <a:p>
             <a:fld id="{53DDECB8-4058-4570-8002-7526A1C799DD}" type="datetimeFigureOut">
               <a:rPr lang="en-GB" smtClean="0"/>
-              <a:t>15/03/2021</a:t>
+              <a:t>16/03/2021</a:t>
             </a:fld>
             <a:endParaRPr lang="en-GB"/>
           </a:p>
@@ -2081,7 +2086,7 @@
           <a:p>
             <a:fld id="{53DDECB8-4058-4570-8002-7526A1C799DD}" type="datetimeFigureOut">
               <a:rPr lang="en-GB" smtClean="0"/>
-              <a:t>15/03/2021</a:t>
+              <a:t>16/03/2021</a:t>
             </a:fld>
             <a:endParaRPr lang="en-GB"/>
           </a:p>
@@ -2474,7 +2479,7 @@
           <a:p>
             <a:fld id="{53DDECB8-4058-4570-8002-7526A1C799DD}" type="datetimeFigureOut">
               <a:rPr lang="en-GB" smtClean="0"/>
-              <a:t>15/03/2021</a:t>
+              <a:t>16/03/2021</a:t>
             </a:fld>
             <a:endParaRPr lang="en-GB"/>
           </a:p>
@@ -2644,7 +2649,7 @@
           <a:p>
             <a:fld id="{53DDECB8-4058-4570-8002-7526A1C799DD}" type="datetimeFigureOut">
               <a:rPr lang="en-GB" smtClean="0"/>
-              <a:t>15/03/2021</a:t>
+              <a:t>16/03/2021</a:t>
             </a:fld>
             <a:endParaRPr lang="en-GB"/>
           </a:p>
@@ -2824,7 +2829,7 @@
           <a:p>
             <a:fld id="{53DDECB8-4058-4570-8002-7526A1C799DD}" type="datetimeFigureOut">
               <a:rPr lang="en-GB" smtClean="0"/>
-              <a:t>15/03/2021</a:t>
+              <a:t>16/03/2021</a:t>
             </a:fld>
             <a:endParaRPr lang="en-GB"/>
           </a:p>
@@ -2994,7 +2999,7 @@
           <a:p>
             <a:fld id="{53DDECB8-4058-4570-8002-7526A1C799DD}" type="datetimeFigureOut">
               <a:rPr lang="en-GB" smtClean="0"/>
-              <a:t>15/03/2021</a:t>
+              <a:t>16/03/2021</a:t>
             </a:fld>
             <a:endParaRPr lang="en-GB"/>
           </a:p>
@@ -3241,7 +3246,7 @@
           <a:p>
             <a:fld id="{53DDECB8-4058-4570-8002-7526A1C799DD}" type="datetimeFigureOut">
               <a:rPr lang="en-GB" smtClean="0"/>
-              <a:t>15/03/2021</a:t>
+              <a:t>16/03/2021</a:t>
             </a:fld>
             <a:endParaRPr lang="en-GB"/>
           </a:p>
@@ -3473,7 +3478,7 @@
           <a:p>
             <a:fld id="{53DDECB8-4058-4570-8002-7526A1C799DD}" type="datetimeFigureOut">
               <a:rPr lang="en-GB" smtClean="0"/>
-              <a:t>15/03/2021</a:t>
+              <a:t>16/03/2021</a:t>
             </a:fld>
             <a:endParaRPr lang="en-GB"/>
           </a:p>
@@ -3847,7 +3852,7 @@
           <a:p>
             <a:fld id="{53DDECB8-4058-4570-8002-7526A1C799DD}" type="datetimeFigureOut">
               <a:rPr lang="en-GB" smtClean="0"/>
-              <a:t>15/03/2021</a:t>
+              <a:t>16/03/2021</a:t>
             </a:fld>
             <a:endParaRPr lang="en-GB"/>
           </a:p>
@@ -3970,7 +3975,7 @@
           <a:p>
             <a:fld id="{53DDECB8-4058-4570-8002-7526A1C799DD}" type="datetimeFigureOut">
               <a:rPr lang="en-GB" smtClean="0"/>
-              <a:t>15/03/2021</a:t>
+              <a:t>16/03/2021</a:t>
             </a:fld>
             <a:endParaRPr lang="en-GB"/>
           </a:p>
@@ -4065,7 +4070,7 @@
           <a:p>
             <a:fld id="{53DDECB8-4058-4570-8002-7526A1C799DD}" type="datetimeFigureOut">
               <a:rPr lang="en-GB" smtClean="0"/>
-              <a:t>15/03/2021</a:t>
+              <a:t>16/03/2021</a:t>
             </a:fld>
             <a:endParaRPr lang="en-GB"/>
           </a:p>
@@ -4320,7 +4325,7 @@
           <a:p>
             <a:fld id="{53DDECB8-4058-4570-8002-7526A1C799DD}" type="datetimeFigureOut">
               <a:rPr lang="en-GB" smtClean="0"/>
-              <a:t>15/03/2021</a:t>
+              <a:t>16/03/2021</a:t>
             </a:fld>
             <a:endParaRPr lang="en-GB"/>
           </a:p>
@@ -4625,7 +4630,7 @@
           <a:p>
             <a:fld id="{53DDECB8-4058-4570-8002-7526A1C799DD}" type="datetimeFigureOut">
               <a:rPr lang="en-GB" smtClean="0"/>
-              <a:t>15/03/2021</a:t>
+              <a:t>16/03/2021</a:t>
             </a:fld>
             <a:endParaRPr lang="en-GB"/>
           </a:p>
@@ -5327,7 +5332,7 @@
           <a:p>
             <a:fld id="{53DDECB8-4058-4570-8002-7526A1C799DD}" type="datetimeFigureOut">
               <a:rPr lang="en-GB" smtClean="0"/>
-              <a:t>15/03/2021</a:t>
+              <a:t>16/03/2021</a:t>
             </a:fld>
             <a:endParaRPr lang="en-GB"/>
           </a:p>
@@ -5912,8 +5917,8 @@
         </p:nvSpPr>
         <p:spPr>
           <a:xfrm>
-            <a:off x="226661" y="1857605"/>
-            <a:ext cx="9218997" cy="3723063"/>
+            <a:off x="857839" y="1857605"/>
+            <a:ext cx="8587819" cy="3723063"/>
           </a:xfrm>
         </p:spPr>
         <p:txBody>
@@ -5922,12 +5927,24 @@
           </a:bodyPr>
           <a:lstStyle/>
           <a:p>
-            <a:pPr marL="800100" lvl="1" indent="-342900" algn="l">
+            <a:pPr marL="342900" marR="0" lvl="0" indent="-342900" algn="l" defTabSz="457200" rtl="0" eaLnBrk="1" fontAlgn="auto" latinLnBrk="0" hangingPunct="1">
               <a:lnSpc>
-                <a:spcPct val="107000"/>
+                <a:spcPct val="100000"/>
               </a:lnSpc>
-              <a:buFont typeface="Arial" panose="020B0604020202020204" pitchFamily="34" charset="0"/>
-              <a:buChar char="•"/>
+              <a:spcBef>
+                <a:spcPts val="1000"/>
+              </a:spcBef>
+              <a:spcAft>
+                <a:spcPts val="0"/>
+              </a:spcAft>
+              <a:buClr>
+                <a:srgbClr val="5FCBEF"/>
+              </a:buClr>
+              <a:buSzPct val="80000"/>
+              <a:buFont typeface="Wingdings 3" charset="2"/>
+              <a:buChar char=""/>
+              <a:tabLst/>
+              <a:defRPr/>
             </a:pPr>
             <a:r>
               <a:rPr lang="en-GB" sz="2400" dirty="0">
@@ -5939,16 +5956,61 @@
                 <a:ea typeface="Calibri" panose="020F0502020204030204" pitchFamily="34" charset="0"/>
                 <a:cs typeface="Calibri" panose="020F0502020204030204" pitchFamily="34" charset="0"/>
               </a:rPr>
-              <a:t>The process of deriving high-quality information from text. It involves the discovery by computer of new, previously unknown information, by automatically extracting information from different written resources (Wikipedia).</a:t>
-            </a:r>
-          </a:p>
-          <a:p>
-            <a:pPr marL="800100" lvl="1" indent="-342900" algn="l">
+              <a:t>Process of deriving high-quality information from text. </a:t>
+            </a:r>
+          </a:p>
+          <a:p>
+            <a:pPr marL="342900" marR="0" lvl="0" indent="-342900" algn="l" defTabSz="457200" rtl="0" eaLnBrk="1" fontAlgn="auto" latinLnBrk="0" hangingPunct="1">
               <a:lnSpc>
-                <a:spcPct val="107000"/>
+                <a:spcPct val="100000"/>
               </a:lnSpc>
-              <a:buFont typeface="Arial" panose="020B0604020202020204" pitchFamily="34" charset="0"/>
-              <a:buChar char="•"/>
+              <a:spcBef>
+                <a:spcPts val="1000"/>
+              </a:spcBef>
+              <a:spcAft>
+                <a:spcPts val="0"/>
+              </a:spcAft>
+              <a:buClr>
+                <a:srgbClr val="5FCBEF"/>
+              </a:buClr>
+              <a:buSzPct val="80000"/>
+              <a:buFont typeface="Wingdings 3" charset="2"/>
+              <a:buChar char=""/>
+              <a:tabLst/>
+              <a:defRPr/>
+            </a:pPr>
+            <a:r>
+              <a:rPr lang="en-GB" sz="2400" dirty="0">
+                <a:solidFill>
+                  <a:srgbClr val="333333"/>
+                </a:solidFill>
+                <a:effectLst/>
+                <a:latin typeface="+mj-lt"/>
+                <a:ea typeface="Calibri" panose="020F0502020204030204" pitchFamily="34" charset="0"/>
+                <a:cs typeface="Calibri" panose="020F0502020204030204" pitchFamily="34" charset="0"/>
+              </a:rPr>
+              <a:t>Involves the discovery by computer of new, previously unknown information, by automatically extracting information from different written resources (Wikipedia).</a:t>
+            </a:r>
+          </a:p>
+          <a:p>
+            <a:pPr marL="342900" marR="0" lvl="0" indent="-342900" algn="l" defTabSz="457200" rtl="0" eaLnBrk="1" fontAlgn="auto" latinLnBrk="0" hangingPunct="1">
+              <a:lnSpc>
+                <a:spcPct val="100000"/>
+              </a:lnSpc>
+              <a:spcBef>
+                <a:spcPts val="1000"/>
+              </a:spcBef>
+              <a:spcAft>
+                <a:spcPts val="0"/>
+              </a:spcAft>
+              <a:buClr>
+                <a:srgbClr val="5FCBEF"/>
+              </a:buClr>
+              <a:buSzPct val="80000"/>
+              <a:buFont typeface="Wingdings 3" charset="2"/>
+              <a:buChar char=""/>
+              <a:tabLst/>
+              <a:defRPr/>
             </a:pPr>
             <a:r>
               <a:rPr lang="en-GB" sz="2400" dirty="0">
@@ -5965,14 +6027,26 @@
           </a:p>
           <a:p>
             <a:pPr marL="800100" lvl="1" indent="-342900" algn="l">
-              <a:lnSpc>
-                <a:spcPct val="107000"/>
-              </a:lnSpc>
-              <a:buFont typeface="Arial" panose="020B0604020202020204" pitchFamily="34" charset="0"/>
-              <a:buChar char="•"/>
+              <a:buClr>
+                <a:srgbClr val="5FCBEF"/>
+              </a:buClr>
+              <a:buFont typeface="Wingdings 3" charset="2"/>
+              <a:buChar char=""/>
+              <a:defRPr/>
             </a:pPr>
             <a:r>
-              <a:rPr lang="en-GB" sz="2400" dirty="0">
+              <a:rPr lang="en-GB" sz="2000" dirty="0">
+                <a:solidFill>
+                  <a:srgbClr val="333333"/>
+                </a:solidFill>
+                <a:latin typeface="+mj-lt"/>
+                <a:ea typeface="Calibri" panose="020F0502020204030204" pitchFamily="34" charset="0"/>
+                <a:cs typeface="Calibri" panose="020F0502020204030204" pitchFamily="34" charset="0"/>
+              </a:rPr>
+              <a:t>q</a:t>
+            </a:r>
+            <a:r>
+              <a:rPr lang="en-GB" sz="2000" dirty="0">
                 <a:solidFill>
                   <a:srgbClr val="333333"/>
                 </a:solidFill>
@@ -5981,9 +6055,9 @@
                 <a:ea typeface="Calibri" panose="020F0502020204030204" pitchFamily="34" charset="0"/>
                 <a:cs typeface="Calibri" panose="020F0502020204030204" pitchFamily="34" charset="0"/>
               </a:rPr>
-              <a:t>Qualitative and quantitative aspects of large collections of texts</a:t>
-            </a:r>
-            <a:endParaRPr lang="en-GB" sz="1400" dirty="0">
+              <a:t>ualitative and quantitative</a:t>
+            </a:r>
+            <a:endParaRPr lang="en-GB" sz="1000" dirty="0">
               <a:latin typeface="+mj-lt"/>
             </a:endParaRPr>
           </a:p>
@@ -6171,6 +6245,230 @@
           <a:chExt cx="0" cy="0"/>
         </a:xfrm>
       </p:grpSpPr>
+      <p:grpSp>
+        <p:nvGrpSpPr>
+          <p:cNvPr id="9" name="Group 8">
+            <a:extLst>
+              <a:ext uri="{FF2B5EF4-FFF2-40B4-BE49-F238E27FC236}">
+                <a16:creationId xmlns:a16="http://schemas.microsoft.com/office/drawing/2014/main" id="{95AA896F-F172-496E-AE69-715686638820}"/>
+              </a:ext>
+            </a:extLst>
+          </p:cNvPr>
+          <p:cNvGrpSpPr/>
+          <p:nvPr/>
+        </p:nvGrpSpPr>
+        <p:grpSpPr>
+          <a:xfrm>
+            <a:off x="8473440" y="3555311"/>
+            <a:ext cx="3549649" cy="3062342"/>
+            <a:chOff x="8473440" y="3555311"/>
+            <a:chExt cx="3549649" cy="3062342"/>
+          </a:xfrm>
+        </p:grpSpPr>
+        <p:grpSp>
+          <p:nvGrpSpPr>
+            <p:cNvPr id="4" name="Group 3">
+              <a:extLst>
+                <a:ext uri="{FF2B5EF4-FFF2-40B4-BE49-F238E27FC236}">
+                  <a16:creationId xmlns:a16="http://schemas.microsoft.com/office/drawing/2014/main" id="{CD95FD17-2ECC-43E2-8F30-F7BF50008BC7}"/>
+                </a:ext>
+              </a:extLst>
+            </p:cNvPr>
+            <p:cNvGrpSpPr/>
+            <p:nvPr/>
+          </p:nvGrpSpPr>
+          <p:grpSpPr>
+            <a:xfrm>
+              <a:off x="8473440" y="3555311"/>
+              <a:ext cx="3549649" cy="3062342"/>
+              <a:chOff x="8473440" y="3555311"/>
+              <a:chExt cx="3549649" cy="3062342"/>
+            </a:xfrm>
+          </p:grpSpPr>
+          <p:pic>
+            <p:nvPicPr>
+              <p:cNvPr id="5" name="Picture 4">
+                <a:extLst>
+                  <a:ext uri="{FF2B5EF4-FFF2-40B4-BE49-F238E27FC236}">
+                    <a16:creationId xmlns:a16="http://schemas.microsoft.com/office/drawing/2014/main" id="{E01F43EC-B993-466F-959E-4BCEF009168C}"/>
+                  </a:ext>
+                </a:extLst>
+              </p:cNvPr>
+              <p:cNvPicPr>
+                <a:picLocks noChangeAspect="1"/>
+              </p:cNvPicPr>
+              <p:nvPr/>
+            </p:nvPicPr>
+            <p:blipFill>
+              <a:blip r:embed="rId2"/>
+              <a:stretch>
+                <a:fillRect/>
+              </a:stretch>
+            </p:blipFill>
+            <p:spPr>
+              <a:xfrm>
+                <a:off x="8473440" y="3555311"/>
+                <a:ext cx="3549649" cy="3062342"/>
+              </a:xfrm>
+              <a:prstGeom prst="rect">
+                <a:avLst/>
+              </a:prstGeom>
+            </p:spPr>
+          </p:pic>
+          <p:sp>
+            <p:nvSpPr>
+              <p:cNvPr id="6" name="Rectangle 5">
+                <a:extLst>
+                  <a:ext uri="{FF2B5EF4-FFF2-40B4-BE49-F238E27FC236}">
+                    <a16:creationId xmlns:a16="http://schemas.microsoft.com/office/drawing/2014/main" id="{F5398E39-2C56-450A-9472-8736E43DF59E}"/>
+                  </a:ext>
+                </a:extLst>
+              </p:cNvPr>
+              <p:cNvSpPr/>
+              <p:nvPr/>
+            </p:nvSpPr>
+            <p:spPr>
+              <a:xfrm>
+                <a:off x="8473440" y="4876800"/>
+                <a:ext cx="1473200" cy="1239520"/>
+              </a:xfrm>
+              <a:prstGeom prst="rect">
+                <a:avLst/>
+              </a:prstGeom>
+              <a:solidFill>
+                <a:schemeClr val="bg1"/>
+              </a:solidFill>
+              <a:ln>
+                <a:noFill/>
+              </a:ln>
+            </p:spPr>
+            <p:style>
+              <a:lnRef idx="2">
+                <a:schemeClr val="accent1">
+                  <a:shade val="50000"/>
+                </a:schemeClr>
+              </a:lnRef>
+              <a:fillRef idx="1">
+                <a:schemeClr val="accent1"/>
+              </a:fillRef>
+              <a:effectRef idx="0">
+                <a:schemeClr val="accent1"/>
+              </a:effectRef>
+              <a:fontRef idx="minor">
+                <a:schemeClr val="lt1"/>
+              </a:fontRef>
+            </p:style>
+            <p:txBody>
+              <a:bodyPr rtlCol="0" anchor="ctr"/>
+              <a:lstStyle/>
+              <a:p>
+                <a:pPr algn="ctr"/>
+                <a:endParaRPr lang="en-GB"/>
+              </a:p>
+            </p:txBody>
+          </p:sp>
+          <p:sp>
+            <p:nvSpPr>
+              <p:cNvPr id="7" name="Rectangle 6">
+                <a:extLst>
+                  <a:ext uri="{FF2B5EF4-FFF2-40B4-BE49-F238E27FC236}">
+                    <a16:creationId xmlns:a16="http://schemas.microsoft.com/office/drawing/2014/main" id="{A103363D-AF07-45D5-BC1B-78621EB891BC}"/>
+                  </a:ext>
+                </a:extLst>
+              </p:cNvPr>
+              <p:cNvSpPr/>
+              <p:nvPr/>
+            </p:nvSpPr>
+            <p:spPr>
+              <a:xfrm>
+                <a:off x="9743440" y="5476240"/>
+                <a:ext cx="721360" cy="565122"/>
+              </a:xfrm>
+              <a:prstGeom prst="rect">
+                <a:avLst/>
+              </a:prstGeom>
+              <a:solidFill>
+                <a:schemeClr val="bg1"/>
+              </a:solidFill>
+              <a:ln>
+                <a:noFill/>
+              </a:ln>
+            </p:spPr>
+            <p:style>
+              <a:lnRef idx="2">
+                <a:schemeClr val="accent1">
+                  <a:shade val="50000"/>
+                </a:schemeClr>
+              </a:lnRef>
+              <a:fillRef idx="1">
+                <a:schemeClr val="accent1"/>
+              </a:fillRef>
+              <a:effectRef idx="0">
+                <a:schemeClr val="accent1"/>
+              </a:effectRef>
+              <a:fontRef idx="minor">
+                <a:schemeClr val="lt1"/>
+              </a:fontRef>
+            </p:style>
+            <p:txBody>
+              <a:bodyPr rtlCol="0" anchor="ctr"/>
+              <a:lstStyle/>
+              <a:p>
+                <a:pPr algn="ctr"/>
+                <a:endParaRPr lang="en-GB"/>
+              </a:p>
+            </p:txBody>
+          </p:sp>
+        </p:grpSp>
+        <p:sp>
+          <p:nvSpPr>
+            <p:cNvPr id="8" name="Oval 7">
+              <a:extLst>
+                <a:ext uri="{FF2B5EF4-FFF2-40B4-BE49-F238E27FC236}">
+                  <a16:creationId xmlns:a16="http://schemas.microsoft.com/office/drawing/2014/main" id="{63E841F0-41A8-47EE-B16B-EACA62BF67CF}"/>
+                </a:ext>
+              </a:extLst>
+            </p:cNvPr>
+            <p:cNvSpPr/>
+            <p:nvPr/>
+          </p:nvSpPr>
+          <p:spPr>
+            <a:xfrm>
+              <a:off x="10380518" y="5384960"/>
+              <a:ext cx="1107440" cy="656402"/>
+            </a:xfrm>
+            <a:prstGeom prst="ellipse">
+              <a:avLst/>
+            </a:prstGeom>
+            <a:noFill/>
+            <a:ln w="31750"/>
+          </p:spPr>
+          <p:style>
+            <a:lnRef idx="2">
+              <a:schemeClr val="accent1">
+                <a:shade val="50000"/>
+              </a:schemeClr>
+            </a:lnRef>
+            <a:fillRef idx="1">
+              <a:schemeClr val="accent1"/>
+            </a:fillRef>
+            <a:effectRef idx="0">
+              <a:schemeClr val="accent1"/>
+            </a:effectRef>
+            <a:fontRef idx="minor">
+              <a:schemeClr val="lt1"/>
+            </a:fontRef>
+          </p:style>
+          <p:txBody>
+            <a:bodyPr rtlCol="0" anchor="ctr"/>
+            <a:lstStyle/>
+            <a:p>
+              <a:pPr algn="ctr"/>
+              <a:endParaRPr lang="en-GB"/>
+            </a:p>
+          </p:txBody>
+        </p:sp>
+      </p:grpSp>
       <p:sp>
         <p:nvSpPr>
           <p:cNvPr id="2" name="Title 1">
@@ -6647,14 +6945,14 @@
           <p:nvPr>
             <p:extLst>
               <p:ext uri="{D42A27DB-BD31-4B8C-83A1-F6EECF244321}">
-                <p14:modId xmlns:p14="http://schemas.microsoft.com/office/powerpoint/2010/main" val="1474006176"/>
+                <p14:modId xmlns:p14="http://schemas.microsoft.com/office/powerpoint/2010/main" val="3812337127"/>
               </p:ext>
             </p:extLst>
           </p:nvPr>
         </p:nvGraphicFramePr>
         <p:xfrm>
           <a:off x="5262598" y="2714920"/>
-          <a:ext cx="6553024" cy="3797129"/>
+          <a:ext cx="6756682" cy="3980520"/>
         </p:xfrm>
         <a:graphic>
           <a:graphicData uri="http://schemas.openxmlformats.org/drawingml/2006/table">
@@ -6663,21 +6961,21 @@
                 <a:tableStyleId>{5C22544A-7EE6-4342-B048-85BDC9FD1C3A}</a:tableStyleId>
               </a:tblPr>
               <a:tblGrid>
-                <a:gridCol w="370303">
+                <a:gridCol w="381811">
                   <a:extLst>
                     <a:ext uri="{9D8B030D-6E8A-4147-A177-3AD203B41FA5}">
                       <a16:colId xmlns:a16="http://schemas.microsoft.com/office/drawing/2014/main" val="981867187"/>
                     </a:ext>
                   </a:extLst>
                 </a:gridCol>
-                <a:gridCol w="2858376">
+                <a:gridCol w="2947210">
                   <a:extLst>
                     <a:ext uri="{9D8B030D-6E8A-4147-A177-3AD203B41FA5}">
                       <a16:colId xmlns:a16="http://schemas.microsoft.com/office/drawing/2014/main" val="299875189"/>
                     </a:ext>
                   </a:extLst>
                 </a:gridCol>
-                <a:gridCol w="3324345">
+                <a:gridCol w="3427661">
                   <a:extLst>
                     <a:ext uri="{9D8B030D-6E8A-4147-A177-3AD203B41FA5}">
                       <a16:colId xmlns:a16="http://schemas.microsoft.com/office/drawing/2014/main" val="1745718109"/>
@@ -6685,7 +6983,7 @@
                   </a:extLst>
                 </a:gridCol>
               </a:tblGrid>
-              <a:tr h="573675">
+              <a:tr h="601382">
                 <a:tc>
                   <a:txBody>
                     <a:bodyPr/>
@@ -6769,7 +7067,7 @@
                   </a:ext>
                 </a:extLst>
               </a:tr>
-              <a:tr h="1064319">
+              <a:tr h="1115723">
                 <a:tc>
                   <a:txBody>
                     <a:bodyPr/>
@@ -6863,7 +7161,7 @@
                   </a:ext>
                 </a:extLst>
               </a:tr>
-              <a:tr h="547408">
+              <a:tr h="573846">
                 <a:tc>
                   <a:txBody>
                     <a:bodyPr/>
@@ -6957,7 +7255,7 @@
                   </a:ext>
                 </a:extLst>
               </a:tr>
-              <a:tr h="547408">
+              <a:tr h="573846">
                 <a:tc>
                   <a:txBody>
                     <a:bodyPr/>
@@ -7051,7 +7349,7 @@
                   </a:ext>
                 </a:extLst>
               </a:tr>
-              <a:tr h="1064319">
+              <a:tr h="1115723">
                 <a:tc>
                   <a:txBody>
                     <a:bodyPr/>
@@ -7231,18 +7529,18 @@
         <p:spPr>
           <a:xfrm>
             <a:off x="677334" y="1385740"/>
-            <a:ext cx="8596668" cy="5069769"/>
+            <a:ext cx="8984826" cy="5069769"/>
           </a:xfrm>
         </p:spPr>
         <p:txBody>
           <a:bodyPr>
-            <a:normAutofit/>
+            <a:normAutofit lnSpcReduction="10000"/>
           </a:bodyPr>
           <a:lstStyle/>
           <a:p>
             <a:pPr algn="l"/>
             <a:r>
-              <a:rPr lang="en-GB" sz="2000" b="0" i="0" dirty="0">
+              <a:rPr lang="en-GB" sz="2400" b="0" i="0" dirty="0">
                 <a:solidFill>
                   <a:srgbClr val="51505A"/>
                 </a:solidFill>
@@ -7254,86 +7552,63 @@
           <a:p>
             <a:pPr lvl="1"/>
             <a:r>
-              <a:rPr lang="en-GB" sz="1800" b="0" i="0" dirty="0">
+              <a:rPr lang="en-GB" sz="2000" b="0" i="0" dirty="0">
                 <a:solidFill>
                   <a:srgbClr val="51505A"/>
                 </a:solidFill>
                 <a:effectLst/>
               </a:rPr>
-              <a:t>determine whether the tone of a piece of text is positive, negative (or neutral)</a:t>
+              <a:t>determine the tone of a piece of text: positive, negative (or neutral)</a:t>
             </a:r>
           </a:p>
           <a:p>
             <a:pPr algn="l"/>
             <a:r>
-              <a:rPr lang="en-GB" sz="2000" b="0" i="0" dirty="0">
+              <a:rPr lang="en-GB" sz="2400" b="0" i="0" dirty="0">
                 <a:solidFill>
                   <a:srgbClr val="51505A"/>
                 </a:solidFill>
                 <a:effectLst/>
               </a:rPr>
-              <a:t>gain an understanding of the attitudes, opinions and emotions expressed within texts (often user feedback, online content)</a:t>
-            </a:r>
-          </a:p>
-          <a:p>
+              <a:t>gain understanding of the attitudes, opinions and emotions expressed within texts (often user feedback, online content)</a:t>
+            </a:r>
+          </a:p>
+          <a:p>
+            <a:r>
+              <a:rPr lang="en-GB" sz="2400" dirty="0"/>
+              <a:t>Basic rule-based sentiment analysis:</a:t>
+            </a:r>
+          </a:p>
+          <a:p>
+            <a:pPr lvl="1"/>
             <a:r>
               <a:rPr lang="en-GB" sz="2000" dirty="0"/>
-              <a:t>Basic (rule-based) sentiment analysis:</a:t>
+              <a:t>Break each text document down into tokens</a:t>
             </a:r>
           </a:p>
           <a:p>
             <a:pPr lvl="1"/>
             <a:r>
-              <a:rPr lang="en-GB" sz="1800" dirty="0"/>
-              <a:t>Break each text document down into tokens</a:t>
-            </a:r>
+              <a:rPr lang="en-GB" sz="2000" dirty="0"/>
+              <a:t>Identify each sentiment-bearing token (e.g. by using use a look-up to a sentiment dictionary)</a:t>
+            </a:r>
+            <a:endParaRPr lang="en-GB" sz="1800" dirty="0"/>
           </a:p>
           <a:p>
             <a:pPr lvl="1"/>
             <a:r>
-              <a:rPr lang="en-GB" sz="1800" dirty="0"/>
-              <a:t>Identify each sentiment-bearing token </a:t>
-            </a:r>
-          </a:p>
-          <a:p>
-            <a:pPr lvl="2"/>
-            <a:r>
-              <a:rPr lang="en-GB" sz="1600" dirty="0"/>
-              <a:t>commonly using a </a:t>
-            </a:r>
-            <a:r>
-              <a:rPr lang="en-GB" sz="1600" dirty="0" err="1"/>
-              <a:t>look_up</a:t>
-            </a:r>
-            <a:r>
-              <a:rPr lang="en-GB" sz="1600" dirty="0"/>
-              <a:t> to a sentiment dictionary</a:t>
-            </a:r>
+              <a:rPr lang="en-GB" sz="2000" dirty="0"/>
+              <a:t>Appy a function to calculate a sentiment score for a text (commonly based on counts of positive, negative, neutral components)</a:t>
+            </a:r>
+            <a:endParaRPr lang="en-GB" sz="1800" dirty="0"/>
           </a:p>
           <a:p>
             <a:pPr lvl="1"/>
             <a:r>
-              <a:rPr lang="en-GB" sz="1800" dirty="0"/>
-              <a:t>Appy a function to calculate a sentiment score for a text</a:t>
-            </a:r>
-          </a:p>
-          <a:p>
-            <a:pPr lvl="2"/>
-            <a:r>
-              <a:rPr lang="en-GB" sz="1600" dirty="0"/>
-              <a:t>based on counts of positive, negative, neutral components</a:t>
-            </a:r>
-          </a:p>
-          <a:p>
-            <a:pPr lvl="1"/>
-            <a:r>
-              <a:rPr lang="en-GB" sz="1800" dirty="0"/>
-              <a:t>[Optional: Combine scores from different dictionaries/functions for multi-layered sentiment analysis</a:t>
-            </a:r>
-            <a:r>
-              <a:rPr lang="en-GB" dirty="0"/>
-              <a:t>]</a:t>
-            </a:r>
+              <a:rPr lang="en-GB" sz="2000" dirty="0"/>
+              <a:t>Ideally: Combine scores from different dictionaries/functions for multi-layered sentiment analysis</a:t>
+            </a:r>
+            <a:endParaRPr lang="en-GB" sz="1800" dirty="0"/>
           </a:p>
         </p:txBody>
       </p:sp>
@@ -7537,7 +7812,7 @@
         </p:nvSpPr>
         <p:spPr>
           <a:xfrm>
-            <a:off x="677334" y="609600"/>
+            <a:off x="408478" y="294640"/>
             <a:ext cx="8596668" cy="813847"/>
           </a:xfrm>
         </p:spPr>
@@ -7570,8 +7845,8 @@
         </p:nvSpPr>
         <p:spPr>
           <a:xfrm>
-            <a:off x="3048000" y="1508289"/>
-            <a:ext cx="6502400" cy="4854804"/>
+            <a:off x="314960" y="1213649"/>
+            <a:ext cx="4683760" cy="5461471"/>
           </a:xfrm>
         </p:spPr>
         <p:txBody>
@@ -7581,59 +7856,35 @@
           <a:lstStyle/>
           <a:p>
             <a:r>
+              <a:rPr lang="en-GB" sz="2400" dirty="0"/>
+              <a:t>PROBLEM:</a:t>
+            </a:r>
+          </a:p>
+          <a:p>
+            <a:pPr lvl="1"/>
+            <a:r>
               <a:rPr lang="en-GB" sz="2000" dirty="0"/>
-              <a:t>PROBLEM:</a:t>
+              <a:t>Need to classify 1000’s of short free-text entries describing why UK Biobank participants did not complete or perform particular activities.</a:t>
             </a:r>
           </a:p>
           <a:p>
             <a:pPr lvl="1"/>
             <a:r>
-              <a:rPr lang="en-GB" sz="1800" dirty="0"/>
-              <a:t>Need to classify 1000’s of short </a:t>
-            </a:r>
-            <a:r>
-              <a:rPr lang="en-GB" sz="1800" dirty="0" err="1"/>
-              <a:t>freetext</a:t>
-            </a:r>
-            <a:r>
-              <a:rPr lang="en-GB" sz="1800" dirty="0"/>
-              <a:t> entries describing why </a:t>
-            </a:r>
-            <a:r>
-              <a:rPr lang="en-GB" sz="1800" dirty="0" err="1"/>
-              <a:t>UKBiobank</a:t>
-            </a:r>
-            <a:r>
-              <a:rPr lang="en-GB" sz="1800" dirty="0"/>
-              <a:t> participants didn’t complete/perform particular activities.</a:t>
+              <a:rPr lang="en-GB" sz="2000" dirty="0"/>
+              <a:t>Assign free-text to existing classes (labels)</a:t>
+            </a:r>
+          </a:p>
+          <a:p>
+            <a:r>
+              <a:rPr lang="en-GB" sz="2400" dirty="0"/>
+              <a:t>SOLUTION:</a:t>
             </a:r>
           </a:p>
           <a:p>
             <a:pPr lvl="1"/>
             <a:r>
-              <a:rPr lang="en-GB" sz="1800" dirty="0"/>
-              <a:t>Assign </a:t>
-            </a:r>
-            <a:r>
-              <a:rPr lang="en-GB" sz="1800" dirty="0" err="1"/>
-              <a:t>freetext</a:t>
-            </a:r>
-            <a:r>
-              <a:rPr lang="en-GB" sz="1800" dirty="0"/>
-              <a:t> to existing classes (labels)</a:t>
-            </a:r>
-          </a:p>
-          <a:p>
-            <a:r>
               <a:rPr lang="en-GB" sz="2000" dirty="0"/>
-              <a:t>SOLUTION:</a:t>
-            </a:r>
-          </a:p>
-          <a:p>
-            <a:pPr lvl="1"/>
-            <a:r>
-              <a:rPr lang="en-GB" sz="1800" dirty="0"/>
-              <a:t>Can use already-classified texts as gold standards to train a machine learning algorithm that we can then use to predict to the new datasets.</a:t>
+              <a:t>Use already-classified texts as gold standards to train a machine learning algorithm that can then be used to predict the classes (labels) of new free-text entries.</a:t>
             </a:r>
           </a:p>
           <a:p>
@@ -7669,21 +7920,21 @@
           <p:nvPr>
             <p:extLst>
               <p:ext uri="{D42A27DB-BD31-4B8C-83A1-F6EECF244321}">
-                <p14:modId xmlns:p14="http://schemas.microsoft.com/office/powerpoint/2010/main" val="3757006753"/>
+                <p14:modId xmlns:p14="http://schemas.microsoft.com/office/powerpoint/2010/main" val="25929758"/>
               </p:ext>
             </p:extLst>
           </p:nvPr>
         </p:nvGraphicFramePr>
         <p:xfrm>
-          <a:off x="601518" y="2753361"/>
-          <a:ext cx="2316480" cy="3373996"/>
+          <a:off x="5488478" y="966820"/>
+          <a:ext cx="4061922" cy="2462179"/>
         </p:xfrm>
         <a:graphic>
           <a:graphicData uri="http://schemas.openxmlformats.org/drawingml/2006/table">
             <a:tbl>
               <a:tblPr firstRow="1" firstCol="1" bandRow="1"/>
               <a:tblGrid>
-                <a:gridCol w="2316480">
+                <a:gridCol w="4061922">
                   <a:extLst>
                     <a:ext uri="{9D8B030D-6E8A-4147-A177-3AD203B41FA5}">
                       <a16:colId xmlns:a16="http://schemas.microsoft.com/office/drawing/2014/main" val="1888860742"/>
@@ -7691,7 +7942,7 @@
                   </a:extLst>
                 </a:gridCol>
               </a:tblGrid>
-              <a:tr h="346526">
+              <a:tr h="361416">
                 <a:tc>
                   <a:txBody>
                     <a:bodyPr/>
@@ -7706,22 +7957,25 @@
                         </a:spcAft>
                       </a:pPr>
                       <a:r>
-                        <a:rPr lang="en-GB" sz="1600" b="0" dirty="0">
+                        <a:rPr lang="en-GB" sz="1800" b="0" dirty="0">
                           <a:solidFill>
-                            <a:srgbClr val="212121"/>
+                            <a:schemeClr val="bg1"/>
                           </a:solidFill>
                           <a:effectLst/>
-                          <a:latin typeface="Segoe UI" panose="020B0502040204020203" pitchFamily="34" charset="0"/>
+                          <a:latin typeface="Calibri" panose="020F0502020204030204" pitchFamily="34" charset="0"/>
                           <a:ea typeface="Times New Roman" panose="02020603050405020304" pitchFamily="18" charset="0"/>
-                          <a:cs typeface="Times New Roman" panose="02020603050405020304" pitchFamily="18" charset="0"/>
+                          <a:cs typeface="Calibri" panose="020F0502020204030204" pitchFamily="34" charset="0"/>
                         </a:rPr>
                         <a:t>Reason for skipping spirometry test</a:t>
                       </a:r>
-                      <a:endParaRPr lang="en-GB" sz="1600" b="0" dirty="0">
+                      <a:endParaRPr lang="en-GB" sz="1800" b="0" dirty="0">
+                        <a:solidFill>
+                          <a:schemeClr val="bg1"/>
+                        </a:solidFill>
                         <a:effectLst/>
                         <a:latin typeface="Calibri" panose="020F0502020204030204" pitchFamily="34" charset="0"/>
                         <a:ea typeface="Calibri" panose="020F0502020204030204" pitchFamily="34" charset="0"/>
-                        <a:cs typeface="Times New Roman" panose="02020603050405020304" pitchFamily="18" charset="0"/>
+                        <a:cs typeface="Calibri" panose="020F0502020204030204" pitchFamily="34" charset="0"/>
                       </a:endParaRPr>
                     </a:p>
                   </a:txBody>
@@ -7773,7 +8027,7 @@
                   </a:ext>
                 </a:extLst>
               </a:tr>
-              <a:tr h="333673">
+              <a:tr h="261071">
                 <a:tc>
                   <a:txBody>
                     <a:bodyPr/>
@@ -7803,7 +8057,7 @@
                         <a:effectLst/>
                         <a:latin typeface="Calibri" panose="020F0502020204030204" pitchFamily="34" charset="0"/>
                         <a:ea typeface="Calibri" panose="020F0502020204030204" pitchFamily="34" charset="0"/>
-                        <a:cs typeface="Times New Roman" panose="02020603050405020304" pitchFamily="18" charset="0"/>
+                        <a:cs typeface="Calibri" panose="020F0502020204030204" pitchFamily="34" charset="0"/>
                       </a:endParaRPr>
                     </a:p>
                   </a:txBody>
@@ -7855,7 +8109,7 @@
                   </a:ext>
                 </a:extLst>
               </a:tr>
-              <a:tr h="333673">
+              <a:tr h="261071">
                 <a:tc>
                   <a:txBody>
                     <a:bodyPr/>
@@ -7885,7 +8139,7 @@
                         <a:effectLst/>
                         <a:latin typeface="Calibri" panose="020F0502020204030204" pitchFamily="34" charset="0"/>
                         <a:ea typeface="Calibri" panose="020F0502020204030204" pitchFamily="34" charset="0"/>
-                        <a:cs typeface="Times New Roman" panose="02020603050405020304" pitchFamily="18" charset="0"/>
+                        <a:cs typeface="Calibri" panose="020F0502020204030204" pitchFamily="34" charset="0"/>
                       </a:endParaRPr>
                     </a:p>
                   </a:txBody>
@@ -7934,7 +8188,7 @@
                   </a:ext>
                 </a:extLst>
               </a:tr>
-              <a:tr h="333673">
+              <a:tr h="331387">
                 <a:tc>
                   <a:txBody>
                     <a:bodyPr/>
@@ -7964,7 +8218,7 @@
                         <a:effectLst/>
                         <a:latin typeface="Calibri" panose="020F0502020204030204" pitchFamily="34" charset="0"/>
                         <a:ea typeface="Calibri" panose="020F0502020204030204" pitchFamily="34" charset="0"/>
-                        <a:cs typeface="Times New Roman" panose="02020603050405020304" pitchFamily="18" charset="0"/>
+                        <a:cs typeface="Calibri" panose="020F0502020204030204" pitchFamily="34" charset="0"/>
                       </a:endParaRPr>
                     </a:p>
                   </a:txBody>
@@ -8016,7 +8270,7 @@
                   </a:ext>
                 </a:extLst>
               </a:tr>
-              <a:tr h="333673">
+              <a:tr h="362546">
                 <a:tc>
                   <a:txBody>
                     <a:bodyPr/>
@@ -8031,7 +8285,7 @@
                         </a:spcAft>
                       </a:pPr>
                       <a:r>
-                        <a:rPr lang="en-GB" sz="1600" b="0">
+                        <a:rPr lang="en-GB" sz="1600" b="0" dirty="0">
                           <a:solidFill>
                             <a:srgbClr val="212121"/>
                           </a:solidFill>
@@ -8042,11 +8296,11 @@
                         </a:rPr>
                         <a:t>unable - nerve damage around mouth</a:t>
                       </a:r>
-                      <a:endParaRPr lang="en-GB" sz="1600" b="0">
+                      <a:endParaRPr lang="en-GB" sz="1600" b="0" dirty="0">
                         <a:effectLst/>
                         <a:latin typeface="Calibri" panose="020F0502020204030204" pitchFamily="34" charset="0"/>
                         <a:ea typeface="Calibri" panose="020F0502020204030204" pitchFamily="34" charset="0"/>
-                        <a:cs typeface="Times New Roman" panose="02020603050405020304" pitchFamily="18" charset="0"/>
+                        <a:cs typeface="Calibri" panose="020F0502020204030204" pitchFamily="34" charset="0"/>
                       </a:endParaRPr>
                     </a:p>
                   </a:txBody>
@@ -8095,7 +8349,7 @@
                   </a:ext>
                 </a:extLst>
               </a:tr>
-              <a:tr h="333673">
+              <a:tr h="362546">
                 <a:tc>
                   <a:txBody>
                     <a:bodyPr/>
@@ -8110,7 +8364,7 @@
                         </a:spcAft>
                       </a:pPr>
                       <a:r>
-                        <a:rPr lang="en-GB" sz="1600" b="0">
+                        <a:rPr lang="en-GB" sz="1600" b="0" dirty="0">
                           <a:solidFill>
                             <a:srgbClr val="212121"/>
                           </a:solidFill>
@@ -8121,11 +8375,11 @@
                         </a:rPr>
                         <a:t>collapsed lung; out of stock of filters</a:t>
                       </a:r>
-                      <a:endParaRPr lang="en-GB" sz="1600" b="0">
+                      <a:endParaRPr lang="en-GB" sz="1600" b="0" dirty="0">
                         <a:effectLst/>
                         <a:latin typeface="Calibri" panose="020F0502020204030204" pitchFamily="34" charset="0"/>
                         <a:ea typeface="Calibri" panose="020F0502020204030204" pitchFamily="34" charset="0"/>
-                        <a:cs typeface="Times New Roman" panose="02020603050405020304" pitchFamily="18" charset="0"/>
+                        <a:cs typeface="Calibri" panose="020F0502020204030204" pitchFamily="34" charset="0"/>
                       </a:endParaRPr>
                     </a:p>
                   </a:txBody>
@@ -8177,7 +8431,7 @@
                   </a:ext>
                 </a:extLst>
               </a:tr>
-              <a:tr h="333673">
+              <a:tr h="261071">
                 <a:tc>
                   <a:txBody>
                     <a:bodyPr/>
@@ -8192,7 +8446,7 @@
                         </a:spcAft>
                       </a:pPr>
                       <a:r>
-                        <a:rPr lang="en-GB" sz="1600" b="0">
+                        <a:rPr lang="en-GB" sz="1600" b="0" dirty="0">
                           <a:solidFill>
                             <a:srgbClr val="212121"/>
                           </a:solidFill>
@@ -8203,11 +8457,11 @@
                         </a:rPr>
                         <a:t>cracked ribs</a:t>
                       </a:r>
-                      <a:endParaRPr lang="en-GB" sz="1600" b="0">
+                      <a:endParaRPr lang="en-GB" sz="1600" b="0" dirty="0">
                         <a:effectLst/>
                         <a:latin typeface="Calibri" panose="020F0502020204030204" pitchFamily="34" charset="0"/>
                         <a:ea typeface="Calibri" panose="020F0502020204030204" pitchFamily="34" charset="0"/>
-                        <a:cs typeface="Times New Roman" panose="02020603050405020304" pitchFamily="18" charset="0"/>
+                        <a:cs typeface="Calibri" panose="020F0502020204030204" pitchFamily="34" charset="0"/>
                       </a:endParaRPr>
                     </a:p>
                   </a:txBody>
@@ -8256,7 +8510,7 @@
                   </a:ext>
                 </a:extLst>
               </a:tr>
-              <a:tr h="333673">
+              <a:tr h="261071">
                 <a:tc>
                   <a:txBody>
                     <a:bodyPr/>
@@ -8286,7 +8540,7 @@
                         <a:effectLst/>
                         <a:latin typeface="Calibri" panose="020F0502020204030204" pitchFamily="34" charset="0"/>
                         <a:ea typeface="Calibri" panose="020F0502020204030204" pitchFamily="34" charset="0"/>
-                        <a:cs typeface="Times New Roman" panose="02020603050405020304" pitchFamily="18" charset="0"/>
+                        <a:cs typeface="Calibri" panose="020F0502020204030204" pitchFamily="34" charset="0"/>
                       </a:endParaRPr>
                     </a:p>
                   </a:txBody>
@@ -8342,6 +8596,1407 @@
           </a:graphicData>
         </a:graphic>
       </p:graphicFrame>
+      <p:graphicFrame>
+        <p:nvGraphicFramePr>
+          <p:cNvPr id="5" name="Table 4">
+            <a:extLst>
+              <a:ext uri="{FF2B5EF4-FFF2-40B4-BE49-F238E27FC236}">
+                <a16:creationId xmlns:a16="http://schemas.microsoft.com/office/drawing/2014/main" id="{8B6120D5-DC72-491B-9BAC-F88443418EC8}"/>
+              </a:ext>
+            </a:extLst>
+          </p:cNvPr>
+          <p:cNvGraphicFramePr>
+            <a:graphicFrameLocks noGrp="1"/>
+          </p:cNvGraphicFramePr>
+          <p:nvPr>
+            <p:extLst>
+              <p:ext uri="{D42A27DB-BD31-4B8C-83A1-F6EECF244321}">
+                <p14:modId xmlns:p14="http://schemas.microsoft.com/office/powerpoint/2010/main" val="1167685469"/>
+              </p:ext>
+            </p:extLst>
+          </p:nvPr>
+        </p:nvGraphicFramePr>
+        <p:xfrm>
+          <a:off x="5488478" y="3594023"/>
+          <a:ext cx="4061922" cy="3167482"/>
+        </p:xfrm>
+        <a:graphic>
+          <a:graphicData uri="http://schemas.openxmlformats.org/drawingml/2006/table">
+            <a:tbl>
+              <a:tblPr firstRow="1" firstCol="1" bandRow="1"/>
+              <a:tblGrid>
+                <a:gridCol w="1102820">
+                  <a:extLst>
+                    <a:ext uri="{9D8B030D-6E8A-4147-A177-3AD203B41FA5}">
+                      <a16:colId xmlns:a16="http://schemas.microsoft.com/office/drawing/2014/main" val="673909087"/>
+                    </a:ext>
+                  </a:extLst>
+                </a:gridCol>
+                <a:gridCol w="2959102">
+                  <a:extLst>
+                    <a:ext uri="{9D8B030D-6E8A-4147-A177-3AD203B41FA5}">
+                      <a16:colId xmlns:a16="http://schemas.microsoft.com/office/drawing/2014/main" val="1121032025"/>
+                    </a:ext>
+                  </a:extLst>
+                </a:gridCol>
+              </a:tblGrid>
+              <a:tr h="236328">
+                <a:tc>
+                  <a:txBody>
+                    <a:bodyPr/>
+                    <a:lstStyle/>
+                    <a:p>
+                      <a:pPr>
+                        <a:lnSpc>
+                          <a:spcPct val="107000"/>
+                        </a:lnSpc>
+                        <a:spcAft>
+                          <a:spcPts val="800"/>
+                        </a:spcAft>
+                      </a:pPr>
+                      <a:r>
+                        <a:rPr lang="en-GB" sz="1800" b="0" dirty="0">
+                          <a:solidFill>
+                            <a:srgbClr val="FFFFFF"/>
+                          </a:solidFill>
+                          <a:effectLst/>
+                          <a:latin typeface="Calibri" panose="020F0502020204030204" pitchFamily="34" charset="0"/>
+                          <a:ea typeface="Calibri" panose="020F0502020204030204" pitchFamily="34" charset="0"/>
+                          <a:cs typeface="Calibri" panose="020F0502020204030204" pitchFamily="34" charset="0"/>
+                        </a:rPr>
+                        <a:t>Label</a:t>
+                      </a:r>
+                      <a:endParaRPr lang="en-GB" sz="2400" b="0" dirty="0">
+                        <a:effectLst/>
+                        <a:latin typeface="Calibri" panose="020F0502020204030204" pitchFamily="34" charset="0"/>
+                        <a:ea typeface="Calibri" panose="020F0502020204030204" pitchFamily="34" charset="0"/>
+                        <a:cs typeface="Calibri" panose="020F0502020204030204" pitchFamily="34" charset="0"/>
+                      </a:endParaRPr>
+                    </a:p>
+                  </a:txBody>
+                  <a:tcPr marL="68580" marR="68580" marT="0" marB="0">
+                    <a:lnL w="12700" cap="flat" cmpd="sng" algn="ctr">
+                      <a:solidFill>
+                        <a:srgbClr val="4472C4"/>
+                      </a:solidFill>
+                      <a:prstDash val="solid"/>
+                      <a:round/>
+                      <a:headEnd type="none" w="med" len="med"/>
+                      <a:tailEnd type="none" w="med" len="med"/>
+                    </a:lnL>
+                    <a:lnR>
+                      <a:noFill/>
+                    </a:lnR>
+                    <a:lnT w="12700" cap="flat" cmpd="sng" algn="ctr">
+                      <a:solidFill>
+                        <a:srgbClr val="4472C4"/>
+                      </a:solidFill>
+                      <a:prstDash val="solid"/>
+                      <a:round/>
+                      <a:headEnd type="none" w="med" len="med"/>
+                      <a:tailEnd type="none" w="med" len="med"/>
+                    </a:lnT>
+                    <a:lnB w="12700" cap="flat" cmpd="sng" algn="ctr">
+                      <a:solidFill>
+                        <a:srgbClr val="4472C4"/>
+                      </a:solidFill>
+                      <a:prstDash val="solid"/>
+                      <a:round/>
+                      <a:headEnd type="none" w="med" len="med"/>
+                      <a:tailEnd type="none" w="med" len="med"/>
+                    </a:lnB>
+                    <a:solidFill>
+                      <a:srgbClr val="4472C4"/>
+                    </a:solidFill>
+                  </a:tcPr>
+                </a:tc>
+                <a:tc>
+                  <a:txBody>
+                    <a:bodyPr/>
+                    <a:lstStyle/>
+                    <a:p>
+                      <a:pPr>
+                        <a:lnSpc>
+                          <a:spcPct val="107000"/>
+                        </a:lnSpc>
+                        <a:spcAft>
+                          <a:spcPts val="800"/>
+                        </a:spcAft>
+                      </a:pPr>
+                      <a:r>
+                        <a:rPr lang="en-GB" sz="1800" b="0" dirty="0">
+                          <a:solidFill>
+                            <a:srgbClr val="FFFFFF"/>
+                          </a:solidFill>
+                          <a:effectLst/>
+                          <a:latin typeface="Calibri" panose="020F0502020204030204" pitchFamily="34" charset="0"/>
+                          <a:ea typeface="Calibri" panose="020F0502020204030204" pitchFamily="34" charset="0"/>
+                          <a:cs typeface="Calibri" panose="020F0502020204030204" pitchFamily="34" charset="0"/>
+                        </a:rPr>
+                        <a:t>Meaning</a:t>
+                      </a:r>
+                      <a:endParaRPr lang="en-GB" sz="2400" b="0" dirty="0">
+                        <a:effectLst/>
+                        <a:latin typeface="Calibri" panose="020F0502020204030204" pitchFamily="34" charset="0"/>
+                        <a:ea typeface="Calibri" panose="020F0502020204030204" pitchFamily="34" charset="0"/>
+                        <a:cs typeface="Calibri" panose="020F0502020204030204" pitchFamily="34" charset="0"/>
+                      </a:endParaRPr>
+                    </a:p>
+                  </a:txBody>
+                  <a:tcPr marL="68580" marR="68580" marT="0" marB="0">
+                    <a:lnL>
+                      <a:noFill/>
+                    </a:lnL>
+                    <a:lnR w="12700" cap="flat" cmpd="sng" algn="ctr">
+                      <a:solidFill>
+                        <a:srgbClr val="4472C4"/>
+                      </a:solidFill>
+                      <a:prstDash val="solid"/>
+                      <a:round/>
+                      <a:headEnd type="none" w="med" len="med"/>
+                      <a:tailEnd type="none" w="med" len="med"/>
+                    </a:lnR>
+                    <a:lnT w="12700" cap="flat" cmpd="sng" algn="ctr">
+                      <a:solidFill>
+                        <a:srgbClr val="4472C4"/>
+                      </a:solidFill>
+                      <a:prstDash val="solid"/>
+                      <a:round/>
+                      <a:headEnd type="none" w="med" len="med"/>
+                      <a:tailEnd type="none" w="med" len="med"/>
+                    </a:lnT>
+                    <a:lnB w="12700" cap="flat" cmpd="sng" algn="ctr">
+                      <a:solidFill>
+                        <a:srgbClr val="4472C4"/>
+                      </a:solidFill>
+                      <a:prstDash val="solid"/>
+                      <a:round/>
+                      <a:headEnd type="none" w="med" len="med"/>
+                      <a:tailEnd type="none" w="med" len="med"/>
+                    </a:lnB>
+                    <a:solidFill>
+                      <a:srgbClr val="4472C4"/>
+                    </a:solidFill>
+                  </a:tcPr>
+                </a:tc>
+                <a:extLst>
+                  <a:ext uri="{0D108BD9-81ED-4DB2-BD59-A6C34878D82A}">
+                    <a16:rowId xmlns:a16="http://schemas.microsoft.com/office/drawing/2014/main" val="2376233740"/>
+                  </a:ext>
+                </a:extLst>
+              </a:tr>
+              <a:tr h="434676">
+                <a:tc>
+                  <a:txBody>
+                    <a:bodyPr/>
+                    <a:lstStyle/>
+                    <a:p>
+                      <a:pPr>
+                        <a:lnSpc>
+                          <a:spcPct val="107000"/>
+                        </a:lnSpc>
+                        <a:spcAft>
+                          <a:spcPts val="800"/>
+                        </a:spcAft>
+                      </a:pPr>
+                      <a:r>
+                        <a:rPr lang="en-GB" sz="1600" b="0" dirty="0">
+                          <a:solidFill>
+                            <a:srgbClr val="000000"/>
+                          </a:solidFill>
+                          <a:effectLst/>
+                          <a:latin typeface="Calibri" panose="020F0502020204030204" pitchFamily="34" charset="0"/>
+                          <a:ea typeface="Calibri" panose="020F0502020204030204" pitchFamily="34" charset="0"/>
+                          <a:cs typeface="Calibri" panose="020F0502020204030204" pitchFamily="34" charset="0"/>
+                        </a:rPr>
+                        <a:t>101</a:t>
+                      </a:r>
+                      <a:endParaRPr lang="en-GB" sz="2000" b="0" dirty="0">
+                        <a:effectLst/>
+                        <a:latin typeface="Calibri" panose="020F0502020204030204" pitchFamily="34" charset="0"/>
+                        <a:ea typeface="Calibri" panose="020F0502020204030204" pitchFamily="34" charset="0"/>
+                        <a:cs typeface="Calibri" panose="020F0502020204030204" pitchFamily="34" charset="0"/>
+                      </a:endParaRPr>
+                    </a:p>
+                  </a:txBody>
+                  <a:tcPr marL="68580" marR="68580" marT="0" marB="0">
+                    <a:lnL w="12700" cap="flat" cmpd="sng" algn="ctr">
+                      <a:solidFill>
+                        <a:srgbClr val="8EAADB"/>
+                      </a:solidFill>
+                      <a:prstDash val="solid"/>
+                      <a:round/>
+                      <a:headEnd type="none" w="med" len="med"/>
+                      <a:tailEnd type="none" w="med" len="med"/>
+                    </a:lnL>
+                    <a:lnR w="12700" cap="flat" cmpd="sng" algn="ctr">
+                      <a:solidFill>
+                        <a:srgbClr val="8EAADB"/>
+                      </a:solidFill>
+                      <a:prstDash val="solid"/>
+                      <a:round/>
+                      <a:headEnd type="none" w="med" len="med"/>
+                      <a:tailEnd type="none" w="med" len="med"/>
+                    </a:lnR>
+                    <a:lnT w="12700" cap="flat" cmpd="sng" algn="ctr">
+                      <a:solidFill>
+                        <a:srgbClr val="4472C4"/>
+                      </a:solidFill>
+                      <a:prstDash val="solid"/>
+                      <a:round/>
+                      <a:headEnd type="none" w="med" len="med"/>
+                      <a:tailEnd type="none" w="med" len="med"/>
+                    </a:lnT>
+                    <a:lnB w="12700" cap="flat" cmpd="sng" algn="ctr">
+                      <a:solidFill>
+                        <a:srgbClr val="8EAADB"/>
+                      </a:solidFill>
+                      <a:prstDash val="solid"/>
+                      <a:round/>
+                      <a:headEnd type="none" w="med" len="med"/>
+                      <a:tailEnd type="none" w="med" len="med"/>
+                    </a:lnB>
+                    <a:solidFill>
+                      <a:srgbClr val="D9E2F3"/>
+                    </a:solidFill>
+                  </a:tcPr>
+                </a:tc>
+                <a:tc>
+                  <a:txBody>
+                    <a:bodyPr/>
+                    <a:lstStyle/>
+                    <a:p>
+                      <a:pPr>
+                        <a:lnSpc>
+                          <a:spcPct val="107000"/>
+                        </a:lnSpc>
+                        <a:spcAft>
+                          <a:spcPts val="800"/>
+                        </a:spcAft>
+                      </a:pPr>
+                      <a:r>
+                        <a:rPr lang="en-GB" sz="1600" b="0" dirty="0">
+                          <a:solidFill>
+                            <a:srgbClr val="000000"/>
+                          </a:solidFill>
+                          <a:effectLst/>
+                          <a:latin typeface="Calibri" panose="020F0502020204030204" pitchFamily="34" charset="0"/>
+                          <a:ea typeface="Calibri" panose="020F0502020204030204" pitchFamily="34" charset="0"/>
+                          <a:cs typeface="Calibri" panose="020F0502020204030204" pitchFamily="34" charset="0"/>
+                        </a:rPr>
+                        <a:t>Against participant wishes</a:t>
+                      </a:r>
+                      <a:endParaRPr lang="en-GB" sz="2000" b="0" dirty="0">
+                        <a:effectLst/>
+                        <a:latin typeface="Calibri" panose="020F0502020204030204" pitchFamily="34" charset="0"/>
+                        <a:ea typeface="Calibri" panose="020F0502020204030204" pitchFamily="34" charset="0"/>
+                        <a:cs typeface="Calibri" panose="020F0502020204030204" pitchFamily="34" charset="0"/>
+                      </a:endParaRPr>
+                    </a:p>
+                  </a:txBody>
+                  <a:tcPr marL="68580" marR="68580" marT="0" marB="0">
+                    <a:lnL w="12700" cap="flat" cmpd="sng" algn="ctr">
+                      <a:solidFill>
+                        <a:srgbClr val="8EAADB"/>
+                      </a:solidFill>
+                      <a:prstDash val="solid"/>
+                      <a:round/>
+                      <a:headEnd type="none" w="med" len="med"/>
+                      <a:tailEnd type="none" w="med" len="med"/>
+                    </a:lnL>
+                    <a:lnR w="12700" cap="flat" cmpd="sng" algn="ctr">
+                      <a:solidFill>
+                        <a:srgbClr val="8EAADB"/>
+                      </a:solidFill>
+                      <a:prstDash val="solid"/>
+                      <a:round/>
+                      <a:headEnd type="none" w="med" len="med"/>
+                      <a:tailEnd type="none" w="med" len="med"/>
+                    </a:lnR>
+                    <a:lnT w="12700" cap="flat" cmpd="sng" algn="ctr">
+                      <a:solidFill>
+                        <a:srgbClr val="4472C4"/>
+                      </a:solidFill>
+                      <a:prstDash val="solid"/>
+                      <a:round/>
+                      <a:headEnd type="none" w="med" len="med"/>
+                      <a:tailEnd type="none" w="med" len="med"/>
+                    </a:lnT>
+                    <a:lnB w="12700" cap="flat" cmpd="sng" algn="ctr">
+                      <a:solidFill>
+                        <a:srgbClr val="8EAADB"/>
+                      </a:solidFill>
+                      <a:prstDash val="solid"/>
+                      <a:round/>
+                      <a:headEnd type="none" w="med" len="med"/>
+                      <a:tailEnd type="none" w="med" len="med"/>
+                    </a:lnB>
+                    <a:solidFill>
+                      <a:srgbClr val="D9E2F3"/>
+                    </a:solidFill>
+                  </a:tcPr>
+                </a:tc>
+                <a:extLst>
+                  <a:ext uri="{0D108BD9-81ED-4DB2-BD59-A6C34878D82A}">
+                    <a16:rowId xmlns:a16="http://schemas.microsoft.com/office/drawing/2014/main" val="1422553388"/>
+                  </a:ext>
+                </a:extLst>
+              </a:tr>
+              <a:tr h="236328">
+                <a:tc>
+                  <a:txBody>
+                    <a:bodyPr/>
+                    <a:lstStyle/>
+                    <a:p>
+                      <a:pPr>
+                        <a:lnSpc>
+                          <a:spcPct val="107000"/>
+                        </a:lnSpc>
+                        <a:spcAft>
+                          <a:spcPts val="800"/>
+                        </a:spcAft>
+                      </a:pPr>
+                      <a:r>
+                        <a:rPr lang="en-GB" sz="1600" b="0" dirty="0">
+                          <a:effectLst/>
+                          <a:latin typeface="Calibri" panose="020F0502020204030204" pitchFamily="34" charset="0"/>
+                          <a:ea typeface="Calibri" panose="020F0502020204030204" pitchFamily="34" charset="0"/>
+                          <a:cs typeface="Calibri" panose="020F0502020204030204" pitchFamily="34" charset="0"/>
+                        </a:rPr>
+                        <a:t>102</a:t>
+                      </a:r>
+                      <a:endParaRPr lang="en-GB" sz="2000" b="0" dirty="0">
+                        <a:effectLst/>
+                        <a:latin typeface="Calibri" panose="020F0502020204030204" pitchFamily="34" charset="0"/>
+                        <a:ea typeface="Calibri" panose="020F0502020204030204" pitchFamily="34" charset="0"/>
+                        <a:cs typeface="Calibri" panose="020F0502020204030204" pitchFamily="34" charset="0"/>
+                      </a:endParaRPr>
+                    </a:p>
+                  </a:txBody>
+                  <a:tcPr marL="68580" marR="68580" marT="0" marB="0">
+                    <a:lnL w="12700" cap="flat" cmpd="sng" algn="ctr">
+                      <a:solidFill>
+                        <a:srgbClr val="8EAADB"/>
+                      </a:solidFill>
+                      <a:prstDash val="solid"/>
+                      <a:round/>
+                      <a:headEnd type="none" w="med" len="med"/>
+                      <a:tailEnd type="none" w="med" len="med"/>
+                    </a:lnL>
+                    <a:lnR w="12700" cap="flat" cmpd="sng" algn="ctr">
+                      <a:solidFill>
+                        <a:srgbClr val="8EAADB"/>
+                      </a:solidFill>
+                      <a:prstDash val="solid"/>
+                      <a:round/>
+                      <a:headEnd type="none" w="med" len="med"/>
+                      <a:tailEnd type="none" w="med" len="med"/>
+                    </a:lnR>
+                    <a:lnT w="12700" cap="flat" cmpd="sng" algn="ctr">
+                      <a:solidFill>
+                        <a:srgbClr val="8EAADB"/>
+                      </a:solidFill>
+                      <a:prstDash val="solid"/>
+                      <a:round/>
+                      <a:headEnd type="none" w="med" len="med"/>
+                      <a:tailEnd type="none" w="med" len="med"/>
+                    </a:lnT>
+                    <a:lnB w="12700" cap="flat" cmpd="sng" algn="ctr">
+                      <a:solidFill>
+                        <a:srgbClr val="8EAADB"/>
+                      </a:solidFill>
+                      <a:prstDash val="solid"/>
+                      <a:round/>
+                      <a:headEnd type="none" w="med" len="med"/>
+                      <a:tailEnd type="none" w="med" len="med"/>
+                    </a:lnB>
+                  </a:tcPr>
+                </a:tc>
+                <a:tc>
+                  <a:txBody>
+                    <a:bodyPr/>
+                    <a:lstStyle/>
+                    <a:p>
+                      <a:pPr>
+                        <a:lnSpc>
+                          <a:spcPct val="107000"/>
+                        </a:lnSpc>
+                        <a:spcAft>
+                          <a:spcPts val="800"/>
+                        </a:spcAft>
+                      </a:pPr>
+                      <a:r>
+                        <a:rPr lang="en-GB" sz="1600" b="0">
+                          <a:effectLst/>
+                          <a:latin typeface="Calibri" panose="020F0502020204030204" pitchFamily="34" charset="0"/>
+                          <a:ea typeface="Calibri" panose="020F0502020204030204" pitchFamily="34" charset="0"/>
+                          <a:cs typeface="Calibri" panose="020F0502020204030204" pitchFamily="34" charset="0"/>
+                        </a:rPr>
+                        <a:t>Feeling unwell</a:t>
+                      </a:r>
+                      <a:endParaRPr lang="en-GB" sz="2000" b="0">
+                        <a:effectLst/>
+                        <a:latin typeface="Calibri" panose="020F0502020204030204" pitchFamily="34" charset="0"/>
+                        <a:ea typeface="Calibri" panose="020F0502020204030204" pitchFamily="34" charset="0"/>
+                        <a:cs typeface="Calibri" panose="020F0502020204030204" pitchFamily="34" charset="0"/>
+                      </a:endParaRPr>
+                    </a:p>
+                  </a:txBody>
+                  <a:tcPr marL="68580" marR="68580" marT="0" marB="0">
+                    <a:lnL w="12700" cap="flat" cmpd="sng" algn="ctr">
+                      <a:solidFill>
+                        <a:srgbClr val="8EAADB"/>
+                      </a:solidFill>
+                      <a:prstDash val="solid"/>
+                      <a:round/>
+                      <a:headEnd type="none" w="med" len="med"/>
+                      <a:tailEnd type="none" w="med" len="med"/>
+                    </a:lnL>
+                    <a:lnR w="12700" cap="flat" cmpd="sng" algn="ctr">
+                      <a:solidFill>
+                        <a:srgbClr val="8EAADB"/>
+                      </a:solidFill>
+                      <a:prstDash val="solid"/>
+                      <a:round/>
+                      <a:headEnd type="none" w="med" len="med"/>
+                      <a:tailEnd type="none" w="med" len="med"/>
+                    </a:lnR>
+                    <a:lnT w="12700" cap="flat" cmpd="sng" algn="ctr">
+                      <a:solidFill>
+                        <a:srgbClr val="8EAADB"/>
+                      </a:solidFill>
+                      <a:prstDash val="solid"/>
+                      <a:round/>
+                      <a:headEnd type="none" w="med" len="med"/>
+                      <a:tailEnd type="none" w="med" len="med"/>
+                    </a:lnT>
+                    <a:lnB w="12700" cap="flat" cmpd="sng" algn="ctr">
+                      <a:solidFill>
+                        <a:srgbClr val="8EAADB"/>
+                      </a:solidFill>
+                      <a:prstDash val="solid"/>
+                      <a:round/>
+                      <a:headEnd type="none" w="med" len="med"/>
+                      <a:tailEnd type="none" w="med" len="med"/>
+                    </a:lnB>
+                  </a:tcPr>
+                </a:tc>
+                <a:extLst>
+                  <a:ext uri="{0D108BD9-81ED-4DB2-BD59-A6C34878D82A}">
+                    <a16:rowId xmlns:a16="http://schemas.microsoft.com/office/drawing/2014/main" val="2665739776"/>
+                  </a:ext>
+                </a:extLst>
+              </a:tr>
+              <a:tr h="434676">
+                <a:tc>
+                  <a:txBody>
+                    <a:bodyPr/>
+                    <a:lstStyle/>
+                    <a:p>
+                      <a:pPr>
+                        <a:lnSpc>
+                          <a:spcPct val="107000"/>
+                        </a:lnSpc>
+                        <a:spcAft>
+                          <a:spcPts val="800"/>
+                        </a:spcAft>
+                      </a:pPr>
+                      <a:r>
+                        <a:rPr lang="en-GB" sz="1600" b="0" dirty="0">
+                          <a:solidFill>
+                            <a:srgbClr val="000000"/>
+                          </a:solidFill>
+                          <a:effectLst/>
+                          <a:latin typeface="Calibri" panose="020F0502020204030204" pitchFamily="34" charset="0"/>
+                          <a:ea typeface="Calibri" panose="020F0502020204030204" pitchFamily="34" charset="0"/>
+                          <a:cs typeface="Calibri" panose="020F0502020204030204" pitchFamily="34" charset="0"/>
+                        </a:rPr>
+                        <a:t>103</a:t>
+                      </a:r>
+                      <a:endParaRPr lang="en-GB" sz="2000" b="0" dirty="0">
+                        <a:effectLst/>
+                        <a:latin typeface="Calibri" panose="020F0502020204030204" pitchFamily="34" charset="0"/>
+                        <a:ea typeface="Calibri" panose="020F0502020204030204" pitchFamily="34" charset="0"/>
+                        <a:cs typeface="Calibri" panose="020F0502020204030204" pitchFamily="34" charset="0"/>
+                      </a:endParaRPr>
+                    </a:p>
+                  </a:txBody>
+                  <a:tcPr marL="68580" marR="68580" marT="0" marB="0">
+                    <a:lnL w="12700" cap="flat" cmpd="sng" algn="ctr">
+                      <a:solidFill>
+                        <a:srgbClr val="8EAADB"/>
+                      </a:solidFill>
+                      <a:prstDash val="solid"/>
+                      <a:round/>
+                      <a:headEnd type="none" w="med" len="med"/>
+                      <a:tailEnd type="none" w="med" len="med"/>
+                    </a:lnL>
+                    <a:lnR w="12700" cap="flat" cmpd="sng" algn="ctr">
+                      <a:solidFill>
+                        <a:srgbClr val="8EAADB"/>
+                      </a:solidFill>
+                      <a:prstDash val="solid"/>
+                      <a:round/>
+                      <a:headEnd type="none" w="med" len="med"/>
+                      <a:tailEnd type="none" w="med" len="med"/>
+                    </a:lnR>
+                    <a:lnT w="12700" cap="flat" cmpd="sng" algn="ctr">
+                      <a:solidFill>
+                        <a:srgbClr val="8EAADB"/>
+                      </a:solidFill>
+                      <a:prstDash val="solid"/>
+                      <a:round/>
+                      <a:headEnd type="none" w="med" len="med"/>
+                      <a:tailEnd type="none" w="med" len="med"/>
+                    </a:lnT>
+                    <a:lnB w="12700" cap="flat" cmpd="sng" algn="ctr">
+                      <a:solidFill>
+                        <a:srgbClr val="8EAADB"/>
+                      </a:solidFill>
+                      <a:prstDash val="solid"/>
+                      <a:round/>
+                      <a:headEnd type="none" w="med" len="med"/>
+                      <a:tailEnd type="none" w="med" len="med"/>
+                    </a:lnB>
+                    <a:solidFill>
+                      <a:srgbClr val="D9E2F3"/>
+                    </a:solidFill>
+                  </a:tcPr>
+                </a:tc>
+                <a:tc>
+                  <a:txBody>
+                    <a:bodyPr/>
+                    <a:lstStyle/>
+                    <a:p>
+                      <a:pPr>
+                        <a:lnSpc>
+                          <a:spcPct val="107000"/>
+                        </a:lnSpc>
+                        <a:spcAft>
+                          <a:spcPts val="800"/>
+                        </a:spcAft>
+                      </a:pPr>
+                      <a:r>
+                        <a:rPr lang="en-GB" sz="1600" b="0" dirty="0">
+                          <a:solidFill>
+                            <a:srgbClr val="000000"/>
+                          </a:solidFill>
+                          <a:effectLst/>
+                          <a:latin typeface="Calibri" panose="020F0502020204030204" pitchFamily="34" charset="0"/>
+                          <a:ea typeface="Calibri" panose="020F0502020204030204" pitchFamily="34" charset="0"/>
+                          <a:cs typeface="Calibri" panose="020F0502020204030204" pitchFamily="34" charset="0"/>
+                        </a:rPr>
+                        <a:t>Unwilling to remove contact lenses</a:t>
+                      </a:r>
+                      <a:endParaRPr lang="en-GB" sz="2000" b="0" dirty="0">
+                        <a:effectLst/>
+                        <a:latin typeface="Calibri" panose="020F0502020204030204" pitchFamily="34" charset="0"/>
+                        <a:ea typeface="Calibri" panose="020F0502020204030204" pitchFamily="34" charset="0"/>
+                        <a:cs typeface="Calibri" panose="020F0502020204030204" pitchFamily="34" charset="0"/>
+                      </a:endParaRPr>
+                    </a:p>
+                  </a:txBody>
+                  <a:tcPr marL="68580" marR="68580" marT="0" marB="0">
+                    <a:lnL w="12700" cap="flat" cmpd="sng" algn="ctr">
+                      <a:solidFill>
+                        <a:srgbClr val="8EAADB"/>
+                      </a:solidFill>
+                      <a:prstDash val="solid"/>
+                      <a:round/>
+                      <a:headEnd type="none" w="med" len="med"/>
+                      <a:tailEnd type="none" w="med" len="med"/>
+                    </a:lnL>
+                    <a:lnR w="12700" cap="flat" cmpd="sng" algn="ctr">
+                      <a:solidFill>
+                        <a:srgbClr val="8EAADB"/>
+                      </a:solidFill>
+                      <a:prstDash val="solid"/>
+                      <a:round/>
+                      <a:headEnd type="none" w="med" len="med"/>
+                      <a:tailEnd type="none" w="med" len="med"/>
+                    </a:lnR>
+                    <a:lnT w="12700" cap="flat" cmpd="sng" algn="ctr">
+                      <a:solidFill>
+                        <a:srgbClr val="8EAADB"/>
+                      </a:solidFill>
+                      <a:prstDash val="solid"/>
+                      <a:round/>
+                      <a:headEnd type="none" w="med" len="med"/>
+                      <a:tailEnd type="none" w="med" len="med"/>
+                    </a:lnT>
+                    <a:lnB w="12700" cap="flat" cmpd="sng" algn="ctr">
+                      <a:solidFill>
+                        <a:srgbClr val="8EAADB"/>
+                      </a:solidFill>
+                      <a:prstDash val="solid"/>
+                      <a:round/>
+                      <a:headEnd type="none" w="med" len="med"/>
+                      <a:tailEnd type="none" w="med" len="med"/>
+                    </a:lnB>
+                    <a:solidFill>
+                      <a:srgbClr val="D9E2F3"/>
+                    </a:solidFill>
+                  </a:tcPr>
+                </a:tc>
+                <a:extLst>
+                  <a:ext uri="{0D108BD9-81ED-4DB2-BD59-A6C34878D82A}">
+                    <a16:rowId xmlns:a16="http://schemas.microsoft.com/office/drawing/2014/main" val="1753351066"/>
+                  </a:ext>
+                </a:extLst>
+              </a:tr>
+              <a:tr h="483672">
+                <a:tc>
+                  <a:txBody>
+                    <a:bodyPr/>
+                    <a:lstStyle/>
+                    <a:p>
+                      <a:pPr>
+                        <a:lnSpc>
+                          <a:spcPct val="107000"/>
+                        </a:lnSpc>
+                        <a:spcAft>
+                          <a:spcPts val="800"/>
+                        </a:spcAft>
+                      </a:pPr>
+                      <a:r>
+                        <a:rPr lang="en-GB" sz="1600" b="0" dirty="0">
+                          <a:effectLst/>
+                          <a:latin typeface="Calibri" panose="020F0502020204030204" pitchFamily="34" charset="0"/>
+                          <a:ea typeface="Calibri" panose="020F0502020204030204" pitchFamily="34" charset="0"/>
+                          <a:cs typeface="Calibri" panose="020F0502020204030204" pitchFamily="34" charset="0"/>
+                        </a:rPr>
+                        <a:t>200</a:t>
+                      </a:r>
+                      <a:endParaRPr lang="en-GB" sz="2000" b="0" dirty="0">
+                        <a:effectLst/>
+                        <a:latin typeface="Calibri" panose="020F0502020204030204" pitchFamily="34" charset="0"/>
+                        <a:ea typeface="Calibri" panose="020F0502020204030204" pitchFamily="34" charset="0"/>
+                        <a:cs typeface="Calibri" panose="020F0502020204030204" pitchFamily="34" charset="0"/>
+                      </a:endParaRPr>
+                    </a:p>
+                  </a:txBody>
+                  <a:tcPr marL="68580" marR="68580" marT="0" marB="0">
+                    <a:lnL w="12700" cap="flat" cmpd="sng" algn="ctr">
+                      <a:solidFill>
+                        <a:srgbClr val="8EAADB"/>
+                      </a:solidFill>
+                      <a:prstDash val="solid"/>
+                      <a:round/>
+                      <a:headEnd type="none" w="med" len="med"/>
+                      <a:tailEnd type="none" w="med" len="med"/>
+                    </a:lnL>
+                    <a:lnR w="12700" cap="flat" cmpd="sng" algn="ctr">
+                      <a:solidFill>
+                        <a:srgbClr val="8EAADB"/>
+                      </a:solidFill>
+                      <a:prstDash val="solid"/>
+                      <a:round/>
+                      <a:headEnd type="none" w="med" len="med"/>
+                      <a:tailEnd type="none" w="med" len="med"/>
+                    </a:lnR>
+                    <a:lnT w="12700" cap="flat" cmpd="sng" algn="ctr">
+                      <a:solidFill>
+                        <a:srgbClr val="8EAADB"/>
+                      </a:solidFill>
+                      <a:prstDash val="solid"/>
+                      <a:round/>
+                      <a:headEnd type="none" w="med" len="med"/>
+                      <a:tailEnd type="none" w="med" len="med"/>
+                    </a:lnT>
+                    <a:lnB w="12700" cap="flat" cmpd="sng" algn="ctr">
+                      <a:solidFill>
+                        <a:srgbClr val="8EAADB"/>
+                      </a:solidFill>
+                      <a:prstDash val="solid"/>
+                      <a:round/>
+                      <a:headEnd type="none" w="med" len="med"/>
+                      <a:tailEnd type="none" w="med" len="med"/>
+                    </a:lnB>
+                  </a:tcPr>
+                </a:tc>
+                <a:tc>
+                  <a:txBody>
+                    <a:bodyPr/>
+                    <a:lstStyle/>
+                    <a:p>
+                      <a:pPr>
+                        <a:lnSpc>
+                          <a:spcPct val="107000"/>
+                        </a:lnSpc>
+                        <a:spcAft>
+                          <a:spcPts val="800"/>
+                        </a:spcAft>
+                      </a:pPr>
+                      <a:r>
+                        <a:rPr lang="en-GB" sz="1600" b="0">
+                          <a:effectLst/>
+                          <a:latin typeface="Calibri" panose="020F0502020204030204" pitchFamily="34" charset="0"/>
+                          <a:ea typeface="Calibri" panose="020F0502020204030204" pitchFamily="34" charset="0"/>
+                          <a:cs typeface="Calibri" panose="020F0502020204030204" pitchFamily="34" charset="0"/>
+                        </a:rPr>
+                        <a:t>Equipment unavailable or malfunction</a:t>
+                      </a:r>
+                      <a:endParaRPr lang="en-GB" sz="2000" b="0">
+                        <a:effectLst/>
+                        <a:latin typeface="Calibri" panose="020F0502020204030204" pitchFamily="34" charset="0"/>
+                        <a:ea typeface="Calibri" panose="020F0502020204030204" pitchFamily="34" charset="0"/>
+                        <a:cs typeface="Calibri" panose="020F0502020204030204" pitchFamily="34" charset="0"/>
+                      </a:endParaRPr>
+                    </a:p>
+                  </a:txBody>
+                  <a:tcPr marL="68580" marR="68580" marT="0" marB="0">
+                    <a:lnL w="12700" cap="flat" cmpd="sng" algn="ctr">
+                      <a:solidFill>
+                        <a:srgbClr val="8EAADB"/>
+                      </a:solidFill>
+                      <a:prstDash val="solid"/>
+                      <a:round/>
+                      <a:headEnd type="none" w="med" len="med"/>
+                      <a:tailEnd type="none" w="med" len="med"/>
+                    </a:lnL>
+                    <a:lnR w="12700" cap="flat" cmpd="sng" algn="ctr">
+                      <a:solidFill>
+                        <a:srgbClr val="8EAADB"/>
+                      </a:solidFill>
+                      <a:prstDash val="solid"/>
+                      <a:round/>
+                      <a:headEnd type="none" w="med" len="med"/>
+                      <a:tailEnd type="none" w="med" len="med"/>
+                    </a:lnR>
+                    <a:lnT w="12700" cap="flat" cmpd="sng" algn="ctr">
+                      <a:solidFill>
+                        <a:srgbClr val="8EAADB"/>
+                      </a:solidFill>
+                      <a:prstDash val="solid"/>
+                      <a:round/>
+                      <a:headEnd type="none" w="med" len="med"/>
+                      <a:tailEnd type="none" w="med" len="med"/>
+                    </a:lnT>
+                    <a:lnB w="12700" cap="flat" cmpd="sng" algn="ctr">
+                      <a:solidFill>
+                        <a:srgbClr val="8EAADB"/>
+                      </a:solidFill>
+                      <a:prstDash val="solid"/>
+                      <a:round/>
+                      <a:headEnd type="none" w="med" len="med"/>
+                      <a:tailEnd type="none" w="med" len="med"/>
+                    </a:lnB>
+                  </a:tcPr>
+                </a:tc>
+                <a:extLst>
+                  <a:ext uri="{0D108BD9-81ED-4DB2-BD59-A6C34878D82A}">
+                    <a16:rowId xmlns:a16="http://schemas.microsoft.com/office/drawing/2014/main" val="3072087549"/>
+                  </a:ext>
+                </a:extLst>
+              </a:tr>
+              <a:tr h="434676">
+                <a:tc>
+                  <a:txBody>
+                    <a:bodyPr/>
+                    <a:lstStyle/>
+                    <a:p>
+                      <a:pPr>
+                        <a:lnSpc>
+                          <a:spcPct val="107000"/>
+                        </a:lnSpc>
+                        <a:spcAft>
+                          <a:spcPts val="800"/>
+                        </a:spcAft>
+                      </a:pPr>
+                      <a:r>
+                        <a:rPr lang="en-GB" sz="1600" b="0" dirty="0">
+                          <a:solidFill>
+                            <a:srgbClr val="000000"/>
+                          </a:solidFill>
+                          <a:effectLst/>
+                          <a:latin typeface="Calibri" panose="020F0502020204030204" pitchFamily="34" charset="0"/>
+                          <a:ea typeface="Calibri" panose="020F0502020204030204" pitchFamily="34" charset="0"/>
+                          <a:cs typeface="Calibri" panose="020F0502020204030204" pitchFamily="34" charset="0"/>
+                        </a:rPr>
+                        <a:t>401</a:t>
+                      </a:r>
+                      <a:endParaRPr lang="en-GB" sz="2000" b="0" dirty="0">
+                        <a:effectLst/>
+                        <a:latin typeface="Calibri" panose="020F0502020204030204" pitchFamily="34" charset="0"/>
+                        <a:ea typeface="Calibri" panose="020F0502020204030204" pitchFamily="34" charset="0"/>
+                        <a:cs typeface="Calibri" panose="020F0502020204030204" pitchFamily="34" charset="0"/>
+                      </a:endParaRPr>
+                    </a:p>
+                  </a:txBody>
+                  <a:tcPr marL="68580" marR="68580" marT="0" marB="0">
+                    <a:lnL w="12700" cap="flat" cmpd="sng" algn="ctr">
+                      <a:solidFill>
+                        <a:srgbClr val="8EAADB"/>
+                      </a:solidFill>
+                      <a:prstDash val="solid"/>
+                      <a:round/>
+                      <a:headEnd type="none" w="med" len="med"/>
+                      <a:tailEnd type="none" w="med" len="med"/>
+                    </a:lnL>
+                    <a:lnR w="12700" cap="flat" cmpd="sng" algn="ctr">
+                      <a:solidFill>
+                        <a:srgbClr val="8EAADB"/>
+                      </a:solidFill>
+                      <a:prstDash val="solid"/>
+                      <a:round/>
+                      <a:headEnd type="none" w="med" len="med"/>
+                      <a:tailEnd type="none" w="med" len="med"/>
+                    </a:lnR>
+                    <a:lnT w="12700" cap="flat" cmpd="sng" algn="ctr">
+                      <a:solidFill>
+                        <a:srgbClr val="8EAADB"/>
+                      </a:solidFill>
+                      <a:prstDash val="solid"/>
+                      <a:round/>
+                      <a:headEnd type="none" w="med" len="med"/>
+                      <a:tailEnd type="none" w="med" len="med"/>
+                    </a:lnT>
+                    <a:lnB w="12700" cap="flat" cmpd="sng" algn="ctr">
+                      <a:solidFill>
+                        <a:srgbClr val="8EAADB"/>
+                      </a:solidFill>
+                      <a:prstDash val="solid"/>
+                      <a:round/>
+                      <a:headEnd type="none" w="med" len="med"/>
+                      <a:tailEnd type="none" w="med" len="med"/>
+                    </a:lnB>
+                    <a:solidFill>
+                      <a:srgbClr val="D9E2F3"/>
+                    </a:solidFill>
+                  </a:tcPr>
+                </a:tc>
+                <a:tc>
+                  <a:txBody>
+                    <a:bodyPr/>
+                    <a:lstStyle/>
+                    <a:p>
+                      <a:pPr>
+                        <a:lnSpc>
+                          <a:spcPct val="107000"/>
+                        </a:lnSpc>
+                        <a:spcAft>
+                          <a:spcPts val="800"/>
+                        </a:spcAft>
+                      </a:pPr>
+                      <a:r>
+                        <a:rPr lang="en-GB" sz="1600" b="0" dirty="0">
+                          <a:solidFill>
+                            <a:srgbClr val="000000"/>
+                          </a:solidFill>
+                          <a:effectLst/>
+                          <a:latin typeface="Calibri" panose="020F0502020204030204" pitchFamily="34" charset="0"/>
+                          <a:ea typeface="Calibri" panose="020F0502020204030204" pitchFamily="34" charset="0"/>
+                          <a:cs typeface="Calibri" panose="020F0502020204030204" pitchFamily="34" charset="0"/>
+                        </a:rPr>
+                        <a:t>Physically unable or outside specs</a:t>
+                      </a:r>
+                      <a:endParaRPr lang="en-GB" sz="2000" b="0" dirty="0">
+                        <a:effectLst/>
+                        <a:latin typeface="Calibri" panose="020F0502020204030204" pitchFamily="34" charset="0"/>
+                        <a:ea typeface="Calibri" panose="020F0502020204030204" pitchFamily="34" charset="0"/>
+                        <a:cs typeface="Calibri" panose="020F0502020204030204" pitchFamily="34" charset="0"/>
+                      </a:endParaRPr>
+                    </a:p>
+                  </a:txBody>
+                  <a:tcPr marL="68580" marR="68580" marT="0" marB="0">
+                    <a:lnL w="12700" cap="flat" cmpd="sng" algn="ctr">
+                      <a:solidFill>
+                        <a:srgbClr val="8EAADB"/>
+                      </a:solidFill>
+                      <a:prstDash val="solid"/>
+                      <a:round/>
+                      <a:headEnd type="none" w="med" len="med"/>
+                      <a:tailEnd type="none" w="med" len="med"/>
+                    </a:lnL>
+                    <a:lnR w="12700" cap="flat" cmpd="sng" algn="ctr">
+                      <a:solidFill>
+                        <a:srgbClr val="8EAADB"/>
+                      </a:solidFill>
+                      <a:prstDash val="solid"/>
+                      <a:round/>
+                      <a:headEnd type="none" w="med" len="med"/>
+                      <a:tailEnd type="none" w="med" len="med"/>
+                    </a:lnR>
+                    <a:lnT w="12700" cap="flat" cmpd="sng" algn="ctr">
+                      <a:solidFill>
+                        <a:srgbClr val="8EAADB"/>
+                      </a:solidFill>
+                      <a:prstDash val="solid"/>
+                      <a:round/>
+                      <a:headEnd type="none" w="med" len="med"/>
+                      <a:tailEnd type="none" w="med" len="med"/>
+                    </a:lnT>
+                    <a:lnB w="12700" cap="flat" cmpd="sng" algn="ctr">
+                      <a:solidFill>
+                        <a:srgbClr val="8EAADB"/>
+                      </a:solidFill>
+                      <a:prstDash val="solid"/>
+                      <a:round/>
+                      <a:headEnd type="none" w="med" len="med"/>
+                      <a:tailEnd type="none" w="med" len="med"/>
+                    </a:lnB>
+                    <a:solidFill>
+                      <a:srgbClr val="D9E2F3"/>
+                    </a:solidFill>
+                  </a:tcPr>
+                </a:tc>
+                <a:extLst>
+                  <a:ext uri="{0D108BD9-81ED-4DB2-BD59-A6C34878D82A}">
+                    <a16:rowId xmlns:a16="http://schemas.microsoft.com/office/drawing/2014/main" val="2079763438"/>
+                  </a:ext>
+                </a:extLst>
+              </a:tr>
+              <a:tr h="236328">
+                <a:tc>
+                  <a:txBody>
+                    <a:bodyPr/>
+                    <a:lstStyle/>
+                    <a:p>
+                      <a:pPr>
+                        <a:lnSpc>
+                          <a:spcPct val="107000"/>
+                        </a:lnSpc>
+                        <a:spcAft>
+                          <a:spcPts val="800"/>
+                        </a:spcAft>
+                      </a:pPr>
+                      <a:r>
+                        <a:rPr lang="en-GB" sz="1600" b="0">
+                          <a:effectLst/>
+                          <a:latin typeface="Calibri" panose="020F0502020204030204" pitchFamily="34" charset="0"/>
+                          <a:ea typeface="Calibri" panose="020F0502020204030204" pitchFamily="34" charset="0"/>
+                          <a:cs typeface="Calibri" panose="020F0502020204030204" pitchFamily="34" charset="0"/>
+                        </a:rPr>
+                        <a:t>402</a:t>
+                      </a:r>
+                      <a:endParaRPr lang="en-GB" sz="2000" b="0">
+                        <a:effectLst/>
+                        <a:latin typeface="Calibri" panose="020F0502020204030204" pitchFamily="34" charset="0"/>
+                        <a:ea typeface="Calibri" panose="020F0502020204030204" pitchFamily="34" charset="0"/>
+                        <a:cs typeface="Calibri" panose="020F0502020204030204" pitchFamily="34" charset="0"/>
+                      </a:endParaRPr>
+                    </a:p>
+                  </a:txBody>
+                  <a:tcPr marL="68580" marR="68580" marT="0" marB="0">
+                    <a:lnL w="12700" cap="flat" cmpd="sng" algn="ctr">
+                      <a:solidFill>
+                        <a:srgbClr val="8EAADB"/>
+                      </a:solidFill>
+                      <a:prstDash val="solid"/>
+                      <a:round/>
+                      <a:headEnd type="none" w="med" len="med"/>
+                      <a:tailEnd type="none" w="med" len="med"/>
+                    </a:lnL>
+                    <a:lnR w="12700" cap="flat" cmpd="sng" algn="ctr">
+                      <a:solidFill>
+                        <a:srgbClr val="8EAADB"/>
+                      </a:solidFill>
+                      <a:prstDash val="solid"/>
+                      <a:round/>
+                      <a:headEnd type="none" w="med" len="med"/>
+                      <a:tailEnd type="none" w="med" len="med"/>
+                    </a:lnR>
+                    <a:lnT w="12700" cap="flat" cmpd="sng" algn="ctr">
+                      <a:solidFill>
+                        <a:srgbClr val="8EAADB"/>
+                      </a:solidFill>
+                      <a:prstDash val="solid"/>
+                      <a:round/>
+                      <a:headEnd type="none" w="med" len="med"/>
+                      <a:tailEnd type="none" w="med" len="med"/>
+                    </a:lnT>
+                    <a:lnB w="12700" cap="flat" cmpd="sng" algn="ctr">
+                      <a:solidFill>
+                        <a:srgbClr val="8EAADB"/>
+                      </a:solidFill>
+                      <a:prstDash val="solid"/>
+                      <a:round/>
+                      <a:headEnd type="none" w="med" len="med"/>
+                      <a:tailEnd type="none" w="med" len="med"/>
+                    </a:lnB>
+                  </a:tcPr>
+                </a:tc>
+                <a:tc>
+                  <a:txBody>
+                    <a:bodyPr/>
+                    <a:lstStyle/>
+                    <a:p>
+                      <a:pPr>
+                        <a:lnSpc>
+                          <a:spcPct val="107000"/>
+                        </a:lnSpc>
+                        <a:spcAft>
+                          <a:spcPts val="800"/>
+                        </a:spcAft>
+                      </a:pPr>
+                      <a:r>
+                        <a:rPr lang="en-GB" sz="1600" b="0" dirty="0">
+                          <a:effectLst/>
+                          <a:latin typeface="Calibri" panose="020F0502020204030204" pitchFamily="34" charset="0"/>
+                          <a:ea typeface="Calibri" panose="020F0502020204030204" pitchFamily="34" charset="0"/>
+                          <a:cs typeface="Calibri" panose="020F0502020204030204" pitchFamily="34" charset="0"/>
+                        </a:rPr>
+                        <a:t>Amputee</a:t>
+                      </a:r>
+                      <a:endParaRPr lang="en-GB" sz="2000" b="0" dirty="0">
+                        <a:effectLst/>
+                        <a:latin typeface="Calibri" panose="020F0502020204030204" pitchFamily="34" charset="0"/>
+                        <a:ea typeface="Calibri" panose="020F0502020204030204" pitchFamily="34" charset="0"/>
+                        <a:cs typeface="Calibri" panose="020F0502020204030204" pitchFamily="34" charset="0"/>
+                      </a:endParaRPr>
+                    </a:p>
+                  </a:txBody>
+                  <a:tcPr marL="68580" marR="68580" marT="0" marB="0">
+                    <a:lnL w="12700" cap="flat" cmpd="sng" algn="ctr">
+                      <a:solidFill>
+                        <a:srgbClr val="8EAADB"/>
+                      </a:solidFill>
+                      <a:prstDash val="solid"/>
+                      <a:round/>
+                      <a:headEnd type="none" w="med" len="med"/>
+                      <a:tailEnd type="none" w="med" len="med"/>
+                    </a:lnL>
+                    <a:lnR w="12700" cap="flat" cmpd="sng" algn="ctr">
+                      <a:solidFill>
+                        <a:srgbClr val="8EAADB"/>
+                      </a:solidFill>
+                      <a:prstDash val="solid"/>
+                      <a:round/>
+                      <a:headEnd type="none" w="med" len="med"/>
+                      <a:tailEnd type="none" w="med" len="med"/>
+                    </a:lnR>
+                    <a:lnT w="12700" cap="flat" cmpd="sng" algn="ctr">
+                      <a:solidFill>
+                        <a:srgbClr val="8EAADB"/>
+                      </a:solidFill>
+                      <a:prstDash val="solid"/>
+                      <a:round/>
+                      <a:headEnd type="none" w="med" len="med"/>
+                      <a:tailEnd type="none" w="med" len="med"/>
+                    </a:lnT>
+                    <a:lnB w="12700" cap="flat" cmpd="sng" algn="ctr">
+                      <a:solidFill>
+                        <a:srgbClr val="8EAADB"/>
+                      </a:solidFill>
+                      <a:prstDash val="solid"/>
+                      <a:round/>
+                      <a:headEnd type="none" w="med" len="med"/>
+                      <a:tailEnd type="none" w="med" len="med"/>
+                    </a:lnB>
+                  </a:tcPr>
+                </a:tc>
+                <a:extLst>
+                  <a:ext uri="{0D108BD9-81ED-4DB2-BD59-A6C34878D82A}">
+                    <a16:rowId xmlns:a16="http://schemas.microsoft.com/office/drawing/2014/main" val="2580800192"/>
+                  </a:ext>
+                </a:extLst>
+              </a:tr>
+              <a:tr h="236328">
+                <a:tc>
+                  <a:txBody>
+                    <a:bodyPr/>
+                    <a:lstStyle/>
+                    <a:p>
+                      <a:pPr>
+                        <a:lnSpc>
+                          <a:spcPct val="107000"/>
+                        </a:lnSpc>
+                        <a:spcAft>
+                          <a:spcPts val="800"/>
+                        </a:spcAft>
+                      </a:pPr>
+                      <a:r>
+                        <a:rPr lang="en-GB" sz="1600" b="0">
+                          <a:solidFill>
+                            <a:srgbClr val="000000"/>
+                          </a:solidFill>
+                          <a:effectLst/>
+                          <a:latin typeface="Calibri" panose="020F0502020204030204" pitchFamily="34" charset="0"/>
+                          <a:ea typeface="Calibri" panose="020F0502020204030204" pitchFamily="34" charset="0"/>
+                          <a:cs typeface="Calibri" panose="020F0502020204030204" pitchFamily="34" charset="0"/>
+                        </a:rPr>
+                        <a:t>403</a:t>
+                      </a:r>
+                      <a:endParaRPr lang="en-GB" sz="2000" b="0">
+                        <a:effectLst/>
+                        <a:latin typeface="Calibri" panose="020F0502020204030204" pitchFamily="34" charset="0"/>
+                        <a:ea typeface="Calibri" panose="020F0502020204030204" pitchFamily="34" charset="0"/>
+                        <a:cs typeface="Calibri" panose="020F0502020204030204" pitchFamily="34" charset="0"/>
+                      </a:endParaRPr>
+                    </a:p>
+                  </a:txBody>
+                  <a:tcPr marL="68580" marR="68580" marT="0" marB="0">
+                    <a:lnL w="12700" cap="flat" cmpd="sng" algn="ctr">
+                      <a:solidFill>
+                        <a:srgbClr val="8EAADB"/>
+                      </a:solidFill>
+                      <a:prstDash val="solid"/>
+                      <a:round/>
+                      <a:headEnd type="none" w="med" len="med"/>
+                      <a:tailEnd type="none" w="med" len="med"/>
+                    </a:lnL>
+                    <a:lnR w="12700" cap="flat" cmpd="sng" algn="ctr">
+                      <a:solidFill>
+                        <a:srgbClr val="8EAADB"/>
+                      </a:solidFill>
+                      <a:prstDash val="solid"/>
+                      <a:round/>
+                      <a:headEnd type="none" w="med" len="med"/>
+                      <a:tailEnd type="none" w="med" len="med"/>
+                    </a:lnR>
+                    <a:lnT w="12700" cap="flat" cmpd="sng" algn="ctr">
+                      <a:solidFill>
+                        <a:srgbClr val="8EAADB"/>
+                      </a:solidFill>
+                      <a:prstDash val="solid"/>
+                      <a:round/>
+                      <a:headEnd type="none" w="med" len="med"/>
+                      <a:tailEnd type="none" w="med" len="med"/>
+                    </a:lnT>
+                    <a:lnB w="12700" cap="flat" cmpd="sng" algn="ctr">
+                      <a:solidFill>
+                        <a:srgbClr val="8EAADB"/>
+                      </a:solidFill>
+                      <a:prstDash val="solid"/>
+                      <a:round/>
+                      <a:headEnd type="none" w="med" len="med"/>
+                      <a:tailEnd type="none" w="med" len="med"/>
+                    </a:lnB>
+                    <a:solidFill>
+                      <a:srgbClr val="D9E2F3"/>
+                    </a:solidFill>
+                  </a:tcPr>
+                </a:tc>
+                <a:tc>
+                  <a:txBody>
+                    <a:bodyPr/>
+                    <a:lstStyle/>
+                    <a:p>
+                      <a:pPr>
+                        <a:lnSpc>
+                          <a:spcPct val="107000"/>
+                        </a:lnSpc>
+                        <a:spcAft>
+                          <a:spcPts val="800"/>
+                        </a:spcAft>
+                      </a:pPr>
+                      <a:r>
+                        <a:rPr lang="en-GB" sz="1600" b="0" dirty="0">
+                          <a:solidFill>
+                            <a:srgbClr val="000000"/>
+                          </a:solidFill>
+                          <a:effectLst/>
+                          <a:latin typeface="Calibri" panose="020F0502020204030204" pitchFamily="34" charset="0"/>
+                          <a:ea typeface="Calibri" panose="020F0502020204030204" pitchFamily="34" charset="0"/>
+                          <a:cs typeface="Calibri" panose="020F0502020204030204" pitchFamily="34" charset="0"/>
+                        </a:rPr>
+                        <a:t>Limb injury</a:t>
+                      </a:r>
+                      <a:endParaRPr lang="en-GB" sz="2000" b="0" dirty="0">
+                        <a:effectLst/>
+                        <a:latin typeface="Calibri" panose="020F0502020204030204" pitchFamily="34" charset="0"/>
+                        <a:ea typeface="Calibri" panose="020F0502020204030204" pitchFamily="34" charset="0"/>
+                        <a:cs typeface="Calibri" panose="020F0502020204030204" pitchFamily="34" charset="0"/>
+                      </a:endParaRPr>
+                    </a:p>
+                  </a:txBody>
+                  <a:tcPr marL="68580" marR="68580" marT="0" marB="0">
+                    <a:lnL w="12700" cap="flat" cmpd="sng" algn="ctr">
+                      <a:solidFill>
+                        <a:srgbClr val="8EAADB"/>
+                      </a:solidFill>
+                      <a:prstDash val="solid"/>
+                      <a:round/>
+                      <a:headEnd type="none" w="med" len="med"/>
+                      <a:tailEnd type="none" w="med" len="med"/>
+                    </a:lnL>
+                    <a:lnR w="12700" cap="flat" cmpd="sng" algn="ctr">
+                      <a:solidFill>
+                        <a:srgbClr val="8EAADB"/>
+                      </a:solidFill>
+                      <a:prstDash val="solid"/>
+                      <a:round/>
+                      <a:headEnd type="none" w="med" len="med"/>
+                      <a:tailEnd type="none" w="med" len="med"/>
+                    </a:lnR>
+                    <a:lnT w="12700" cap="flat" cmpd="sng" algn="ctr">
+                      <a:solidFill>
+                        <a:srgbClr val="8EAADB"/>
+                      </a:solidFill>
+                      <a:prstDash val="solid"/>
+                      <a:round/>
+                      <a:headEnd type="none" w="med" len="med"/>
+                      <a:tailEnd type="none" w="med" len="med"/>
+                    </a:lnT>
+                    <a:lnB w="12700" cap="flat" cmpd="sng" algn="ctr">
+                      <a:solidFill>
+                        <a:srgbClr val="8EAADB"/>
+                      </a:solidFill>
+                      <a:prstDash val="solid"/>
+                      <a:round/>
+                      <a:headEnd type="none" w="med" len="med"/>
+                      <a:tailEnd type="none" w="med" len="med"/>
+                    </a:lnB>
+                    <a:solidFill>
+                      <a:srgbClr val="D9E2F3"/>
+                    </a:solidFill>
+                  </a:tcPr>
+                </a:tc>
+                <a:extLst>
+                  <a:ext uri="{0D108BD9-81ED-4DB2-BD59-A6C34878D82A}">
+                    <a16:rowId xmlns:a16="http://schemas.microsoft.com/office/drawing/2014/main" val="1568819811"/>
+                  </a:ext>
+                </a:extLst>
+              </a:tr>
+              <a:tr h="236328">
+                <a:tc>
+                  <a:txBody>
+                    <a:bodyPr/>
+                    <a:lstStyle/>
+                    <a:p>
+                      <a:pPr>
+                        <a:lnSpc>
+                          <a:spcPct val="107000"/>
+                        </a:lnSpc>
+                        <a:spcAft>
+                          <a:spcPts val="800"/>
+                        </a:spcAft>
+                      </a:pPr>
+                      <a:r>
+                        <a:rPr lang="en-GB" sz="1600" b="0">
+                          <a:effectLst/>
+                          <a:latin typeface="Calibri" panose="020F0502020204030204" pitchFamily="34" charset="0"/>
+                          <a:ea typeface="Calibri" panose="020F0502020204030204" pitchFamily="34" charset="0"/>
+                          <a:cs typeface="Calibri" panose="020F0502020204030204" pitchFamily="34" charset="0"/>
+                        </a:rPr>
+                        <a:t>etc …</a:t>
+                      </a:r>
+                      <a:endParaRPr lang="en-GB" sz="2000" b="0">
+                        <a:effectLst/>
+                        <a:latin typeface="Calibri" panose="020F0502020204030204" pitchFamily="34" charset="0"/>
+                        <a:ea typeface="Calibri" panose="020F0502020204030204" pitchFamily="34" charset="0"/>
+                        <a:cs typeface="Calibri" panose="020F0502020204030204" pitchFamily="34" charset="0"/>
+                      </a:endParaRPr>
+                    </a:p>
+                  </a:txBody>
+                  <a:tcPr marL="68580" marR="68580" marT="0" marB="0">
+                    <a:lnL w="12700" cap="flat" cmpd="sng" algn="ctr">
+                      <a:solidFill>
+                        <a:srgbClr val="8EAADB"/>
+                      </a:solidFill>
+                      <a:prstDash val="solid"/>
+                      <a:round/>
+                      <a:headEnd type="none" w="med" len="med"/>
+                      <a:tailEnd type="none" w="med" len="med"/>
+                    </a:lnL>
+                    <a:lnR w="12700" cap="flat" cmpd="sng" algn="ctr">
+                      <a:solidFill>
+                        <a:srgbClr val="8EAADB"/>
+                      </a:solidFill>
+                      <a:prstDash val="solid"/>
+                      <a:round/>
+                      <a:headEnd type="none" w="med" len="med"/>
+                      <a:tailEnd type="none" w="med" len="med"/>
+                    </a:lnR>
+                    <a:lnT w="12700" cap="flat" cmpd="sng" algn="ctr">
+                      <a:solidFill>
+                        <a:srgbClr val="8EAADB"/>
+                      </a:solidFill>
+                      <a:prstDash val="solid"/>
+                      <a:round/>
+                      <a:headEnd type="none" w="med" len="med"/>
+                      <a:tailEnd type="none" w="med" len="med"/>
+                    </a:lnT>
+                    <a:lnB w="12700" cap="flat" cmpd="sng" algn="ctr">
+                      <a:solidFill>
+                        <a:srgbClr val="8EAADB"/>
+                      </a:solidFill>
+                      <a:prstDash val="solid"/>
+                      <a:round/>
+                      <a:headEnd type="none" w="med" len="med"/>
+                      <a:tailEnd type="none" w="med" len="med"/>
+                    </a:lnB>
+                  </a:tcPr>
+                </a:tc>
+                <a:tc>
+                  <a:txBody>
+                    <a:bodyPr/>
+                    <a:lstStyle/>
+                    <a:p>
+                      <a:pPr>
+                        <a:lnSpc>
+                          <a:spcPct val="107000"/>
+                        </a:lnSpc>
+                        <a:spcAft>
+                          <a:spcPts val="800"/>
+                        </a:spcAft>
+                      </a:pPr>
+                      <a:r>
+                        <a:rPr lang="en-GB" sz="1600" b="0" dirty="0">
+                          <a:effectLst/>
+                          <a:latin typeface="Calibri" panose="020F0502020204030204" pitchFamily="34" charset="0"/>
+                          <a:ea typeface="Calibri" panose="020F0502020204030204" pitchFamily="34" charset="0"/>
+                          <a:cs typeface="Calibri" panose="020F0502020204030204" pitchFamily="34" charset="0"/>
+                        </a:rPr>
+                        <a:t> </a:t>
+                      </a:r>
+                      <a:endParaRPr lang="en-GB" sz="2000" b="0" dirty="0">
+                        <a:effectLst/>
+                        <a:latin typeface="Calibri" panose="020F0502020204030204" pitchFamily="34" charset="0"/>
+                        <a:ea typeface="Calibri" panose="020F0502020204030204" pitchFamily="34" charset="0"/>
+                        <a:cs typeface="Calibri" panose="020F0502020204030204" pitchFamily="34" charset="0"/>
+                      </a:endParaRPr>
+                    </a:p>
+                  </a:txBody>
+                  <a:tcPr marL="68580" marR="68580" marT="0" marB="0">
+                    <a:lnL w="12700" cap="flat" cmpd="sng" algn="ctr">
+                      <a:solidFill>
+                        <a:srgbClr val="8EAADB"/>
+                      </a:solidFill>
+                      <a:prstDash val="solid"/>
+                      <a:round/>
+                      <a:headEnd type="none" w="med" len="med"/>
+                      <a:tailEnd type="none" w="med" len="med"/>
+                    </a:lnL>
+                    <a:lnR w="12700" cap="flat" cmpd="sng" algn="ctr">
+                      <a:solidFill>
+                        <a:srgbClr val="8EAADB"/>
+                      </a:solidFill>
+                      <a:prstDash val="solid"/>
+                      <a:round/>
+                      <a:headEnd type="none" w="med" len="med"/>
+                      <a:tailEnd type="none" w="med" len="med"/>
+                    </a:lnR>
+                    <a:lnT w="12700" cap="flat" cmpd="sng" algn="ctr">
+                      <a:solidFill>
+                        <a:srgbClr val="8EAADB"/>
+                      </a:solidFill>
+                      <a:prstDash val="solid"/>
+                      <a:round/>
+                      <a:headEnd type="none" w="med" len="med"/>
+                      <a:tailEnd type="none" w="med" len="med"/>
+                    </a:lnT>
+                    <a:lnB w="12700" cap="flat" cmpd="sng" algn="ctr">
+                      <a:solidFill>
+                        <a:srgbClr val="8EAADB"/>
+                      </a:solidFill>
+                      <a:prstDash val="solid"/>
+                      <a:round/>
+                      <a:headEnd type="none" w="med" len="med"/>
+                      <a:tailEnd type="none" w="med" len="med"/>
+                    </a:lnB>
+                  </a:tcPr>
+                </a:tc>
+                <a:extLst>
+                  <a:ext uri="{0D108BD9-81ED-4DB2-BD59-A6C34878D82A}">
+                    <a16:rowId xmlns:a16="http://schemas.microsoft.com/office/drawing/2014/main" val="147736201"/>
+                  </a:ext>
+                </a:extLst>
+              </a:tr>
+            </a:tbl>
+          </a:graphicData>
+        </a:graphic>
+      </p:graphicFrame>
     </p:spTree>
     <p:extLst>
       <p:ext uri="{BB962C8B-B14F-4D97-AF65-F5344CB8AC3E}">
@@ -8372,12 +10027,91 @@
           <a:chExt cx="0" cy="0"/>
         </a:xfrm>
       </p:grpSpPr>
+      <p:sp>
+        <p:nvSpPr>
+          <p:cNvPr id="3" name="Content Placeholder 2">
+            <a:extLst>
+              <a:ext uri="{FF2B5EF4-FFF2-40B4-BE49-F238E27FC236}">
+                <a16:creationId xmlns:a16="http://schemas.microsoft.com/office/drawing/2014/main" id="{F595ECD4-2EDF-4530-8EAC-37D37469CED7}"/>
+              </a:ext>
+            </a:extLst>
+          </p:cNvPr>
+          <p:cNvSpPr>
+            <a:spLocks noGrp="1"/>
+          </p:cNvSpPr>
+          <p:nvPr>
+            <p:ph idx="1"/>
+          </p:nvPr>
+        </p:nvSpPr>
+        <p:spPr>
+          <a:xfrm>
+            <a:off x="392854" y="640081"/>
+            <a:ext cx="9696026" cy="2905759"/>
+          </a:xfrm>
+        </p:spPr>
+        <p:txBody>
+          <a:bodyPr>
+            <a:normAutofit/>
+          </a:bodyPr>
+          <a:lstStyle/>
+          <a:p>
+            <a:r>
+              <a:rPr lang="en-GB" sz="2000" b="1" dirty="0"/>
+              <a:t>Aim:</a:t>
+            </a:r>
+            <a:r>
+              <a:rPr lang="en-GB" sz="2000" dirty="0"/>
+              <a:t> build a classification system/model that can label the free-text answers into one of the existing coded categories.</a:t>
+            </a:r>
+          </a:p>
+          <a:p>
+            <a:r>
+              <a:rPr lang="en-GB" b="1" dirty="0"/>
+              <a:t>Process:</a:t>
+            </a:r>
+            <a:endParaRPr lang="en-GB" dirty="0"/>
+          </a:p>
+          <a:p>
+            <a:pPr lvl="1">
+              <a:buFont typeface="+mj-lt"/>
+              <a:buAutoNum type="arabicPeriod"/>
+            </a:pPr>
+            <a:r>
+              <a:rPr lang="en-GB" sz="2000" dirty="0"/>
+              <a:t>Create the corpus of free-text entries (in the data provided I have done the cleaning/pre-processing of the free-text field already)</a:t>
+            </a:r>
+          </a:p>
+          <a:p>
+            <a:pPr lvl="1">
+              <a:buFont typeface="+mj-lt"/>
+              <a:buAutoNum type="arabicPeriod"/>
+            </a:pPr>
+            <a:r>
+              <a:rPr lang="en-GB" sz="2000" dirty="0"/>
+              <a:t>Build the DFM</a:t>
+            </a:r>
+          </a:p>
+          <a:p>
+            <a:pPr lvl="1">
+              <a:buFont typeface="+mj-lt"/>
+              <a:buAutoNum type="arabicPeriod"/>
+            </a:pPr>
+            <a:r>
+              <a:rPr lang="en-GB" sz="2000" dirty="0"/>
+              <a:t>Split data into training and testing datasets</a:t>
+            </a:r>
+          </a:p>
+          <a:p>
+            <a:endParaRPr lang="en-GB" dirty="0"/>
+          </a:p>
+        </p:txBody>
+      </p:sp>
       <p:pic>
         <p:nvPicPr>
-          <p:cNvPr id="3" name="Picture 2">
+          <p:cNvPr id="4" name="Picture 3">
             <a:extLst>
               <a:ext uri="{FF2B5EF4-FFF2-40B4-BE49-F238E27FC236}">
-                <a16:creationId xmlns:a16="http://schemas.microsoft.com/office/drawing/2014/main" id="{D9508101-2653-47D2-8454-AD41671E7475}"/>
+                <a16:creationId xmlns:a16="http://schemas.microsoft.com/office/drawing/2014/main" id="{9EBC5A67-6F12-4788-859C-C8D6912C3939}"/>
               </a:ext>
             </a:extLst>
           </p:cNvPr>
@@ -8394,18 +10128,173 @@
         </p:blipFill>
         <p:spPr>
           <a:xfrm>
-            <a:off x="439299" y="940840"/>
-            <a:ext cx="8878955" cy="4461477"/>
+            <a:off x="5212079" y="3337774"/>
+            <a:ext cx="6744271" cy="3388846"/>
           </a:xfrm>
           <a:prstGeom prst="rect">
             <a:avLst/>
           </a:prstGeom>
         </p:spPr>
       </p:pic>
+      <p:sp>
+        <p:nvSpPr>
+          <p:cNvPr id="5" name="TextBox 4">
+            <a:extLst>
+              <a:ext uri="{FF2B5EF4-FFF2-40B4-BE49-F238E27FC236}">
+                <a16:creationId xmlns:a16="http://schemas.microsoft.com/office/drawing/2014/main" id="{504E77CD-92FA-4642-A610-33C6957CEEE6}"/>
+              </a:ext>
+            </a:extLst>
+          </p:cNvPr>
+          <p:cNvSpPr txBox="1"/>
+          <p:nvPr/>
+        </p:nvSpPr>
+        <p:spPr>
+          <a:xfrm>
+            <a:off x="392854" y="3555999"/>
+            <a:ext cx="4450080" cy="2780248"/>
+          </a:xfrm>
+          <a:prstGeom prst="rect">
+            <a:avLst/>
+          </a:prstGeom>
+          <a:noFill/>
+        </p:spPr>
+        <p:txBody>
+          <a:bodyPr wrap="square" rtlCol="0">
+            <a:spAutoFit/>
+          </a:bodyPr>
+          <a:lstStyle/>
+          <a:p>
+            <a:pPr marL="914400" marR="0" lvl="1" indent="-457200" algn="l" defTabSz="457200" rtl="0" eaLnBrk="1" fontAlgn="auto" latinLnBrk="0" hangingPunct="1">
+              <a:lnSpc>
+                <a:spcPct val="100000"/>
+              </a:lnSpc>
+              <a:spcBef>
+                <a:spcPts val="1000"/>
+              </a:spcBef>
+              <a:spcAft>
+                <a:spcPts val="0"/>
+              </a:spcAft>
+              <a:buClr>
+                <a:srgbClr val="5FCBEF"/>
+              </a:buClr>
+              <a:buSzPct val="75000"/>
+              <a:buFont typeface="+mj-lt"/>
+              <a:buAutoNum type="arabicPeriod" startAt="4"/>
+              <a:tabLst/>
+              <a:defRPr/>
+            </a:pPr>
+            <a:r>
+              <a:rPr kumimoji="0" lang="en-GB" sz="2000" b="0" i="0" u="none" strike="noStrike" kern="1200" cap="none" spc="0" normalizeH="0" baseline="0" noProof="0" dirty="0">
+                <a:ln>
+                  <a:noFill/>
+                </a:ln>
+                <a:solidFill>
+                  <a:prstClr val="black">
+                    <a:lumMod val="75000"/>
+                    <a:lumOff val="25000"/>
+                  </a:prstClr>
+                </a:solidFill>
+                <a:effectLst/>
+                <a:uLnTx/>
+                <a:uFillTx/>
+                <a:latin typeface="Trebuchet MS" panose="020B0603020202020204"/>
+                <a:ea typeface="+mn-ea"/>
+                <a:cs typeface="+mn-cs"/>
+              </a:rPr>
+              <a:t>Apply an algorithm to classify and predict (linear SVM algorithm)</a:t>
+            </a:r>
+          </a:p>
+          <a:p>
+            <a:pPr marL="742950" marR="0" lvl="1" indent="-285750" algn="l" defTabSz="457200" rtl="0" eaLnBrk="1" fontAlgn="auto" latinLnBrk="0" hangingPunct="1">
+              <a:lnSpc>
+                <a:spcPct val="100000"/>
+              </a:lnSpc>
+              <a:spcBef>
+                <a:spcPts val="1000"/>
+              </a:spcBef>
+              <a:spcAft>
+                <a:spcPts val="0"/>
+              </a:spcAft>
+              <a:buClr>
+                <a:srgbClr val="5FCBEF"/>
+              </a:buClr>
+              <a:buSzPct val="75000"/>
+              <a:buFont typeface="+mj-lt"/>
+              <a:buAutoNum type="arabicPeriod" startAt="4"/>
+              <a:tabLst/>
+              <a:defRPr/>
+            </a:pPr>
+            <a:r>
+              <a:rPr kumimoji="0" lang="en-GB" sz="2000" b="0" i="0" u="none" strike="noStrike" kern="1200" cap="none" spc="0" normalizeH="0" baseline="0" noProof="0" dirty="0">
+                <a:ln>
+                  <a:noFill/>
+                </a:ln>
+                <a:solidFill>
+                  <a:prstClr val="black">
+                    <a:lumMod val="75000"/>
+                    <a:lumOff val="25000"/>
+                  </a:prstClr>
+                </a:solidFill>
+                <a:effectLst/>
+                <a:uLnTx/>
+                <a:uFillTx/>
+                <a:latin typeface="Trebuchet MS" panose="020B0603020202020204"/>
+                <a:ea typeface="+mn-ea"/>
+                <a:cs typeface="+mn-cs"/>
+              </a:rPr>
+              <a:t>Assess the accuracy and precision of our model</a:t>
+            </a:r>
+          </a:p>
+          <a:p>
+            <a:pPr marL="742950" marR="0" lvl="1" indent="-285750" algn="l" defTabSz="457200" rtl="0" eaLnBrk="1" fontAlgn="auto" latinLnBrk="0" hangingPunct="1">
+              <a:lnSpc>
+                <a:spcPct val="100000"/>
+              </a:lnSpc>
+              <a:spcBef>
+                <a:spcPts val="1000"/>
+              </a:spcBef>
+              <a:spcAft>
+                <a:spcPts val="0"/>
+              </a:spcAft>
+              <a:buClr>
+                <a:srgbClr val="5FCBEF"/>
+              </a:buClr>
+              <a:buSzPct val="75000"/>
+              <a:buFont typeface="+mj-lt"/>
+              <a:buAutoNum type="arabicPeriod" startAt="4"/>
+              <a:tabLst/>
+              <a:defRPr/>
+            </a:pPr>
+            <a:r>
+              <a:rPr kumimoji="0" lang="en-GB" sz="2000" b="0" i="0" u="none" strike="noStrike" kern="1200" cap="none" spc="0" normalizeH="0" baseline="0" noProof="0" dirty="0">
+                <a:ln>
+                  <a:noFill/>
+                </a:ln>
+                <a:solidFill>
+                  <a:prstClr val="black">
+                    <a:lumMod val="75000"/>
+                    <a:lumOff val="25000"/>
+                  </a:prstClr>
+                </a:solidFill>
+                <a:effectLst/>
+                <a:uLnTx/>
+                <a:uFillTx/>
+                <a:latin typeface="Trebuchet MS" panose="020B0603020202020204"/>
+                <a:ea typeface="+mn-ea"/>
+                <a:cs typeface="+mn-cs"/>
+              </a:rPr>
+              <a:t>Use the model to 'label' the new data</a:t>
+            </a:r>
+          </a:p>
+          <a:p>
+            <a:endParaRPr lang="en-GB" dirty="0"/>
+          </a:p>
+        </p:txBody>
+      </p:sp>
     </p:spTree>
     <p:extLst>
       <p:ext uri="{BB962C8B-B14F-4D97-AF65-F5344CB8AC3E}">
-        <p14:creationId xmlns:p14="http://schemas.microsoft.com/office/powerpoint/2010/main" val="2524278655"/>
+        <p14:creationId xmlns:p14="http://schemas.microsoft.com/office/powerpoint/2010/main" val="4271889517"/>
       </p:ext>
     </p:extLst>
   </p:cSld>
@@ -8646,18 +10535,18 @@
           <a:lstStyle/>
           <a:p>
             <a:r>
-              <a:rPr lang="en-GB" dirty="0"/>
+              <a:rPr lang="en-GB" sz="1900" dirty="0"/>
               <a:t>lexical analysis </a:t>
             </a:r>
           </a:p>
           <a:p>
             <a:pPr lvl="1"/>
             <a:r>
-              <a:rPr lang="en-GB" sz="1800" dirty="0"/>
+              <a:rPr lang="en-GB" sz="1900" dirty="0"/>
               <a:t>word frequency distributions, </a:t>
             </a:r>
             <a:r>
-              <a:rPr lang="en-GB" sz="1800" dirty="0">
+              <a:rPr lang="en-GB" sz="1900" dirty="0">
                 <a:solidFill>
                   <a:srgbClr val="333333"/>
                 </a:solidFill>
@@ -8665,54 +10554,62 @@
                 <a:ea typeface="Calibri" panose="020F0502020204030204" pitchFamily="34" charset="0"/>
                 <a:cs typeface="Calibri" panose="020F0502020204030204" pitchFamily="34" charset="0"/>
               </a:rPr>
-              <a:t>key term extraction and co-occurrence analysis</a:t>
-            </a:r>
-            <a:endParaRPr lang="en-GB" sz="1800" dirty="0"/>
+              <a:t>key term extraction, co-occurrence analysis</a:t>
+            </a:r>
+            <a:endParaRPr lang="en-GB" sz="1900" dirty="0"/>
           </a:p>
           <a:p>
             <a:pPr lvl="1"/>
             <a:r>
-              <a:rPr lang="en-GB" sz="1800" dirty="0"/>
-              <a:t>pattern recognition, tagging/annotation, information extraction</a:t>
+              <a:rPr lang="en-GB" sz="1900" dirty="0"/>
+              <a:t>pattern recognition, </a:t>
+            </a:r>
+            <a:r>
+              <a:rPr lang="en-GB" sz="1900" dirty="0" err="1"/>
+              <a:t>PoS</a:t>
+            </a:r>
+            <a:r>
+              <a:rPr lang="en-GB" sz="1900" dirty="0"/>
+              <a:t> tagging, annotation, information extraction</a:t>
             </a:r>
           </a:p>
           <a:p>
             <a:pPr lvl="1"/>
             <a:r>
-              <a:rPr lang="en-GB" sz="1800" dirty="0"/>
+              <a:rPr lang="en-GB" sz="1900" dirty="0"/>
               <a:t>sentiment analyses (identifying emotion or opinion in text)</a:t>
             </a:r>
           </a:p>
           <a:p>
             <a:r>
-              <a:rPr lang="en-GB" dirty="0"/>
+              <a:rPr lang="en-GB" sz="1900" dirty="0"/>
               <a:t>machine learning approaches</a:t>
             </a:r>
           </a:p>
           <a:p>
             <a:pPr lvl="1"/>
             <a:r>
-              <a:rPr lang="en-GB" sz="1800" dirty="0"/>
-              <a:t>topic modelling, supervised/unsupervised classification, clustering</a:t>
+              <a:rPr lang="en-GB" sz="1900" dirty="0"/>
+              <a:t>topic modelling, supervised and unsupervised classification, clustering</a:t>
             </a:r>
           </a:p>
           <a:p>
             <a:pPr lvl="1"/>
             <a:r>
-              <a:rPr lang="en-GB" sz="1800" dirty="0"/>
+              <a:rPr lang="en-GB" sz="1900" dirty="0"/>
               <a:t>content analysis (looks at word choice – common in social sciences)</a:t>
             </a:r>
           </a:p>
           <a:p>
             <a:pPr lvl="1"/>
             <a:r>
-              <a:rPr lang="en-GB" sz="1800" dirty="0"/>
-              <a:t>predictive</a:t>
-            </a:r>
-          </a:p>
-          <a:p>
-            <a:r>
-              <a:rPr lang="en-GB" dirty="0"/>
+              <a:rPr lang="en-GB" sz="1900" dirty="0"/>
+              <a:t>prediction</a:t>
+            </a:r>
+          </a:p>
+          <a:p>
+            <a:r>
+              <a:rPr lang="en-GB" sz="1900" dirty="0"/>
               <a:t>visualization</a:t>
             </a:r>
           </a:p>
@@ -9049,7 +10946,7 @@
                 <a:effectLst/>
                 <a:latin typeface="Helvetica Neue"/>
               </a:rPr>
-              <a:t>fully-featured – does pretty everything</a:t>
+              <a:t>fully-featured – does pretty much everything</a:t>
             </a:r>
           </a:p>
           <a:p>
@@ -9075,7 +10972,7 @@
                 <a:effectLst/>
                 <a:latin typeface="Helvetica Neue"/>
               </a:rPr>
-              <a:t>extensive documentation (active online community)</a:t>
+              <a:t>extensive documentation and an active online community</a:t>
             </a:r>
           </a:p>
           <a:p>
@@ -9101,7 +10998,7 @@
                 <a:effectLst/>
                 <a:latin typeface="Helvetica Neue"/>
               </a:rPr>
-              <a:t>Integrates well with other packages and base R functions</a:t>
+              <a:t>Integrates well with other packages and base R</a:t>
             </a:r>
           </a:p>
           <a:p>
@@ -9872,6 +11769,230 @@
           <a:chExt cx="0" cy="0"/>
         </a:xfrm>
       </p:grpSpPr>
+      <p:grpSp>
+        <p:nvGrpSpPr>
+          <p:cNvPr id="9" name="Group 8">
+            <a:extLst>
+              <a:ext uri="{FF2B5EF4-FFF2-40B4-BE49-F238E27FC236}">
+                <a16:creationId xmlns:a16="http://schemas.microsoft.com/office/drawing/2014/main" id="{953BE4B5-564C-4E1B-8B97-70B43E905721}"/>
+              </a:ext>
+            </a:extLst>
+          </p:cNvPr>
+          <p:cNvGrpSpPr/>
+          <p:nvPr/>
+        </p:nvGrpSpPr>
+        <p:grpSpPr>
+          <a:xfrm>
+            <a:off x="8397766" y="3555311"/>
+            <a:ext cx="3625323" cy="3062342"/>
+            <a:chOff x="8397766" y="3555311"/>
+            <a:chExt cx="3625323" cy="3062342"/>
+          </a:xfrm>
+        </p:grpSpPr>
+        <p:grpSp>
+          <p:nvGrpSpPr>
+            <p:cNvPr id="7" name="Group 6">
+              <a:extLst>
+                <a:ext uri="{FF2B5EF4-FFF2-40B4-BE49-F238E27FC236}">
+                  <a16:creationId xmlns:a16="http://schemas.microsoft.com/office/drawing/2014/main" id="{951EFCB1-2A74-46C9-8BC9-8007BC3F88B4}"/>
+                </a:ext>
+              </a:extLst>
+            </p:cNvPr>
+            <p:cNvGrpSpPr/>
+            <p:nvPr/>
+          </p:nvGrpSpPr>
+          <p:grpSpPr>
+            <a:xfrm>
+              <a:off x="8397766" y="3555311"/>
+              <a:ext cx="3625323" cy="3062342"/>
+              <a:chOff x="8397766" y="3555311"/>
+              <a:chExt cx="3625323" cy="3062342"/>
+            </a:xfrm>
+          </p:grpSpPr>
+          <p:pic>
+            <p:nvPicPr>
+              <p:cNvPr id="4" name="Picture 3">
+                <a:extLst>
+                  <a:ext uri="{FF2B5EF4-FFF2-40B4-BE49-F238E27FC236}">
+                    <a16:creationId xmlns:a16="http://schemas.microsoft.com/office/drawing/2014/main" id="{2D1085C9-5260-403F-A4F8-1DB94C0506F9}"/>
+                  </a:ext>
+                </a:extLst>
+              </p:cNvPr>
+              <p:cNvPicPr>
+                <a:picLocks noChangeAspect="1"/>
+              </p:cNvPicPr>
+              <p:nvPr/>
+            </p:nvPicPr>
+            <p:blipFill>
+              <a:blip r:embed="rId2"/>
+              <a:stretch>
+                <a:fillRect/>
+              </a:stretch>
+            </p:blipFill>
+            <p:spPr>
+              <a:xfrm>
+                <a:off x="8473440" y="3555311"/>
+                <a:ext cx="3549649" cy="3062342"/>
+              </a:xfrm>
+              <a:prstGeom prst="rect">
+                <a:avLst/>
+              </a:prstGeom>
+            </p:spPr>
+          </p:pic>
+          <p:sp>
+            <p:nvSpPr>
+              <p:cNvPr id="5" name="Oval 4">
+                <a:extLst>
+                  <a:ext uri="{FF2B5EF4-FFF2-40B4-BE49-F238E27FC236}">
+                    <a16:creationId xmlns:a16="http://schemas.microsoft.com/office/drawing/2014/main" id="{A9AF2D41-42B0-4834-AC66-262E83397700}"/>
+                  </a:ext>
+                </a:extLst>
+              </p:cNvPr>
+              <p:cNvSpPr/>
+              <p:nvPr/>
+            </p:nvSpPr>
+            <p:spPr>
+              <a:xfrm>
+                <a:off x="9587060" y="4104640"/>
+                <a:ext cx="1234911" cy="690880"/>
+              </a:xfrm>
+              <a:prstGeom prst="ellipse">
+                <a:avLst/>
+              </a:prstGeom>
+              <a:noFill/>
+              <a:ln w="41275"/>
+            </p:spPr>
+            <p:style>
+              <a:lnRef idx="2">
+                <a:schemeClr val="accent1">
+                  <a:shade val="50000"/>
+                </a:schemeClr>
+              </a:lnRef>
+              <a:fillRef idx="1">
+                <a:schemeClr val="accent1"/>
+              </a:fillRef>
+              <a:effectRef idx="0">
+                <a:schemeClr val="accent1"/>
+              </a:effectRef>
+              <a:fontRef idx="minor">
+                <a:schemeClr val="lt1"/>
+              </a:fontRef>
+            </p:style>
+            <p:txBody>
+              <a:bodyPr rtlCol="0" anchor="ctr"/>
+              <a:lstStyle/>
+              <a:p>
+                <a:pPr algn="ctr"/>
+                <a:endParaRPr lang="en-GB"/>
+              </a:p>
+            </p:txBody>
+          </p:sp>
+          <p:sp>
+            <p:nvSpPr>
+              <p:cNvPr id="6" name="Rectangle 5">
+                <a:extLst>
+                  <a:ext uri="{FF2B5EF4-FFF2-40B4-BE49-F238E27FC236}">
+                    <a16:creationId xmlns:a16="http://schemas.microsoft.com/office/drawing/2014/main" id="{DBE583B5-C14C-41FA-8E16-C2CA60736F23}"/>
+                  </a:ext>
+                </a:extLst>
+              </p:cNvPr>
+              <p:cNvSpPr/>
+              <p:nvPr/>
+            </p:nvSpPr>
+            <p:spPr>
+              <a:xfrm>
+                <a:off x="8397766" y="5318234"/>
+                <a:ext cx="2049517" cy="851338"/>
+              </a:xfrm>
+              <a:prstGeom prst="rect">
+                <a:avLst/>
+              </a:prstGeom>
+              <a:solidFill>
+                <a:schemeClr val="bg1"/>
+              </a:solidFill>
+              <a:ln>
+                <a:noFill/>
+              </a:ln>
+            </p:spPr>
+            <p:style>
+              <a:lnRef idx="2">
+                <a:schemeClr val="accent1">
+                  <a:shade val="50000"/>
+                </a:schemeClr>
+              </a:lnRef>
+              <a:fillRef idx="1">
+                <a:schemeClr val="accent1"/>
+              </a:fillRef>
+              <a:effectRef idx="0">
+                <a:schemeClr val="accent1"/>
+              </a:effectRef>
+              <a:fontRef idx="minor">
+                <a:schemeClr val="lt1"/>
+              </a:fontRef>
+            </p:style>
+            <p:txBody>
+              <a:bodyPr rtlCol="0" anchor="ctr"/>
+              <a:lstStyle/>
+              <a:p>
+                <a:pPr algn="ctr"/>
+                <a:endParaRPr lang="en-GB"/>
+              </a:p>
+            </p:txBody>
+          </p:sp>
+        </p:grpSp>
+        <p:sp>
+          <p:nvSpPr>
+            <p:cNvPr id="8" name="Rectangle 7">
+              <a:extLst>
+                <a:ext uri="{FF2B5EF4-FFF2-40B4-BE49-F238E27FC236}">
+                  <a16:creationId xmlns:a16="http://schemas.microsoft.com/office/drawing/2014/main" id="{CF4290FF-553D-4B4E-B0C6-EEBFB2D36EF6}"/>
+                </a:ext>
+              </a:extLst>
+            </p:cNvPr>
+            <p:cNvSpPr/>
+            <p:nvPr/>
+          </p:nvSpPr>
+          <p:spPr>
+            <a:xfrm>
+              <a:off x="9672320" y="5049520"/>
+              <a:ext cx="264160" cy="416560"/>
+            </a:xfrm>
+            <a:prstGeom prst="rect">
+              <a:avLst/>
+            </a:prstGeom>
+            <a:solidFill>
+              <a:schemeClr val="bg1"/>
+            </a:solidFill>
+            <a:ln>
+              <a:noFill/>
+            </a:ln>
+          </p:spPr>
+          <p:style>
+            <a:lnRef idx="2">
+              <a:schemeClr val="accent1">
+                <a:shade val="50000"/>
+              </a:schemeClr>
+            </a:lnRef>
+            <a:fillRef idx="1">
+              <a:schemeClr val="accent1"/>
+            </a:fillRef>
+            <a:effectRef idx="0">
+              <a:schemeClr val="accent1"/>
+            </a:effectRef>
+            <a:fontRef idx="minor">
+              <a:schemeClr val="lt1"/>
+            </a:fontRef>
+          </p:style>
+          <p:txBody>
+            <a:bodyPr rtlCol="0" anchor="ctr"/>
+            <a:lstStyle/>
+            <a:p>
+              <a:pPr algn="ctr"/>
+              <a:endParaRPr lang="en-GB"/>
+            </a:p>
+          </p:txBody>
+        </p:sp>
+      </p:grpSp>
       <p:sp>
         <p:nvSpPr>
           <p:cNvPr id="2" name="Title 1">
@@ -9918,7 +12039,7 @@
         </p:nvSpPr>
         <p:spPr>
           <a:xfrm>
-            <a:off x="677334" y="1508289"/>
+            <a:off x="677334" y="1538769"/>
             <a:ext cx="8596668" cy="4533073"/>
           </a:xfrm>
         </p:spPr>
@@ -10297,6 +12418,278 @@
           </a:p>
         </p:txBody>
       </p:sp>
+      <p:sp>
+        <p:nvSpPr>
+          <p:cNvPr id="5" name="Oval 4">
+            <a:extLst>
+              <a:ext uri="{FF2B5EF4-FFF2-40B4-BE49-F238E27FC236}">
+                <a16:creationId xmlns:a16="http://schemas.microsoft.com/office/drawing/2014/main" id="{BFD45A6E-1D50-4240-89A7-9D40642CC831}"/>
+              </a:ext>
+            </a:extLst>
+          </p:cNvPr>
+          <p:cNvSpPr/>
+          <p:nvPr/>
+        </p:nvSpPr>
+        <p:spPr>
+          <a:xfrm>
+            <a:off x="10279755" y="4019682"/>
+            <a:ext cx="1234911" cy="690880"/>
+          </a:xfrm>
+          <a:prstGeom prst="ellipse">
+            <a:avLst/>
+          </a:prstGeom>
+          <a:noFill/>
+          <a:ln w="41275"/>
+        </p:spPr>
+        <p:style>
+          <a:lnRef idx="2">
+            <a:schemeClr val="accent1">
+              <a:shade val="50000"/>
+            </a:schemeClr>
+          </a:lnRef>
+          <a:fillRef idx="1">
+            <a:schemeClr val="accent1"/>
+          </a:fillRef>
+          <a:effectRef idx="0">
+            <a:schemeClr val="accent1"/>
+          </a:effectRef>
+          <a:fontRef idx="minor">
+            <a:schemeClr val="lt1"/>
+          </a:fontRef>
+        </p:style>
+        <p:txBody>
+          <a:bodyPr rtlCol="0" anchor="ctr"/>
+          <a:lstStyle/>
+          <a:p>
+            <a:pPr algn="ctr"/>
+            <a:endParaRPr lang="en-GB"/>
+          </a:p>
+        </p:txBody>
+      </p:sp>
+      <p:grpSp>
+        <p:nvGrpSpPr>
+          <p:cNvPr id="10" name="Group 9">
+            <a:extLst>
+              <a:ext uri="{FF2B5EF4-FFF2-40B4-BE49-F238E27FC236}">
+                <a16:creationId xmlns:a16="http://schemas.microsoft.com/office/drawing/2014/main" id="{CD593CDE-B7BE-4848-9D26-534C2A77F906}"/>
+              </a:ext>
+            </a:extLst>
+          </p:cNvPr>
+          <p:cNvGrpSpPr/>
+          <p:nvPr/>
+        </p:nvGrpSpPr>
+        <p:grpSpPr>
+          <a:xfrm>
+            <a:off x="8473440" y="3555311"/>
+            <a:ext cx="3549649" cy="3062342"/>
+            <a:chOff x="8473440" y="3555311"/>
+            <a:chExt cx="3549649" cy="3062342"/>
+          </a:xfrm>
+        </p:grpSpPr>
+        <p:grpSp>
+          <p:nvGrpSpPr>
+            <p:cNvPr id="8" name="Group 7">
+              <a:extLst>
+                <a:ext uri="{FF2B5EF4-FFF2-40B4-BE49-F238E27FC236}">
+                  <a16:creationId xmlns:a16="http://schemas.microsoft.com/office/drawing/2014/main" id="{BD6E3E31-97AA-408C-8487-E3F86BD8CD68}"/>
+                </a:ext>
+              </a:extLst>
+            </p:cNvPr>
+            <p:cNvGrpSpPr/>
+            <p:nvPr/>
+          </p:nvGrpSpPr>
+          <p:grpSpPr>
+            <a:xfrm>
+              <a:off x="8473440" y="3555311"/>
+              <a:ext cx="3549649" cy="3062342"/>
+              <a:chOff x="8473440" y="3555311"/>
+              <a:chExt cx="3549649" cy="3062342"/>
+            </a:xfrm>
+          </p:grpSpPr>
+          <p:pic>
+            <p:nvPicPr>
+              <p:cNvPr id="4" name="Picture 3">
+                <a:extLst>
+                  <a:ext uri="{FF2B5EF4-FFF2-40B4-BE49-F238E27FC236}">
+                    <a16:creationId xmlns:a16="http://schemas.microsoft.com/office/drawing/2014/main" id="{D69F473C-1362-4410-85C6-E3743F50CFE2}"/>
+                  </a:ext>
+                </a:extLst>
+              </p:cNvPr>
+              <p:cNvPicPr>
+                <a:picLocks noChangeAspect="1"/>
+              </p:cNvPicPr>
+              <p:nvPr/>
+            </p:nvPicPr>
+            <p:blipFill>
+              <a:blip r:embed="rId2"/>
+              <a:stretch>
+                <a:fillRect/>
+              </a:stretch>
+            </p:blipFill>
+            <p:spPr>
+              <a:xfrm>
+                <a:off x="8473440" y="3555311"/>
+                <a:ext cx="3549649" cy="3062342"/>
+              </a:xfrm>
+              <a:prstGeom prst="rect">
+                <a:avLst/>
+              </a:prstGeom>
+            </p:spPr>
+          </p:pic>
+          <p:sp>
+            <p:nvSpPr>
+              <p:cNvPr id="6" name="Rectangle 5">
+                <a:extLst>
+                  <a:ext uri="{FF2B5EF4-FFF2-40B4-BE49-F238E27FC236}">
+                    <a16:creationId xmlns:a16="http://schemas.microsoft.com/office/drawing/2014/main" id="{FBFC9AFE-45E0-4BF9-A8A0-68502564733B}"/>
+                  </a:ext>
+                </a:extLst>
+              </p:cNvPr>
+              <p:cNvSpPr/>
+              <p:nvPr/>
+            </p:nvSpPr>
+            <p:spPr>
+              <a:xfrm>
+                <a:off x="8473440" y="4876800"/>
+                <a:ext cx="1473200" cy="1239520"/>
+              </a:xfrm>
+              <a:prstGeom prst="rect">
+                <a:avLst/>
+              </a:prstGeom>
+              <a:solidFill>
+                <a:schemeClr val="bg1"/>
+              </a:solidFill>
+              <a:ln>
+                <a:noFill/>
+              </a:ln>
+            </p:spPr>
+            <p:style>
+              <a:lnRef idx="2">
+                <a:schemeClr val="accent1">
+                  <a:shade val="50000"/>
+                </a:schemeClr>
+              </a:lnRef>
+              <a:fillRef idx="1">
+                <a:schemeClr val="accent1"/>
+              </a:fillRef>
+              <a:effectRef idx="0">
+                <a:schemeClr val="accent1"/>
+              </a:effectRef>
+              <a:fontRef idx="minor">
+                <a:schemeClr val="lt1"/>
+              </a:fontRef>
+            </p:style>
+            <p:txBody>
+              <a:bodyPr rtlCol="0" anchor="ctr"/>
+              <a:lstStyle/>
+              <a:p>
+                <a:pPr algn="ctr"/>
+                <a:endParaRPr lang="en-GB"/>
+              </a:p>
+            </p:txBody>
+          </p:sp>
+          <p:sp>
+            <p:nvSpPr>
+              <p:cNvPr id="7" name="Rectangle 6">
+                <a:extLst>
+                  <a:ext uri="{FF2B5EF4-FFF2-40B4-BE49-F238E27FC236}">
+                    <a16:creationId xmlns:a16="http://schemas.microsoft.com/office/drawing/2014/main" id="{8718CEDE-129E-45E1-9655-764FA5ACEF0E}"/>
+                  </a:ext>
+                </a:extLst>
+              </p:cNvPr>
+              <p:cNvSpPr/>
+              <p:nvPr/>
+            </p:nvSpPr>
+            <p:spPr>
+              <a:xfrm>
+                <a:off x="9743440" y="5476240"/>
+                <a:ext cx="721360" cy="565122"/>
+              </a:xfrm>
+              <a:prstGeom prst="rect">
+                <a:avLst/>
+              </a:prstGeom>
+              <a:solidFill>
+                <a:schemeClr val="bg1"/>
+              </a:solidFill>
+              <a:ln>
+                <a:noFill/>
+              </a:ln>
+            </p:spPr>
+            <p:style>
+              <a:lnRef idx="2">
+                <a:schemeClr val="accent1">
+                  <a:shade val="50000"/>
+                </a:schemeClr>
+              </a:lnRef>
+              <a:fillRef idx="1">
+                <a:schemeClr val="accent1"/>
+              </a:fillRef>
+              <a:effectRef idx="0">
+                <a:schemeClr val="accent1"/>
+              </a:effectRef>
+              <a:fontRef idx="minor">
+                <a:schemeClr val="lt1"/>
+              </a:fontRef>
+            </p:style>
+            <p:txBody>
+              <a:bodyPr rtlCol="0" anchor="ctr"/>
+              <a:lstStyle/>
+              <a:p>
+                <a:pPr algn="ctr"/>
+                <a:endParaRPr lang="en-GB"/>
+              </a:p>
+            </p:txBody>
+          </p:sp>
+        </p:grpSp>
+        <p:sp>
+          <p:nvSpPr>
+            <p:cNvPr id="9" name="Oval 8">
+              <a:extLst>
+                <a:ext uri="{FF2B5EF4-FFF2-40B4-BE49-F238E27FC236}">
+                  <a16:creationId xmlns:a16="http://schemas.microsoft.com/office/drawing/2014/main" id="{279ED239-9122-470A-B0C9-8F1D7E13B31B}"/>
+                </a:ext>
+              </a:extLst>
+            </p:cNvPr>
+            <p:cNvSpPr/>
+            <p:nvPr/>
+          </p:nvSpPr>
+          <p:spPr>
+            <a:xfrm>
+              <a:off x="9652000" y="4765200"/>
+              <a:ext cx="1107440" cy="656402"/>
+            </a:xfrm>
+            <a:prstGeom prst="ellipse">
+              <a:avLst/>
+            </a:prstGeom>
+            <a:noFill/>
+            <a:ln w="31750"/>
+          </p:spPr>
+          <p:style>
+            <a:lnRef idx="2">
+              <a:schemeClr val="accent1">
+                <a:shade val="50000"/>
+              </a:schemeClr>
+            </a:lnRef>
+            <a:fillRef idx="1">
+              <a:schemeClr val="accent1"/>
+            </a:fillRef>
+            <a:effectRef idx="0">
+              <a:schemeClr val="accent1"/>
+            </a:effectRef>
+            <a:fontRef idx="minor">
+              <a:schemeClr val="lt1"/>
+            </a:fontRef>
+          </p:style>
+          <p:txBody>
+            <a:bodyPr rtlCol="0" anchor="ctr"/>
+            <a:lstStyle/>
+            <a:p>
+              <a:pPr algn="ctr"/>
+              <a:endParaRPr lang="en-GB"/>
+            </a:p>
+          </p:txBody>
+        </p:sp>
+      </p:grpSp>
     </p:spTree>
     <p:extLst>
       <p:ext uri="{BB962C8B-B14F-4D97-AF65-F5344CB8AC3E}">

</xml_diff>

<commit_message>
added more to model slides
</commit_message>
<xml_diff>
--- a/Slides_Notes/TextTutorial_Slides.pptx
+++ b/Slides_Notes/TextTutorial_Slides.pptx
@@ -23,6 +23,7 @@
     <p:sldId id="271" r:id="rId17"/>
     <p:sldId id="274" r:id="rId18"/>
     <p:sldId id="272" r:id="rId19"/>
+    <p:sldId id="275" r:id="rId20"/>
   </p:sldIdLst>
   <p:sldSz cx="12192000" cy="6858000"/>
   <p:notesSz cx="6858000" cy="9144000"/>
@@ -10456,6 +10457,206 @@
 </p:sld>
 </file>
 
+<file path=ppt/slides/slide19.xml><?xml version="1.0" encoding="utf-8"?>
+<p:sld xmlns:a="http://schemas.openxmlformats.org/drawingml/2006/main" xmlns:r="http://schemas.openxmlformats.org/officeDocument/2006/relationships" xmlns:p="http://schemas.openxmlformats.org/presentationml/2006/main">
+  <p:cSld>
+    <p:spTree>
+      <p:nvGrpSpPr>
+        <p:cNvPr id="1" name=""/>
+        <p:cNvGrpSpPr/>
+        <p:nvPr/>
+      </p:nvGrpSpPr>
+      <p:grpSpPr>
+        <a:xfrm>
+          <a:off x="0" y="0"/>
+          <a:ext cx="0" cy="0"/>
+          <a:chOff x="0" y="0"/>
+          <a:chExt cx="0" cy="0"/>
+        </a:xfrm>
+      </p:grpSpPr>
+      <p:sp>
+        <p:nvSpPr>
+          <p:cNvPr id="2" name="Title 1">
+            <a:extLst>
+              <a:ext uri="{FF2B5EF4-FFF2-40B4-BE49-F238E27FC236}">
+                <a16:creationId xmlns:a16="http://schemas.microsoft.com/office/drawing/2014/main" id="{325738FE-B43D-45C0-98F6-CA8A81F8C53B}"/>
+              </a:ext>
+            </a:extLst>
+          </p:cNvPr>
+          <p:cNvSpPr>
+            <a:spLocks noGrp="1"/>
+          </p:cNvSpPr>
+          <p:nvPr>
+            <p:ph type="title"/>
+          </p:nvPr>
+        </p:nvSpPr>
+        <p:spPr>
+          <a:xfrm>
+            <a:off x="677334" y="609600"/>
+            <a:ext cx="8596668" cy="729006"/>
+          </a:xfrm>
+        </p:spPr>
+        <p:txBody>
+          <a:bodyPr/>
+          <a:lstStyle/>
+          <a:p>
+            <a:r>
+              <a:rPr lang="en-GB" dirty="0"/>
+              <a:t>Improve your classification accuracy</a:t>
+            </a:r>
+          </a:p>
+        </p:txBody>
+      </p:sp>
+      <p:sp>
+        <p:nvSpPr>
+          <p:cNvPr id="3" name="Content Placeholder 2">
+            <a:extLst>
+              <a:ext uri="{FF2B5EF4-FFF2-40B4-BE49-F238E27FC236}">
+                <a16:creationId xmlns:a16="http://schemas.microsoft.com/office/drawing/2014/main" id="{A1AF9F98-B003-409D-9DFE-814795F1E31C}"/>
+              </a:ext>
+            </a:extLst>
+          </p:cNvPr>
+          <p:cNvSpPr>
+            <a:spLocks noGrp="1"/>
+          </p:cNvSpPr>
+          <p:nvPr>
+            <p:ph idx="1"/>
+          </p:nvPr>
+        </p:nvSpPr>
+        <p:spPr>
+          <a:xfrm>
+            <a:off x="677334" y="1461155"/>
+            <a:ext cx="8596668" cy="5043340"/>
+          </a:xfrm>
+        </p:spPr>
+        <p:txBody>
+          <a:bodyPr>
+            <a:normAutofit lnSpcReduction="10000"/>
+          </a:bodyPr>
+          <a:lstStyle/>
+          <a:p>
+            <a:r>
+              <a:rPr lang="en-GB" sz="2000" dirty="0"/>
+              <a:t>not stemming words</a:t>
+            </a:r>
+          </a:p>
+          <a:p>
+            <a:r>
+              <a:rPr lang="en-GB" sz="2000" dirty="0"/>
+              <a:t>different training/testing split</a:t>
+            </a:r>
+          </a:p>
+          <a:p>
+            <a:r>
+              <a:rPr lang="en-GB" sz="2000" dirty="0"/>
+              <a:t>use different model (e.g. naive bayes)</a:t>
+            </a:r>
+          </a:p>
+          <a:p>
+            <a:r>
+              <a:rPr lang="en-GB" sz="2000" dirty="0"/>
+              <a:t>use a weighted term frequency score like </a:t>
+            </a:r>
+            <a:r>
+              <a:rPr lang="en-GB" sz="2000" dirty="0" err="1"/>
+              <a:t>tf-idf</a:t>
+            </a:r>
+            <a:endParaRPr lang="en-GB" sz="2000" dirty="0"/>
+          </a:p>
+          <a:p>
+            <a:pPr lvl="1"/>
+            <a:r>
+              <a:rPr lang="en-GB" sz="1800" dirty="0"/>
+              <a:t>Analyses on a standard </a:t>
+            </a:r>
+            <a:r>
+              <a:rPr lang="en-GB" sz="1800" dirty="0" err="1"/>
+              <a:t>dfm</a:t>
+            </a:r>
+            <a:r>
+              <a:rPr lang="en-GB" sz="1800" dirty="0"/>
+              <a:t> use the term frequency (how frequently a word occurs in a document), </a:t>
+            </a:r>
+          </a:p>
+          <a:p>
+            <a:pPr lvl="1"/>
+            <a:r>
+              <a:rPr lang="en-GB" sz="1800" dirty="0"/>
+              <a:t>Can use the </a:t>
+            </a:r>
+            <a:r>
+              <a:rPr lang="en-GB" sz="1800" b="1" dirty="0" err="1"/>
+              <a:t>tf-idf</a:t>
+            </a:r>
+            <a:r>
+              <a:rPr lang="en-GB" sz="1800" dirty="0"/>
+              <a:t>: measures how important a word is to a document in a corpus of documents. </a:t>
+            </a:r>
+          </a:p>
+          <a:p>
+            <a:pPr lvl="1"/>
+            <a:r>
+              <a:rPr lang="en-GB" sz="1800" dirty="0"/>
+              <a:t>The inverse document frequency decreases the weight for commonly used words and increases the weight for words that are not used very much in a collection of documents</a:t>
+            </a:r>
+          </a:p>
+          <a:p>
+            <a:pPr lvl="1"/>
+            <a:r>
+              <a:rPr lang="en-GB" sz="1800" dirty="0"/>
+              <a:t>so combined with term frequency (the two quantities multiplied together) gives the frequency of a term adjusted for how rarely it is used. </a:t>
+            </a:r>
+          </a:p>
+          <a:p>
+            <a:pPr lvl="1"/>
+            <a:r>
+              <a:rPr lang="en-GB" sz="1800" dirty="0" err="1"/>
+              <a:t>dfm_tfidf</a:t>
+            </a:r>
+            <a:r>
+              <a:rPr lang="en-GB" sz="1800" dirty="0"/>
+              <a:t>(</a:t>
+            </a:r>
+            <a:r>
+              <a:rPr lang="en-GB" sz="1800" dirty="0" err="1"/>
+              <a:t>base_dfm</a:t>
+            </a:r>
+            <a:r>
+              <a:rPr lang="en-GB" sz="1800" dirty="0"/>
+              <a:t>, </a:t>
+            </a:r>
+            <a:r>
+              <a:rPr lang="en-GB" sz="1800" dirty="0" err="1"/>
+              <a:t>scheme_tf</a:t>
+            </a:r>
+            <a:r>
+              <a:rPr lang="en-GB" sz="1800" dirty="0"/>
+              <a:t> = "count", </a:t>
+            </a:r>
+            <a:r>
+              <a:rPr lang="en-GB" sz="1800" dirty="0" err="1"/>
+              <a:t>scheme_df</a:t>
+            </a:r>
+            <a:r>
+              <a:rPr lang="en-GB" sz="1800" dirty="0"/>
+              <a:t> = "inverse")</a:t>
+            </a:r>
+          </a:p>
+        </p:txBody>
+      </p:sp>
+    </p:spTree>
+    <p:extLst>
+      <p:ext uri="{BB962C8B-B14F-4D97-AF65-F5344CB8AC3E}">
+        <p14:creationId xmlns:p14="http://schemas.microsoft.com/office/powerpoint/2010/main" val="3217073466"/>
+      </p:ext>
+    </p:extLst>
+  </p:cSld>
+  <p:clrMapOvr>
+    <a:masterClrMapping/>
+  </p:clrMapOvr>
+</p:sld>
+</file>
+
 <file path=ppt/slides/slide2.xml><?xml version="1.0" encoding="utf-8"?>
 <p:sld xmlns:a="http://schemas.openxmlformats.org/drawingml/2006/main" xmlns:r="http://schemas.openxmlformats.org/officeDocument/2006/relationships" xmlns:p="http://schemas.openxmlformats.org/presentationml/2006/main">
   <p:cSld>

</xml_diff>

<commit_message>
added regex stuff and refs to slide
</commit_message>
<xml_diff>
--- a/Slides_Notes/TextTutorial_Slides.pptx
+++ b/Slides_Notes/TextTutorial_Slides.pptx
@@ -11,19 +11,22 @@
     <p:sldId id="260" r:id="rId5"/>
     <p:sldId id="261" r:id="rId6"/>
     <p:sldId id="259" r:id="rId7"/>
-    <p:sldId id="262" r:id="rId8"/>
-    <p:sldId id="263" r:id="rId9"/>
-    <p:sldId id="264" r:id="rId10"/>
-    <p:sldId id="265" r:id="rId11"/>
-    <p:sldId id="268" r:id="rId12"/>
-    <p:sldId id="267" r:id="rId13"/>
-    <p:sldId id="266" r:id="rId14"/>
-    <p:sldId id="269" r:id="rId15"/>
-    <p:sldId id="270" r:id="rId16"/>
-    <p:sldId id="271" r:id="rId17"/>
-    <p:sldId id="274" r:id="rId18"/>
-    <p:sldId id="272" r:id="rId19"/>
-    <p:sldId id="275" r:id="rId20"/>
+    <p:sldId id="276" r:id="rId8"/>
+    <p:sldId id="277" r:id="rId9"/>
+    <p:sldId id="262" r:id="rId10"/>
+    <p:sldId id="263" r:id="rId11"/>
+    <p:sldId id="264" r:id="rId12"/>
+    <p:sldId id="265" r:id="rId13"/>
+    <p:sldId id="268" r:id="rId14"/>
+    <p:sldId id="267" r:id="rId15"/>
+    <p:sldId id="266" r:id="rId16"/>
+    <p:sldId id="269" r:id="rId17"/>
+    <p:sldId id="270" r:id="rId18"/>
+    <p:sldId id="271" r:id="rId19"/>
+    <p:sldId id="274" r:id="rId20"/>
+    <p:sldId id="272" r:id="rId21"/>
+    <p:sldId id="275" r:id="rId22"/>
+    <p:sldId id="278" r:id="rId23"/>
   </p:sldIdLst>
   <p:sldSz cx="12192000" cy="6858000"/>
   <p:notesSz cx="6858000" cy="9144000"/>
@@ -875,7 +878,7 @@
           <a:p>
             <a:fld id="{53DDECB8-4058-4570-8002-7526A1C799DD}" type="datetimeFigureOut">
               <a:rPr lang="en-GB" smtClean="0"/>
-              <a:t>16/03/2021</a:t>
+              <a:t>29/03/2021</a:t>
             </a:fld>
             <a:endParaRPr lang="en-GB"/>
           </a:p>
@@ -1126,7 +1129,7 @@
           <a:p>
             <a:fld id="{53DDECB8-4058-4570-8002-7526A1C799DD}" type="datetimeFigureOut">
               <a:rPr lang="en-GB" smtClean="0"/>
-              <a:t>16/03/2021</a:t>
+              <a:t>29/03/2021</a:t>
             </a:fld>
             <a:endParaRPr lang="en-GB"/>
           </a:p>
@@ -1440,7 +1443,7 @@
           <a:p>
             <a:fld id="{53DDECB8-4058-4570-8002-7526A1C799DD}" type="datetimeFigureOut">
               <a:rPr lang="en-GB" smtClean="0"/>
-              <a:t>16/03/2021</a:t>
+              <a:t>29/03/2021</a:t>
             </a:fld>
             <a:endParaRPr lang="en-GB"/>
           </a:p>
@@ -1773,7 +1776,7 @@
           <a:p>
             <a:fld id="{53DDECB8-4058-4570-8002-7526A1C799DD}" type="datetimeFigureOut">
               <a:rPr lang="en-GB" smtClean="0"/>
-              <a:t>16/03/2021</a:t>
+              <a:t>29/03/2021</a:t>
             </a:fld>
             <a:endParaRPr lang="en-GB"/>
           </a:p>
@@ -2087,7 +2090,7 @@
           <a:p>
             <a:fld id="{53DDECB8-4058-4570-8002-7526A1C799DD}" type="datetimeFigureOut">
               <a:rPr lang="en-GB" smtClean="0"/>
-              <a:t>16/03/2021</a:t>
+              <a:t>29/03/2021</a:t>
             </a:fld>
             <a:endParaRPr lang="en-GB"/>
           </a:p>
@@ -2480,7 +2483,7 @@
           <a:p>
             <a:fld id="{53DDECB8-4058-4570-8002-7526A1C799DD}" type="datetimeFigureOut">
               <a:rPr lang="en-GB" smtClean="0"/>
-              <a:t>16/03/2021</a:t>
+              <a:t>29/03/2021</a:t>
             </a:fld>
             <a:endParaRPr lang="en-GB"/>
           </a:p>
@@ -2650,7 +2653,7 @@
           <a:p>
             <a:fld id="{53DDECB8-4058-4570-8002-7526A1C799DD}" type="datetimeFigureOut">
               <a:rPr lang="en-GB" smtClean="0"/>
-              <a:t>16/03/2021</a:t>
+              <a:t>29/03/2021</a:t>
             </a:fld>
             <a:endParaRPr lang="en-GB"/>
           </a:p>
@@ -2830,7 +2833,7 @@
           <a:p>
             <a:fld id="{53DDECB8-4058-4570-8002-7526A1C799DD}" type="datetimeFigureOut">
               <a:rPr lang="en-GB" smtClean="0"/>
-              <a:t>16/03/2021</a:t>
+              <a:t>29/03/2021</a:t>
             </a:fld>
             <a:endParaRPr lang="en-GB"/>
           </a:p>
@@ -3000,7 +3003,7 @@
           <a:p>
             <a:fld id="{53DDECB8-4058-4570-8002-7526A1C799DD}" type="datetimeFigureOut">
               <a:rPr lang="en-GB" smtClean="0"/>
-              <a:t>16/03/2021</a:t>
+              <a:t>29/03/2021</a:t>
             </a:fld>
             <a:endParaRPr lang="en-GB"/>
           </a:p>
@@ -3247,7 +3250,7 @@
           <a:p>
             <a:fld id="{53DDECB8-4058-4570-8002-7526A1C799DD}" type="datetimeFigureOut">
               <a:rPr lang="en-GB" smtClean="0"/>
-              <a:t>16/03/2021</a:t>
+              <a:t>29/03/2021</a:t>
             </a:fld>
             <a:endParaRPr lang="en-GB"/>
           </a:p>
@@ -3479,7 +3482,7 @@
           <a:p>
             <a:fld id="{53DDECB8-4058-4570-8002-7526A1C799DD}" type="datetimeFigureOut">
               <a:rPr lang="en-GB" smtClean="0"/>
-              <a:t>16/03/2021</a:t>
+              <a:t>29/03/2021</a:t>
             </a:fld>
             <a:endParaRPr lang="en-GB"/>
           </a:p>
@@ -3853,7 +3856,7 @@
           <a:p>
             <a:fld id="{53DDECB8-4058-4570-8002-7526A1C799DD}" type="datetimeFigureOut">
               <a:rPr lang="en-GB" smtClean="0"/>
-              <a:t>16/03/2021</a:t>
+              <a:t>29/03/2021</a:t>
             </a:fld>
             <a:endParaRPr lang="en-GB"/>
           </a:p>
@@ -3976,7 +3979,7 @@
           <a:p>
             <a:fld id="{53DDECB8-4058-4570-8002-7526A1C799DD}" type="datetimeFigureOut">
               <a:rPr lang="en-GB" smtClean="0"/>
-              <a:t>16/03/2021</a:t>
+              <a:t>29/03/2021</a:t>
             </a:fld>
             <a:endParaRPr lang="en-GB"/>
           </a:p>
@@ -4071,7 +4074,7 @@
           <a:p>
             <a:fld id="{53DDECB8-4058-4570-8002-7526A1C799DD}" type="datetimeFigureOut">
               <a:rPr lang="en-GB" smtClean="0"/>
-              <a:t>16/03/2021</a:t>
+              <a:t>29/03/2021</a:t>
             </a:fld>
             <a:endParaRPr lang="en-GB"/>
           </a:p>
@@ -4326,7 +4329,7 @@
           <a:p>
             <a:fld id="{53DDECB8-4058-4570-8002-7526A1C799DD}" type="datetimeFigureOut">
               <a:rPr lang="en-GB" smtClean="0"/>
-              <a:t>16/03/2021</a:t>
+              <a:t>29/03/2021</a:t>
             </a:fld>
             <a:endParaRPr lang="en-GB"/>
           </a:p>
@@ -4631,7 +4634,7 @@
           <a:p>
             <a:fld id="{53DDECB8-4058-4570-8002-7526A1C799DD}" type="datetimeFigureOut">
               <a:rPr lang="en-GB" smtClean="0"/>
-              <a:t>16/03/2021</a:t>
+              <a:t>29/03/2021</a:t>
             </a:fld>
             <a:endParaRPr lang="en-GB"/>
           </a:p>
@@ -5333,7 +5336,7 @@
           <a:p>
             <a:fld id="{53DDECB8-4058-4570-8002-7526A1C799DD}" type="datetimeFigureOut">
               <a:rPr lang="en-GB" smtClean="0"/>
-              <a:t>16/03/2021</a:t>
+              <a:t>29/03/2021</a:t>
             </a:fld>
             <a:endParaRPr lang="en-GB"/>
           </a:p>
@@ -6211,6 +6214,576 @@
           <a:p>
             <a:r>
               <a:rPr lang="en-GB" dirty="0"/>
+              <a:t>		Step 2: Build our corpus</a:t>
+            </a:r>
+          </a:p>
+        </p:txBody>
+      </p:sp>
+    </p:spTree>
+    <p:extLst>
+      <p:ext uri="{BB962C8B-B14F-4D97-AF65-F5344CB8AC3E}">
+        <p14:creationId xmlns:p14="http://schemas.microsoft.com/office/powerpoint/2010/main" val="919014314"/>
+      </p:ext>
+    </p:extLst>
+  </p:cSld>
+  <p:clrMapOvr>
+    <a:masterClrMapping/>
+  </p:clrMapOvr>
+</p:sld>
+</file>
+
+<file path=ppt/slides/slide11.xml><?xml version="1.0" encoding="utf-8"?>
+<p:sld xmlns:a="http://schemas.openxmlformats.org/drawingml/2006/main" xmlns:r="http://schemas.openxmlformats.org/officeDocument/2006/relationships" xmlns:p="http://schemas.openxmlformats.org/presentationml/2006/main">
+  <p:cSld>
+    <p:spTree>
+      <p:nvGrpSpPr>
+        <p:cNvPr id="1" name=""/>
+        <p:cNvGrpSpPr/>
+        <p:nvPr/>
+      </p:nvGrpSpPr>
+      <p:grpSpPr>
+        <a:xfrm>
+          <a:off x="0" y="0"/>
+          <a:ext cx="0" cy="0"/>
+          <a:chOff x="0" y="0"/>
+          <a:chExt cx="0" cy="0"/>
+        </a:xfrm>
+      </p:grpSpPr>
+      <p:sp>
+        <p:nvSpPr>
+          <p:cNvPr id="2" name="Title 1">
+            <a:extLst>
+              <a:ext uri="{FF2B5EF4-FFF2-40B4-BE49-F238E27FC236}">
+                <a16:creationId xmlns:a16="http://schemas.microsoft.com/office/drawing/2014/main" id="{34C31A18-DFE4-4878-814C-53AFD57BA8D8}"/>
+              </a:ext>
+            </a:extLst>
+          </p:cNvPr>
+          <p:cNvSpPr>
+            <a:spLocks noGrp="1"/>
+          </p:cNvSpPr>
+          <p:nvPr>
+            <p:ph type="title"/>
+          </p:nvPr>
+        </p:nvSpPr>
+        <p:spPr/>
+        <p:txBody>
+          <a:bodyPr/>
+          <a:lstStyle/>
+          <a:p>
+            <a:r>
+              <a:rPr lang="en-GB" dirty="0"/>
+              <a:t>What is a token / tokenisation?</a:t>
+            </a:r>
+          </a:p>
+        </p:txBody>
+      </p:sp>
+      <p:sp>
+        <p:nvSpPr>
+          <p:cNvPr id="3" name="Content Placeholder 2">
+            <a:extLst>
+              <a:ext uri="{FF2B5EF4-FFF2-40B4-BE49-F238E27FC236}">
+                <a16:creationId xmlns:a16="http://schemas.microsoft.com/office/drawing/2014/main" id="{AC5AC0E2-9AEC-4384-A074-F31E9C926873}"/>
+              </a:ext>
+            </a:extLst>
+          </p:cNvPr>
+          <p:cNvSpPr>
+            <a:spLocks noGrp="1"/>
+          </p:cNvSpPr>
+          <p:nvPr>
+            <p:ph idx="1"/>
+          </p:nvPr>
+        </p:nvSpPr>
+        <p:spPr>
+          <a:xfrm>
+            <a:off x="677334" y="1508289"/>
+            <a:ext cx="8596668" cy="4533073"/>
+          </a:xfrm>
+        </p:spPr>
+        <p:txBody>
+          <a:bodyPr>
+            <a:normAutofit/>
+          </a:bodyPr>
+          <a:lstStyle/>
+          <a:p>
+            <a:r>
+              <a:rPr lang="en-GB" sz="2000" dirty="0"/>
+              <a:t>Tokens are the individual units of meaning</a:t>
+            </a:r>
+          </a:p>
+          <a:p>
+            <a:pPr lvl="1"/>
+            <a:r>
+              <a:rPr lang="en-GB" sz="1800" dirty="0"/>
+              <a:t>Words, numbers, punctuation, phonemes, or even full sentences. </a:t>
+            </a:r>
+          </a:p>
+          <a:p>
+            <a:pPr lvl="1"/>
+            <a:r>
+              <a:rPr lang="en-GB" sz="1800" dirty="0"/>
+              <a:t>Tokenization is the process of breaking text documents apart into those pieces </a:t>
+            </a:r>
+          </a:p>
+          <a:p>
+            <a:r>
+              <a:rPr lang="en-GB" sz="2000" b="1" i="1" dirty="0" err="1"/>
+              <a:t>quanteda:tokens</a:t>
+            </a:r>
+            <a:r>
+              <a:rPr lang="en-GB" sz="2000" b="1" i="1" dirty="0"/>
+              <a:t>()</a:t>
+            </a:r>
+          </a:p>
+          <a:p>
+            <a:pPr lvl="1"/>
+            <a:r>
+              <a:rPr lang="en-GB" sz="1800" dirty="0"/>
+              <a:t>segments texts in a corpus into tokens by boundaries (separators)</a:t>
+            </a:r>
+          </a:p>
+          <a:p>
+            <a:pPr lvl="1"/>
+            <a:r>
+              <a:rPr lang="en-GB" sz="1800" dirty="0"/>
+              <a:t>Stored in a list of vectors</a:t>
+            </a:r>
+          </a:p>
+          <a:p>
+            <a:pPr lvl="1"/>
+            <a:r>
+              <a:rPr lang="en-GB" sz="1800" dirty="0"/>
+              <a:t>More efficient than character strings, preserves positions of words</a:t>
+            </a:r>
+          </a:p>
+          <a:p>
+            <a:pPr lvl="1"/>
+            <a:endParaRPr lang="en-GB" sz="1800" dirty="0"/>
+          </a:p>
+          <a:p>
+            <a:pPr lvl="1"/>
+            <a:endParaRPr lang="en-GB" dirty="0"/>
+          </a:p>
+        </p:txBody>
+      </p:sp>
+      <p:sp>
+        <p:nvSpPr>
+          <p:cNvPr id="5" name="Oval 4">
+            <a:extLst>
+              <a:ext uri="{FF2B5EF4-FFF2-40B4-BE49-F238E27FC236}">
+                <a16:creationId xmlns:a16="http://schemas.microsoft.com/office/drawing/2014/main" id="{BFD45A6E-1D50-4240-89A7-9D40642CC831}"/>
+              </a:ext>
+            </a:extLst>
+          </p:cNvPr>
+          <p:cNvSpPr/>
+          <p:nvPr/>
+        </p:nvSpPr>
+        <p:spPr>
+          <a:xfrm>
+            <a:off x="10279755" y="4019682"/>
+            <a:ext cx="1234911" cy="690880"/>
+          </a:xfrm>
+          <a:prstGeom prst="ellipse">
+            <a:avLst/>
+          </a:prstGeom>
+          <a:noFill/>
+          <a:ln w="41275"/>
+        </p:spPr>
+        <p:style>
+          <a:lnRef idx="2">
+            <a:schemeClr val="accent1">
+              <a:shade val="50000"/>
+            </a:schemeClr>
+          </a:lnRef>
+          <a:fillRef idx="1">
+            <a:schemeClr val="accent1"/>
+          </a:fillRef>
+          <a:effectRef idx="0">
+            <a:schemeClr val="accent1"/>
+          </a:effectRef>
+          <a:fontRef idx="minor">
+            <a:schemeClr val="lt1"/>
+          </a:fontRef>
+        </p:style>
+        <p:txBody>
+          <a:bodyPr rtlCol="0" anchor="ctr"/>
+          <a:lstStyle/>
+          <a:p>
+            <a:pPr algn="ctr"/>
+            <a:endParaRPr lang="en-GB"/>
+          </a:p>
+        </p:txBody>
+      </p:sp>
+      <p:grpSp>
+        <p:nvGrpSpPr>
+          <p:cNvPr id="10" name="Group 9">
+            <a:extLst>
+              <a:ext uri="{FF2B5EF4-FFF2-40B4-BE49-F238E27FC236}">
+                <a16:creationId xmlns:a16="http://schemas.microsoft.com/office/drawing/2014/main" id="{CD593CDE-B7BE-4848-9D26-534C2A77F906}"/>
+              </a:ext>
+            </a:extLst>
+          </p:cNvPr>
+          <p:cNvGrpSpPr/>
+          <p:nvPr/>
+        </p:nvGrpSpPr>
+        <p:grpSpPr>
+          <a:xfrm>
+            <a:off x="8473440" y="3555311"/>
+            <a:ext cx="3549649" cy="3062342"/>
+            <a:chOff x="8473440" y="3555311"/>
+            <a:chExt cx="3549649" cy="3062342"/>
+          </a:xfrm>
+        </p:grpSpPr>
+        <p:grpSp>
+          <p:nvGrpSpPr>
+            <p:cNvPr id="8" name="Group 7">
+              <a:extLst>
+                <a:ext uri="{FF2B5EF4-FFF2-40B4-BE49-F238E27FC236}">
+                  <a16:creationId xmlns:a16="http://schemas.microsoft.com/office/drawing/2014/main" id="{BD6E3E31-97AA-408C-8487-E3F86BD8CD68}"/>
+                </a:ext>
+              </a:extLst>
+            </p:cNvPr>
+            <p:cNvGrpSpPr/>
+            <p:nvPr/>
+          </p:nvGrpSpPr>
+          <p:grpSpPr>
+            <a:xfrm>
+              <a:off x="8473440" y="3555311"/>
+              <a:ext cx="3549649" cy="3062342"/>
+              <a:chOff x="8473440" y="3555311"/>
+              <a:chExt cx="3549649" cy="3062342"/>
+            </a:xfrm>
+          </p:grpSpPr>
+          <p:pic>
+            <p:nvPicPr>
+              <p:cNvPr id="4" name="Picture 3">
+                <a:extLst>
+                  <a:ext uri="{FF2B5EF4-FFF2-40B4-BE49-F238E27FC236}">
+                    <a16:creationId xmlns:a16="http://schemas.microsoft.com/office/drawing/2014/main" id="{D69F473C-1362-4410-85C6-E3743F50CFE2}"/>
+                  </a:ext>
+                </a:extLst>
+              </p:cNvPr>
+              <p:cNvPicPr>
+                <a:picLocks noChangeAspect="1"/>
+              </p:cNvPicPr>
+              <p:nvPr/>
+            </p:nvPicPr>
+            <p:blipFill>
+              <a:blip r:embed="rId2"/>
+              <a:stretch>
+                <a:fillRect/>
+              </a:stretch>
+            </p:blipFill>
+            <p:spPr>
+              <a:xfrm>
+                <a:off x="8473440" y="3555311"/>
+                <a:ext cx="3549649" cy="3062342"/>
+              </a:xfrm>
+              <a:prstGeom prst="rect">
+                <a:avLst/>
+              </a:prstGeom>
+            </p:spPr>
+          </p:pic>
+          <p:sp>
+            <p:nvSpPr>
+              <p:cNvPr id="6" name="Rectangle 5">
+                <a:extLst>
+                  <a:ext uri="{FF2B5EF4-FFF2-40B4-BE49-F238E27FC236}">
+                    <a16:creationId xmlns:a16="http://schemas.microsoft.com/office/drawing/2014/main" id="{FBFC9AFE-45E0-4BF9-A8A0-68502564733B}"/>
+                  </a:ext>
+                </a:extLst>
+              </p:cNvPr>
+              <p:cNvSpPr/>
+              <p:nvPr/>
+            </p:nvSpPr>
+            <p:spPr>
+              <a:xfrm>
+                <a:off x="8473440" y="4876800"/>
+                <a:ext cx="1473200" cy="1239520"/>
+              </a:xfrm>
+              <a:prstGeom prst="rect">
+                <a:avLst/>
+              </a:prstGeom>
+              <a:solidFill>
+                <a:schemeClr val="bg1"/>
+              </a:solidFill>
+              <a:ln>
+                <a:noFill/>
+              </a:ln>
+            </p:spPr>
+            <p:style>
+              <a:lnRef idx="2">
+                <a:schemeClr val="accent1">
+                  <a:shade val="50000"/>
+                </a:schemeClr>
+              </a:lnRef>
+              <a:fillRef idx="1">
+                <a:schemeClr val="accent1"/>
+              </a:fillRef>
+              <a:effectRef idx="0">
+                <a:schemeClr val="accent1"/>
+              </a:effectRef>
+              <a:fontRef idx="minor">
+                <a:schemeClr val="lt1"/>
+              </a:fontRef>
+            </p:style>
+            <p:txBody>
+              <a:bodyPr rtlCol="0" anchor="ctr"/>
+              <a:lstStyle/>
+              <a:p>
+                <a:pPr algn="ctr"/>
+                <a:endParaRPr lang="en-GB"/>
+              </a:p>
+            </p:txBody>
+          </p:sp>
+          <p:sp>
+            <p:nvSpPr>
+              <p:cNvPr id="7" name="Rectangle 6">
+                <a:extLst>
+                  <a:ext uri="{FF2B5EF4-FFF2-40B4-BE49-F238E27FC236}">
+                    <a16:creationId xmlns:a16="http://schemas.microsoft.com/office/drawing/2014/main" id="{8718CEDE-129E-45E1-9655-764FA5ACEF0E}"/>
+                  </a:ext>
+                </a:extLst>
+              </p:cNvPr>
+              <p:cNvSpPr/>
+              <p:nvPr/>
+            </p:nvSpPr>
+            <p:spPr>
+              <a:xfrm>
+                <a:off x="9743440" y="5476240"/>
+                <a:ext cx="721360" cy="565122"/>
+              </a:xfrm>
+              <a:prstGeom prst="rect">
+                <a:avLst/>
+              </a:prstGeom>
+              <a:solidFill>
+                <a:schemeClr val="bg1"/>
+              </a:solidFill>
+              <a:ln>
+                <a:noFill/>
+              </a:ln>
+            </p:spPr>
+            <p:style>
+              <a:lnRef idx="2">
+                <a:schemeClr val="accent1">
+                  <a:shade val="50000"/>
+                </a:schemeClr>
+              </a:lnRef>
+              <a:fillRef idx="1">
+                <a:schemeClr val="accent1"/>
+              </a:fillRef>
+              <a:effectRef idx="0">
+                <a:schemeClr val="accent1"/>
+              </a:effectRef>
+              <a:fontRef idx="minor">
+                <a:schemeClr val="lt1"/>
+              </a:fontRef>
+            </p:style>
+            <p:txBody>
+              <a:bodyPr rtlCol="0" anchor="ctr"/>
+              <a:lstStyle/>
+              <a:p>
+                <a:pPr algn="ctr"/>
+                <a:endParaRPr lang="en-GB"/>
+              </a:p>
+            </p:txBody>
+          </p:sp>
+        </p:grpSp>
+        <p:sp>
+          <p:nvSpPr>
+            <p:cNvPr id="9" name="Oval 8">
+              <a:extLst>
+                <a:ext uri="{FF2B5EF4-FFF2-40B4-BE49-F238E27FC236}">
+                  <a16:creationId xmlns:a16="http://schemas.microsoft.com/office/drawing/2014/main" id="{279ED239-9122-470A-B0C9-8F1D7E13B31B}"/>
+                </a:ext>
+              </a:extLst>
+            </p:cNvPr>
+            <p:cNvSpPr/>
+            <p:nvPr/>
+          </p:nvSpPr>
+          <p:spPr>
+            <a:xfrm>
+              <a:off x="9652000" y="4765200"/>
+              <a:ext cx="1107440" cy="656402"/>
+            </a:xfrm>
+            <a:prstGeom prst="ellipse">
+              <a:avLst/>
+            </a:prstGeom>
+            <a:noFill/>
+            <a:ln w="31750"/>
+          </p:spPr>
+          <p:style>
+            <a:lnRef idx="2">
+              <a:schemeClr val="accent1">
+                <a:shade val="50000"/>
+              </a:schemeClr>
+            </a:lnRef>
+            <a:fillRef idx="1">
+              <a:schemeClr val="accent1"/>
+            </a:fillRef>
+            <a:effectRef idx="0">
+              <a:schemeClr val="accent1"/>
+            </a:effectRef>
+            <a:fontRef idx="minor">
+              <a:schemeClr val="lt1"/>
+            </a:fontRef>
+          </p:style>
+          <p:txBody>
+            <a:bodyPr rtlCol="0" anchor="ctr"/>
+            <a:lstStyle/>
+            <a:p>
+              <a:pPr algn="ctr"/>
+              <a:endParaRPr lang="en-GB"/>
+            </a:p>
+          </p:txBody>
+        </p:sp>
+      </p:grpSp>
+    </p:spTree>
+    <p:extLst>
+      <p:ext uri="{BB962C8B-B14F-4D97-AF65-F5344CB8AC3E}">
+        <p14:creationId xmlns:p14="http://schemas.microsoft.com/office/powerpoint/2010/main" val="1635539682"/>
+      </p:ext>
+    </p:extLst>
+  </p:cSld>
+  <p:clrMapOvr>
+    <a:masterClrMapping/>
+  </p:clrMapOvr>
+</p:sld>
+</file>
+
+<file path=ppt/slides/slide12.xml><?xml version="1.0" encoding="utf-8"?>
+<p:sld xmlns:a="http://schemas.openxmlformats.org/drawingml/2006/main" xmlns:r="http://schemas.openxmlformats.org/officeDocument/2006/relationships" xmlns:p="http://schemas.openxmlformats.org/presentationml/2006/main">
+  <p:cSld>
+    <p:spTree>
+      <p:nvGrpSpPr>
+        <p:cNvPr id="1" name=""/>
+        <p:cNvGrpSpPr/>
+        <p:nvPr/>
+      </p:nvGrpSpPr>
+      <p:grpSpPr>
+        <a:xfrm>
+          <a:off x="0" y="0"/>
+          <a:ext cx="0" cy="0"/>
+          <a:chOff x="0" y="0"/>
+          <a:chExt cx="0" cy="0"/>
+        </a:xfrm>
+      </p:grpSpPr>
+      <p:sp>
+        <p:nvSpPr>
+          <p:cNvPr id="2" name="Title 1">
+            <a:extLst>
+              <a:ext uri="{FF2B5EF4-FFF2-40B4-BE49-F238E27FC236}">
+                <a16:creationId xmlns:a16="http://schemas.microsoft.com/office/drawing/2014/main" id="{4F266FBD-D6FF-49DB-9211-E4018C3533AD}"/>
+              </a:ext>
+            </a:extLst>
+          </p:cNvPr>
+          <p:cNvSpPr txBox="1">
+            <a:spLocks/>
+          </p:cNvSpPr>
+          <p:nvPr/>
+        </p:nvSpPr>
+        <p:spPr>
+          <a:xfrm>
+            <a:off x="860214" y="2484120"/>
+            <a:ext cx="8596668" cy="1710808"/>
+          </a:xfrm>
+          <a:prstGeom prst="rect">
+            <a:avLst/>
+          </a:prstGeom>
+        </p:spPr>
+        <p:txBody>
+          <a:bodyPr/>
+          <a:lstStyle>
+            <a:lvl1pPr algn="l" defTabSz="457200" rtl="0" eaLnBrk="1" latinLnBrk="0" hangingPunct="1">
+              <a:spcBef>
+                <a:spcPct val="0"/>
+              </a:spcBef>
+              <a:buNone/>
+              <a:defRPr sz="3600" kern="1200">
+                <a:solidFill>
+                  <a:schemeClr val="accent1"/>
+                </a:solidFill>
+                <a:latin typeface="+mj-lt"/>
+                <a:ea typeface="+mj-ea"/>
+                <a:cs typeface="+mj-cs"/>
+              </a:defRPr>
+            </a:lvl1pPr>
+            <a:lvl2pPr eaLnBrk="1" hangingPunct="1">
+              <a:defRPr>
+                <a:solidFill>
+                  <a:schemeClr val="tx2"/>
+                </a:solidFill>
+              </a:defRPr>
+            </a:lvl2pPr>
+            <a:lvl3pPr eaLnBrk="1" hangingPunct="1">
+              <a:defRPr>
+                <a:solidFill>
+                  <a:schemeClr val="tx2"/>
+                </a:solidFill>
+              </a:defRPr>
+            </a:lvl3pPr>
+            <a:lvl4pPr eaLnBrk="1" hangingPunct="1">
+              <a:defRPr>
+                <a:solidFill>
+                  <a:schemeClr val="tx2"/>
+                </a:solidFill>
+              </a:defRPr>
+            </a:lvl4pPr>
+            <a:lvl5pPr eaLnBrk="1" hangingPunct="1">
+              <a:defRPr>
+                <a:solidFill>
+                  <a:schemeClr val="tx2"/>
+                </a:solidFill>
+              </a:defRPr>
+            </a:lvl5pPr>
+            <a:lvl6pPr eaLnBrk="1" hangingPunct="1">
+              <a:defRPr>
+                <a:solidFill>
+                  <a:schemeClr val="tx2"/>
+                </a:solidFill>
+              </a:defRPr>
+            </a:lvl6pPr>
+            <a:lvl7pPr eaLnBrk="1" hangingPunct="1">
+              <a:defRPr>
+                <a:solidFill>
+                  <a:schemeClr val="tx2"/>
+                </a:solidFill>
+              </a:defRPr>
+            </a:lvl7pPr>
+            <a:lvl8pPr eaLnBrk="1" hangingPunct="1">
+              <a:defRPr>
+                <a:solidFill>
+                  <a:schemeClr val="tx2"/>
+                </a:solidFill>
+              </a:defRPr>
+            </a:lvl8pPr>
+            <a:lvl9pPr eaLnBrk="1" hangingPunct="1">
+              <a:defRPr>
+                <a:solidFill>
+                  <a:schemeClr val="tx2"/>
+                </a:solidFill>
+              </a:defRPr>
+            </a:lvl9pPr>
+          </a:lstStyle>
+          <a:p>
+            <a:r>
+              <a:rPr lang="en-GB" dirty="0"/>
+              <a:t>Go to </a:t>
+            </a:r>
+            <a:r>
+              <a:rPr lang="en-GB" dirty="0" err="1"/>
+              <a:t>Rmarkdown</a:t>
+            </a:r>
+            <a:r>
+              <a:rPr lang="en-GB" dirty="0"/>
+              <a:t> tutorial:</a:t>
+            </a:r>
+          </a:p>
+          <a:p>
+            <a:endParaRPr lang="en-GB" dirty="0"/>
+          </a:p>
+          <a:p>
+            <a:r>
+              <a:rPr lang="en-GB" dirty="0"/>
               <a:t>		Step 3: Get the tweet tokens</a:t>
             </a:r>
           </a:p>
@@ -6229,7 +6802,7 @@
 </p:sld>
 </file>
 
-<file path=ppt/slides/slide11.xml><?xml version="1.0" encoding="utf-8"?>
+<file path=ppt/slides/slide13.xml><?xml version="1.0" encoding="utf-8"?>
 <p:sld xmlns:a="http://schemas.openxmlformats.org/drawingml/2006/main" xmlns:r="http://schemas.openxmlformats.org/officeDocument/2006/relationships" xmlns:p="http://schemas.openxmlformats.org/presentationml/2006/main">
   <p:cSld>
     <p:spTree>
@@ -6641,7 +7214,7 @@
 </p:sld>
 </file>
 
-<file path=ppt/slides/slide12.xml><?xml version="1.0" encoding="utf-8"?>
+<file path=ppt/slides/slide14.xml><?xml version="1.0" encoding="utf-8"?>
 <p:sld xmlns:a="http://schemas.openxmlformats.org/drawingml/2006/main" xmlns:r="http://schemas.openxmlformats.org/officeDocument/2006/relationships" xmlns:p="http://schemas.openxmlformats.org/presentationml/2006/main">
   <p:cSld>
     <p:spTree>
@@ -6798,7 +7371,7 @@
 </p:sld>
 </file>
 
-<file path=ppt/slides/slide13.xml><?xml version="1.0" encoding="utf-8"?>
+<file path=ppt/slides/slide15.xml><?xml version="1.0" encoding="utf-8"?>
 <p:sld xmlns:a="http://schemas.openxmlformats.org/drawingml/2006/main" xmlns:r="http://schemas.openxmlformats.org/officeDocument/2006/relationships" xmlns:p="http://schemas.openxmlformats.org/presentationml/2006/main">
   <p:cSld>
     <p:spTree>
@@ -7461,7 +8034,7 @@
 </p:sld>
 </file>
 
-<file path=ppt/slides/slide14.xml><?xml version="1.0" encoding="utf-8"?>
+<file path=ppt/slides/slide16.xml><?xml version="1.0" encoding="utf-8"?>
 <p:sld xmlns:a="http://schemas.openxmlformats.org/drawingml/2006/main" xmlns:r="http://schemas.openxmlformats.org/officeDocument/2006/relationships" xmlns:p="http://schemas.openxmlformats.org/presentationml/2006/main">
   <p:cSld>
     <p:spTree>
@@ -7626,7 +8199,7 @@
 </p:sld>
 </file>
 
-<file path=ppt/slides/slide15.xml><?xml version="1.0" encoding="utf-8"?>
+<file path=ppt/slides/slide17.xml><?xml version="1.0" encoding="utf-8"?>
 <p:sld xmlns:a="http://schemas.openxmlformats.org/drawingml/2006/main" xmlns:r="http://schemas.openxmlformats.org/officeDocument/2006/relationships" xmlns:p="http://schemas.openxmlformats.org/presentationml/2006/main">
   <p:cSld>
     <p:spTree>
@@ -7778,7 +8351,7 @@
 </p:sld>
 </file>
 
-<file path=ppt/slides/slide16.xml><?xml version="1.0" encoding="utf-8"?>
+<file path=ppt/slides/slide18.xml><?xml version="1.0" encoding="utf-8"?>
 <p:sld xmlns:a="http://schemas.openxmlformats.org/drawingml/2006/main" xmlns:r="http://schemas.openxmlformats.org/officeDocument/2006/relationships" xmlns:p="http://schemas.openxmlformats.org/presentationml/2006/main">
   <p:cSld>
     <p:spTree>
@@ -10011,7 +10584,7 @@
 </p:sld>
 </file>
 
-<file path=ppt/slides/slide17.xml><?xml version="1.0" encoding="utf-8"?>
+<file path=ppt/slides/slide19.xml><?xml version="1.0" encoding="utf-8"?>
 <p:sld xmlns:a="http://schemas.openxmlformats.org/drawingml/2006/main" xmlns:r="http://schemas.openxmlformats.org/officeDocument/2006/relationships" xmlns:p="http://schemas.openxmlformats.org/presentationml/2006/main">
   <p:cSld>
     <p:spTree>
@@ -10305,7 +10878,171 @@
 </p:sld>
 </file>
 
-<file path=ppt/slides/slide18.xml><?xml version="1.0" encoding="utf-8"?>
+<file path=ppt/slides/slide2.xml><?xml version="1.0" encoding="utf-8"?>
+<p:sld xmlns:a="http://schemas.openxmlformats.org/drawingml/2006/main" xmlns:r="http://schemas.openxmlformats.org/officeDocument/2006/relationships" xmlns:p="http://schemas.openxmlformats.org/presentationml/2006/main">
+  <p:cSld>
+    <p:spTree>
+      <p:nvGrpSpPr>
+        <p:cNvPr id="1" name=""/>
+        <p:cNvGrpSpPr/>
+        <p:nvPr/>
+      </p:nvGrpSpPr>
+      <p:grpSpPr>
+        <a:xfrm>
+          <a:off x="0" y="0"/>
+          <a:ext cx="0" cy="0"/>
+          <a:chOff x="0" y="0"/>
+          <a:chExt cx="0" cy="0"/>
+        </a:xfrm>
+      </p:grpSpPr>
+      <p:sp>
+        <p:nvSpPr>
+          <p:cNvPr id="2" name="Title 1">
+            <a:extLst>
+              <a:ext uri="{FF2B5EF4-FFF2-40B4-BE49-F238E27FC236}">
+                <a16:creationId xmlns:a16="http://schemas.microsoft.com/office/drawing/2014/main" id="{30EAC902-62C9-4721-AD8A-AB6C361CDF32}"/>
+              </a:ext>
+            </a:extLst>
+          </p:cNvPr>
+          <p:cNvSpPr>
+            <a:spLocks noGrp="1"/>
+          </p:cNvSpPr>
+          <p:nvPr>
+            <p:ph type="title"/>
+          </p:nvPr>
+        </p:nvSpPr>
+        <p:spPr>
+          <a:xfrm>
+            <a:off x="677334" y="609600"/>
+            <a:ext cx="8596668" cy="964676"/>
+          </a:xfrm>
+        </p:spPr>
+        <p:txBody>
+          <a:bodyPr/>
+          <a:lstStyle/>
+          <a:p>
+            <a:r>
+              <a:rPr lang="en-GB" dirty="0"/>
+              <a:t>Methods</a:t>
+            </a:r>
+          </a:p>
+        </p:txBody>
+      </p:sp>
+      <p:sp>
+        <p:nvSpPr>
+          <p:cNvPr id="3" name="Content Placeholder 2">
+            <a:extLst>
+              <a:ext uri="{FF2B5EF4-FFF2-40B4-BE49-F238E27FC236}">
+                <a16:creationId xmlns:a16="http://schemas.microsoft.com/office/drawing/2014/main" id="{081663B7-3F52-49AA-ACE9-F87C083FDCA7}"/>
+              </a:ext>
+            </a:extLst>
+          </p:cNvPr>
+          <p:cNvSpPr>
+            <a:spLocks noGrp="1"/>
+          </p:cNvSpPr>
+          <p:nvPr>
+            <p:ph idx="1"/>
+          </p:nvPr>
+        </p:nvSpPr>
+        <p:spPr>
+          <a:xfrm>
+            <a:off x="677334" y="1574276"/>
+            <a:ext cx="8596668" cy="4674124"/>
+          </a:xfrm>
+        </p:spPr>
+        <p:txBody>
+          <a:bodyPr>
+            <a:noAutofit/>
+          </a:bodyPr>
+          <a:lstStyle/>
+          <a:p>
+            <a:r>
+              <a:rPr lang="en-GB" sz="1900" dirty="0"/>
+              <a:t>lexical analysis </a:t>
+            </a:r>
+          </a:p>
+          <a:p>
+            <a:pPr lvl="1"/>
+            <a:r>
+              <a:rPr lang="en-GB" sz="1900" dirty="0"/>
+              <a:t>word frequency distributions, </a:t>
+            </a:r>
+            <a:r>
+              <a:rPr lang="en-GB" sz="1900" dirty="0">
+                <a:solidFill>
+                  <a:srgbClr val="333333"/>
+                </a:solidFill>
+                <a:effectLst/>
+                <a:ea typeface="Calibri" panose="020F0502020204030204" pitchFamily="34" charset="0"/>
+                <a:cs typeface="Calibri" panose="020F0502020204030204" pitchFamily="34" charset="0"/>
+              </a:rPr>
+              <a:t>key term extraction, co-occurrence analysis</a:t>
+            </a:r>
+            <a:endParaRPr lang="en-GB" sz="1900" dirty="0"/>
+          </a:p>
+          <a:p>
+            <a:pPr lvl="1"/>
+            <a:r>
+              <a:rPr lang="en-GB" sz="1900" dirty="0"/>
+              <a:t>pattern recognition, parts of speech tagging, information extraction</a:t>
+            </a:r>
+          </a:p>
+          <a:p>
+            <a:pPr lvl="1"/>
+            <a:r>
+              <a:rPr lang="en-GB" sz="1900" dirty="0"/>
+              <a:t>sentiment analyses (identifying emotion or opinion in text)</a:t>
+            </a:r>
+          </a:p>
+          <a:p>
+            <a:r>
+              <a:rPr lang="en-GB" sz="1900" dirty="0"/>
+              <a:t>machine learning approaches</a:t>
+            </a:r>
+          </a:p>
+          <a:p>
+            <a:pPr lvl="1"/>
+            <a:r>
+              <a:rPr lang="en-GB" sz="1900" dirty="0"/>
+              <a:t>topic modelling, supervised and unsupervised classification, clustering</a:t>
+            </a:r>
+          </a:p>
+          <a:p>
+            <a:pPr lvl="1"/>
+            <a:r>
+              <a:rPr lang="en-GB" sz="1900" dirty="0"/>
+              <a:t>content analysis (looks at word choice – common in social sciences)</a:t>
+            </a:r>
+          </a:p>
+          <a:p>
+            <a:pPr lvl="1"/>
+            <a:r>
+              <a:rPr lang="en-GB" sz="1900" dirty="0"/>
+              <a:t>prediction</a:t>
+            </a:r>
+          </a:p>
+          <a:p>
+            <a:r>
+              <a:rPr lang="en-GB" sz="1900" dirty="0"/>
+              <a:t>visualization</a:t>
+            </a:r>
+          </a:p>
+        </p:txBody>
+      </p:sp>
+    </p:spTree>
+    <p:extLst>
+      <p:ext uri="{BB962C8B-B14F-4D97-AF65-F5344CB8AC3E}">
+        <p14:creationId xmlns:p14="http://schemas.microsoft.com/office/powerpoint/2010/main" val="3552954431"/>
+      </p:ext>
+    </p:extLst>
+  </p:cSld>
+  <p:clrMapOvr>
+    <a:masterClrMapping/>
+  </p:clrMapOvr>
+</p:sld>
+</file>
+
+<file path=ppt/slides/slide20.xml><?xml version="1.0" encoding="utf-8"?>
 <p:sld xmlns:a="http://schemas.openxmlformats.org/drawingml/2006/main" xmlns:r="http://schemas.openxmlformats.org/officeDocument/2006/relationships" xmlns:p="http://schemas.openxmlformats.org/presentationml/2006/main">
   <p:cSld>
     <p:spTree>
@@ -10457,7 +11194,7 @@
 </p:sld>
 </file>
 
-<file path=ppt/slides/slide19.xml><?xml version="1.0" encoding="utf-8"?>
+<file path=ppt/slides/slide21.xml><?xml version="1.0" encoding="utf-8"?>
 <p:sld xmlns:a="http://schemas.openxmlformats.org/drawingml/2006/main" xmlns:r="http://schemas.openxmlformats.org/officeDocument/2006/relationships" xmlns:p="http://schemas.openxmlformats.org/presentationml/2006/main">
   <p:cSld>
     <p:spTree>
@@ -10657,7 +11394,7 @@
 </p:sld>
 </file>
 
-<file path=ppt/slides/slide2.xml><?xml version="1.0" encoding="utf-8"?>
+<file path=ppt/slides/slide22.xml><?xml version="1.0" encoding="utf-8"?>
 <p:sld xmlns:a="http://schemas.openxmlformats.org/drawingml/2006/main" xmlns:r="http://schemas.openxmlformats.org/officeDocument/2006/relationships" xmlns:p="http://schemas.openxmlformats.org/presentationml/2006/main">
   <p:cSld>
     <p:spTree>
@@ -10679,7 +11416,7 @@
           <p:cNvPr id="2" name="Title 1">
             <a:extLst>
               <a:ext uri="{FF2B5EF4-FFF2-40B4-BE49-F238E27FC236}">
-                <a16:creationId xmlns:a16="http://schemas.microsoft.com/office/drawing/2014/main" id="{30EAC902-62C9-4721-AD8A-AB6C361CDF32}"/>
+                <a16:creationId xmlns:a16="http://schemas.microsoft.com/office/drawing/2014/main" id="{614D59DB-DE81-41D9-BE51-EA51057E4704}"/>
               </a:ext>
             </a:extLst>
           </p:cNvPr>
@@ -10690,19 +11427,14 @@
             <p:ph type="title"/>
           </p:nvPr>
         </p:nvSpPr>
-        <p:spPr>
-          <a:xfrm>
-            <a:off x="677334" y="609600"/>
-            <a:ext cx="8596668" cy="964676"/>
-          </a:xfrm>
-        </p:spPr>
+        <p:spPr/>
         <p:txBody>
           <a:bodyPr/>
           <a:lstStyle/>
           <a:p>
             <a:r>
               <a:rPr lang="en-GB" dirty="0"/>
-              <a:t>Methods</a:t>
+              <a:t>Links to useful resources</a:t>
             </a:r>
           </a:p>
         </p:txBody>
@@ -10712,7 +11444,7 @@
           <p:cNvPr id="3" name="Content Placeholder 2">
             <a:extLst>
               <a:ext uri="{FF2B5EF4-FFF2-40B4-BE49-F238E27FC236}">
-                <a16:creationId xmlns:a16="http://schemas.microsoft.com/office/drawing/2014/main" id="{081663B7-3F52-49AA-ACE9-F87C083FDCA7}"/>
+                <a16:creationId xmlns:a16="http://schemas.microsoft.com/office/drawing/2014/main" id="{932A848C-B081-460A-A4F9-D77CC33FF858}"/>
               </a:ext>
             </a:extLst>
           </p:cNvPr>
@@ -10723,103 +11455,55 @@
             <p:ph idx="1"/>
           </p:nvPr>
         </p:nvSpPr>
-        <p:spPr>
-          <a:xfrm>
-            <a:off x="677334" y="1574276"/>
-            <a:ext cx="8596668" cy="4674124"/>
-          </a:xfrm>
-        </p:spPr>
+        <p:spPr/>
         <p:txBody>
-          <a:bodyPr>
-            <a:noAutofit/>
-          </a:bodyPr>
+          <a:bodyPr/>
           <a:lstStyle/>
           <a:p>
             <a:r>
-              <a:rPr lang="en-GB" sz="1900" dirty="0"/>
-              <a:t>lexical analysis </a:t>
-            </a:r>
-          </a:p>
-          <a:p>
-            <a:pPr lvl="1"/>
-            <a:r>
-              <a:rPr lang="en-GB" sz="1900" dirty="0"/>
-              <a:t>word frequency distributions, </a:t>
-            </a:r>
-            <a:r>
-              <a:rPr lang="en-GB" sz="1900" dirty="0">
-                <a:solidFill>
-                  <a:srgbClr val="333333"/>
-                </a:solidFill>
-                <a:effectLst/>
-                <a:ea typeface="Calibri" panose="020F0502020204030204" pitchFamily="34" charset="0"/>
-                <a:cs typeface="Calibri" panose="020F0502020204030204" pitchFamily="34" charset="0"/>
+              <a:rPr lang="en-GB" dirty="0">
+                <a:hlinkClick r:id="rId2"/>
               </a:rPr>
-              <a:t>key term extraction, co-occurrence analysis</a:t>
-            </a:r>
-            <a:endParaRPr lang="en-GB" sz="1900" dirty="0"/>
-          </a:p>
-          <a:p>
-            <a:pPr lvl="1"/>
-            <a:r>
-              <a:rPr lang="en-GB" sz="1900" dirty="0"/>
-              <a:t>pattern recognition, </a:t>
-            </a:r>
-            <a:r>
-              <a:rPr lang="en-GB" sz="1900" dirty="0" err="1"/>
-              <a:t>PoS</a:t>
-            </a:r>
-            <a:r>
-              <a:rPr lang="en-GB" sz="1900" dirty="0"/>
-              <a:t> tagging, annotation, information extraction</a:t>
-            </a:r>
-          </a:p>
-          <a:p>
-            <a:pPr lvl="1"/>
-            <a:r>
-              <a:rPr lang="en-GB" sz="1900" dirty="0"/>
-              <a:t>sentiment analyses (identifying emotion or opinion in text)</a:t>
-            </a:r>
-          </a:p>
-          <a:p>
-            <a:r>
-              <a:rPr lang="en-GB" sz="1900" dirty="0"/>
-              <a:t>machine learning approaches</a:t>
-            </a:r>
-          </a:p>
-          <a:p>
-            <a:pPr lvl="1"/>
-            <a:r>
-              <a:rPr lang="en-GB" sz="1900" dirty="0"/>
-              <a:t>topic modelling, supervised and unsupervised classification, clustering</a:t>
-            </a:r>
-          </a:p>
-          <a:p>
-            <a:pPr lvl="1"/>
-            <a:r>
-              <a:rPr lang="en-GB" sz="1900" dirty="0"/>
-              <a:t>content analysis (looks at word choice – common in social sciences)</a:t>
-            </a:r>
-          </a:p>
-          <a:p>
-            <a:pPr lvl="1"/>
-            <a:r>
-              <a:rPr lang="en-GB" sz="1900" dirty="0"/>
-              <a:t>prediction</a:t>
-            </a:r>
-          </a:p>
-          <a:p>
-            <a:r>
-              <a:rPr lang="en-GB" sz="1900" dirty="0"/>
-              <a:t>visualization</a:t>
-            </a:r>
+              <a:t>https://quanteda.io/</a:t>
+            </a:r>
+            <a:endParaRPr lang="en-GB" dirty="0"/>
+          </a:p>
+          <a:p>
+            <a:r>
+              <a:rPr lang="en-GB" dirty="0">
+                <a:hlinkClick r:id="rId3"/>
+              </a:rPr>
+              <a:t>https://tutorials.quanteda.io/</a:t>
+            </a:r>
+            <a:endParaRPr lang="en-GB" dirty="0"/>
+          </a:p>
+          <a:p>
+            <a:r>
+              <a:rPr lang="en-GB" dirty="0">
+                <a:hlinkClick r:id="rId4"/>
+              </a:rPr>
+              <a:t>https://www.tidytextmining.com/</a:t>
+            </a:r>
+            <a:endParaRPr lang="en-GB" dirty="0"/>
+          </a:p>
+          <a:p>
+            <a:r>
+              <a:rPr lang="en-GB" dirty="0">
+                <a:hlinkClick r:id="rId5"/>
+              </a:rPr>
+              <a:t>https://tm4ss.github.io/docs/index.html</a:t>
+            </a:r>
+            <a:endParaRPr lang="en-GB" dirty="0"/>
+          </a:p>
+          <a:p>
+            <a:endParaRPr lang="en-GB" dirty="0"/>
           </a:p>
         </p:txBody>
       </p:sp>
     </p:spTree>
     <p:extLst>
       <p:ext uri="{BB962C8B-B14F-4D97-AF65-F5344CB8AC3E}">
-        <p14:creationId xmlns:p14="http://schemas.microsoft.com/office/powerpoint/2010/main" val="3552954431"/>
+        <p14:creationId xmlns:p14="http://schemas.microsoft.com/office/powerpoint/2010/main" val="1232995724"/>
       </p:ext>
     </p:extLst>
   </p:cSld>
@@ -11954,6 +12638,378 @@
 </file>
 
 <file path=ppt/slides/slide7.xml><?xml version="1.0" encoding="utf-8"?>
+<p:sld xmlns:a="http://schemas.openxmlformats.org/drawingml/2006/main" xmlns:r="http://schemas.openxmlformats.org/officeDocument/2006/relationships" xmlns:p="http://schemas.openxmlformats.org/presentationml/2006/main">
+  <p:cSld>
+    <p:spTree>
+      <p:nvGrpSpPr>
+        <p:cNvPr id="1" name=""/>
+        <p:cNvGrpSpPr/>
+        <p:nvPr/>
+      </p:nvGrpSpPr>
+      <p:grpSpPr>
+        <a:xfrm>
+          <a:off x="0" y="0"/>
+          <a:ext cx="0" cy="0"/>
+          <a:chOff x="0" y="0"/>
+          <a:chExt cx="0" cy="0"/>
+        </a:xfrm>
+      </p:grpSpPr>
+      <p:sp>
+        <p:nvSpPr>
+          <p:cNvPr id="2" name="Title 1">
+            <a:extLst>
+              <a:ext uri="{FF2B5EF4-FFF2-40B4-BE49-F238E27FC236}">
+                <a16:creationId xmlns:a16="http://schemas.microsoft.com/office/drawing/2014/main" id="{9C263BF9-FD09-4D14-A0AF-00C0ECB87878}"/>
+              </a:ext>
+            </a:extLst>
+          </p:cNvPr>
+          <p:cNvSpPr>
+            <a:spLocks noGrp="1"/>
+          </p:cNvSpPr>
+          <p:nvPr>
+            <p:ph type="title"/>
+          </p:nvPr>
+        </p:nvSpPr>
+        <p:spPr>
+          <a:xfrm>
+            <a:off x="564213" y="392784"/>
+            <a:ext cx="8596668" cy="832701"/>
+          </a:xfrm>
+        </p:spPr>
+        <p:txBody>
+          <a:bodyPr/>
+          <a:lstStyle/>
+          <a:p>
+            <a:r>
+              <a:rPr lang="en-GB" dirty="0"/>
+              <a:t>Regular Expressions (regex)</a:t>
+            </a:r>
+          </a:p>
+        </p:txBody>
+      </p:sp>
+      <p:sp>
+        <p:nvSpPr>
+          <p:cNvPr id="3" name="Content Placeholder 2">
+            <a:extLst>
+              <a:ext uri="{FF2B5EF4-FFF2-40B4-BE49-F238E27FC236}">
+                <a16:creationId xmlns:a16="http://schemas.microsoft.com/office/drawing/2014/main" id="{EB1B84E2-3FD4-4676-964A-3F7C983C533D}"/>
+              </a:ext>
+            </a:extLst>
+          </p:cNvPr>
+          <p:cNvSpPr>
+            <a:spLocks noGrp="1"/>
+          </p:cNvSpPr>
+          <p:nvPr>
+            <p:ph idx="1"/>
+          </p:nvPr>
+        </p:nvSpPr>
+        <p:spPr>
+          <a:xfrm>
+            <a:off x="677334" y="1376313"/>
+            <a:ext cx="8596668" cy="5260157"/>
+          </a:xfrm>
+        </p:spPr>
+        <p:txBody>
+          <a:bodyPr/>
+          <a:lstStyle/>
+          <a:p>
+            <a:r>
+              <a:rPr lang="en-GB" sz="2000" dirty="0"/>
+              <a:t>An expression to identify a text pattern</a:t>
+            </a:r>
+          </a:p>
+          <a:p>
+            <a:r>
+              <a:rPr lang="en-GB" sz="2000" dirty="0"/>
+              <a:t>Used to: search, replace, count, validate, extract</a:t>
+            </a:r>
+          </a:p>
+          <a:p>
+            <a:r>
+              <a:rPr lang="en-GB" sz="2000" dirty="0"/>
+              <a:t>Examples:</a:t>
+            </a:r>
+          </a:p>
+          <a:p>
+            <a:pPr lvl="1"/>
+            <a:r>
+              <a:rPr lang="en-GB" sz="1800" dirty="0"/>
+              <a:t>Expression to search for any occurrence of grey (or </a:t>
+            </a:r>
+            <a:r>
+              <a:rPr lang="en-GB" sz="1800" dirty="0" err="1"/>
+              <a:t>gray</a:t>
+            </a:r>
+            <a:r>
+              <a:rPr lang="en-GB" sz="1800" dirty="0"/>
+              <a:t>): </a:t>
+            </a:r>
+            <a:r>
+              <a:rPr lang="en-GB" sz="1800" dirty="0">
+                <a:latin typeface="Courier New" panose="02070309020205020404" pitchFamily="49" charset="0"/>
+                <a:cs typeface="Courier New" panose="02070309020205020404" pitchFamily="49" charset="0"/>
+              </a:rPr>
+              <a:t>gr[ae]y </a:t>
+            </a:r>
+          </a:p>
+          <a:p>
+            <a:pPr lvl="1"/>
+            <a:r>
+              <a:rPr lang="en-GB" sz="1800" dirty="0">
+                <a:cs typeface="Courier New" panose="02070309020205020404" pitchFamily="49" charset="0"/>
+              </a:rPr>
+              <a:t>Expression for a 10-digit number starting with 1: </a:t>
+            </a:r>
+            <a:r>
+              <a:rPr lang="en-GB" dirty="0">
+                <a:latin typeface="Courier New" panose="02070309020205020404" pitchFamily="49" charset="0"/>
+                <a:cs typeface="Courier New" panose="02070309020205020404" pitchFamily="49" charset="0"/>
+              </a:rPr>
+              <a:t>1\\d{9}</a:t>
+            </a:r>
+            <a:endParaRPr lang="en-GB" sz="1600" dirty="0">
+              <a:latin typeface="Courier New" panose="02070309020205020404" pitchFamily="49" charset="0"/>
+              <a:cs typeface="Courier New" panose="02070309020205020404" pitchFamily="49" charset="0"/>
+            </a:endParaRPr>
+          </a:p>
+          <a:p>
+            <a:pPr lvl="1"/>
+            <a:r>
+              <a:rPr lang="en-GB" sz="1800" dirty="0"/>
+              <a:t>Expression to search for a URL string: </a:t>
+            </a:r>
+            <a:r>
+              <a:rPr lang="en-GB" sz="1600" dirty="0">
+                <a:latin typeface="Courier New" panose="02070309020205020404" pitchFamily="49" charset="0"/>
+                <a:cs typeface="Courier New" panose="02070309020205020404" pitchFamily="49" charset="0"/>
+              </a:rPr>
+              <a:t>http\\S+</a:t>
+            </a:r>
+          </a:p>
+          <a:p>
+            <a:pPr lvl="1"/>
+            <a:r>
+              <a:rPr lang="en-GB" sz="1800" dirty="0"/>
+              <a:t>Expression to search for a valid UK mobile number (with optional +44 national code, allowing for optional brackets and spaces at appropriate positions)</a:t>
+            </a:r>
+          </a:p>
+          <a:p>
+            <a:pPr lvl="2"/>
+            <a:r>
+              <a:rPr lang="en-GB" sz="1600" b="0" i="0" dirty="0">
+                <a:solidFill>
+                  <a:srgbClr val="202124"/>
+                </a:solidFill>
+                <a:effectLst/>
+                <a:latin typeface="Courier New" panose="02070309020205020404" pitchFamily="49" charset="0"/>
+                <a:cs typeface="Courier New" panose="02070309020205020404" pitchFamily="49" charset="0"/>
+              </a:rPr>
+              <a:t>^(\\+44\\s?7\\d{3}|\\(?07\\d{3}\\)?)\\s?\\d{3}\\s?\\d{3}$</a:t>
+            </a:r>
+          </a:p>
+          <a:p>
+            <a:r>
+              <a:rPr lang="en-GB" sz="2000" dirty="0">
+                <a:solidFill>
+                  <a:srgbClr val="202124"/>
+                </a:solidFill>
+                <a:cs typeface="Courier New" panose="02070309020205020404" pitchFamily="49" charset="0"/>
+              </a:rPr>
+              <a:t>Use a regex tester to make sure your regex does what you want it to!</a:t>
+            </a:r>
+          </a:p>
+          <a:p>
+            <a:pPr lvl="1"/>
+            <a:r>
+              <a:rPr lang="en-GB" sz="1800" dirty="0">
+                <a:latin typeface="Courier New" panose="02070309020205020404" pitchFamily="49" charset="0"/>
+                <a:cs typeface="Courier New" panose="02070309020205020404" pitchFamily="49" charset="0"/>
+              </a:rPr>
+              <a:t>regex101.com</a:t>
+            </a:r>
+          </a:p>
+          <a:p>
+            <a:pPr lvl="1"/>
+            <a:r>
+              <a:rPr lang="en-GB" sz="1800" dirty="0">
+                <a:latin typeface="Courier New" panose="02070309020205020404" pitchFamily="49" charset="0"/>
+                <a:cs typeface="Courier New" panose="02070309020205020404" pitchFamily="49" charset="0"/>
+              </a:rPr>
+              <a:t>https://spannbaueradam.shinyapps.io/r_regex_tester/</a:t>
+            </a:r>
+          </a:p>
+          <a:p>
+            <a:pPr lvl="1"/>
+            <a:endParaRPr lang="en-GB" dirty="0"/>
+          </a:p>
+        </p:txBody>
+      </p:sp>
+    </p:spTree>
+    <p:extLst>
+      <p:ext uri="{BB962C8B-B14F-4D97-AF65-F5344CB8AC3E}">
+        <p14:creationId xmlns:p14="http://schemas.microsoft.com/office/powerpoint/2010/main" val="3254603657"/>
+      </p:ext>
+    </p:extLst>
+  </p:cSld>
+  <p:clrMapOvr>
+    <a:masterClrMapping/>
+  </p:clrMapOvr>
+</p:sld>
+</file>
+
+<file path=ppt/slides/slide8.xml><?xml version="1.0" encoding="utf-8"?>
+<p:sld xmlns:a="http://schemas.openxmlformats.org/drawingml/2006/main" xmlns:r="http://schemas.openxmlformats.org/officeDocument/2006/relationships" xmlns:p="http://schemas.openxmlformats.org/presentationml/2006/main">
+  <p:cSld>
+    <p:spTree>
+      <p:nvGrpSpPr>
+        <p:cNvPr id="1" name=""/>
+        <p:cNvGrpSpPr/>
+        <p:nvPr/>
+      </p:nvGrpSpPr>
+      <p:grpSpPr>
+        <a:xfrm>
+          <a:off x="0" y="0"/>
+          <a:ext cx="0" cy="0"/>
+          <a:chOff x="0" y="0"/>
+          <a:chExt cx="0" cy="0"/>
+        </a:xfrm>
+      </p:grpSpPr>
+      <p:sp>
+        <p:nvSpPr>
+          <p:cNvPr id="4" name="Title 1">
+            <a:extLst>
+              <a:ext uri="{FF2B5EF4-FFF2-40B4-BE49-F238E27FC236}">
+                <a16:creationId xmlns:a16="http://schemas.microsoft.com/office/drawing/2014/main" id="{9F544D51-7A30-415A-A0E3-E4948EF7E30E}"/>
+              </a:ext>
+            </a:extLst>
+          </p:cNvPr>
+          <p:cNvSpPr txBox="1">
+            <a:spLocks/>
+          </p:cNvSpPr>
+          <p:nvPr/>
+        </p:nvSpPr>
+        <p:spPr>
+          <a:xfrm>
+            <a:off x="860214" y="2484120"/>
+            <a:ext cx="8596668" cy="1710808"/>
+          </a:xfrm>
+          <a:prstGeom prst="rect">
+            <a:avLst/>
+          </a:prstGeom>
+        </p:spPr>
+        <p:txBody>
+          <a:bodyPr/>
+          <a:lstStyle>
+            <a:lvl1pPr algn="l" defTabSz="457200" rtl="0" eaLnBrk="1" latinLnBrk="0" hangingPunct="1">
+              <a:spcBef>
+                <a:spcPct val="0"/>
+              </a:spcBef>
+              <a:buNone/>
+              <a:defRPr sz="3600" kern="1200">
+                <a:solidFill>
+                  <a:schemeClr val="accent1"/>
+                </a:solidFill>
+                <a:latin typeface="+mj-lt"/>
+                <a:ea typeface="+mj-ea"/>
+                <a:cs typeface="+mj-cs"/>
+              </a:defRPr>
+            </a:lvl1pPr>
+            <a:lvl2pPr eaLnBrk="1" hangingPunct="1">
+              <a:defRPr>
+                <a:solidFill>
+                  <a:schemeClr val="tx2"/>
+                </a:solidFill>
+              </a:defRPr>
+            </a:lvl2pPr>
+            <a:lvl3pPr eaLnBrk="1" hangingPunct="1">
+              <a:defRPr>
+                <a:solidFill>
+                  <a:schemeClr val="tx2"/>
+                </a:solidFill>
+              </a:defRPr>
+            </a:lvl3pPr>
+            <a:lvl4pPr eaLnBrk="1" hangingPunct="1">
+              <a:defRPr>
+                <a:solidFill>
+                  <a:schemeClr val="tx2"/>
+                </a:solidFill>
+              </a:defRPr>
+            </a:lvl4pPr>
+            <a:lvl5pPr eaLnBrk="1" hangingPunct="1">
+              <a:defRPr>
+                <a:solidFill>
+                  <a:schemeClr val="tx2"/>
+                </a:solidFill>
+              </a:defRPr>
+            </a:lvl5pPr>
+            <a:lvl6pPr eaLnBrk="1" hangingPunct="1">
+              <a:defRPr>
+                <a:solidFill>
+                  <a:schemeClr val="tx2"/>
+                </a:solidFill>
+              </a:defRPr>
+            </a:lvl6pPr>
+            <a:lvl7pPr eaLnBrk="1" hangingPunct="1">
+              <a:defRPr>
+                <a:solidFill>
+                  <a:schemeClr val="tx2"/>
+                </a:solidFill>
+              </a:defRPr>
+            </a:lvl7pPr>
+            <a:lvl8pPr eaLnBrk="1" hangingPunct="1">
+              <a:defRPr>
+                <a:solidFill>
+                  <a:schemeClr val="tx2"/>
+                </a:solidFill>
+              </a:defRPr>
+            </a:lvl8pPr>
+            <a:lvl9pPr eaLnBrk="1" hangingPunct="1">
+              <a:defRPr>
+                <a:solidFill>
+                  <a:schemeClr val="tx2"/>
+                </a:solidFill>
+              </a:defRPr>
+            </a:lvl9pPr>
+          </a:lstStyle>
+          <a:p>
+            <a:r>
+              <a:rPr lang="en-GB" dirty="0"/>
+              <a:t>Go to </a:t>
+            </a:r>
+            <a:r>
+              <a:rPr lang="en-GB" dirty="0" err="1"/>
+              <a:t>Rmarkdown</a:t>
+            </a:r>
+            <a:r>
+              <a:rPr lang="en-GB" dirty="0"/>
+              <a:t> tutorial:</a:t>
+            </a:r>
+          </a:p>
+          <a:p>
+            <a:endParaRPr lang="en-GB" dirty="0"/>
+          </a:p>
+          <a:p>
+            <a:r>
+              <a:rPr lang="en-GB" dirty="0"/>
+              <a:t>		pre-process twitter data</a:t>
+            </a:r>
+          </a:p>
+        </p:txBody>
+      </p:sp>
+    </p:spTree>
+    <p:extLst>
+      <p:ext uri="{BB962C8B-B14F-4D97-AF65-F5344CB8AC3E}">
+        <p14:creationId xmlns:p14="http://schemas.microsoft.com/office/powerpoint/2010/main" val="1787949436"/>
+      </p:ext>
+    </p:extLst>
+  </p:cSld>
+  <p:clrMapOvr>
+    <a:masterClrMapping/>
+  </p:clrMapOvr>
+</p:sld>
+</file>
+
+<file path=ppt/slides/slide9.xml><?xml version="1.0" encoding="utf-8"?>
 <p:sld xmlns:a="http://schemas.openxmlformats.org/drawingml/2006/main" xmlns:r="http://schemas.openxmlformats.org/officeDocument/2006/relationships" xmlns:p="http://schemas.openxmlformats.org/presentationml/2006/main">
   <p:cSld>
     <p:spTree>
@@ -12325,576 +13381,6 @@
     <p:extLst>
       <p:ext uri="{BB962C8B-B14F-4D97-AF65-F5344CB8AC3E}">
         <p14:creationId xmlns:p14="http://schemas.microsoft.com/office/powerpoint/2010/main" val="1587474064"/>
-      </p:ext>
-    </p:extLst>
-  </p:cSld>
-  <p:clrMapOvr>
-    <a:masterClrMapping/>
-  </p:clrMapOvr>
-</p:sld>
-</file>
-
-<file path=ppt/slides/slide8.xml><?xml version="1.0" encoding="utf-8"?>
-<p:sld xmlns:a="http://schemas.openxmlformats.org/drawingml/2006/main" xmlns:r="http://schemas.openxmlformats.org/officeDocument/2006/relationships" xmlns:p="http://schemas.openxmlformats.org/presentationml/2006/main">
-  <p:cSld>
-    <p:spTree>
-      <p:nvGrpSpPr>
-        <p:cNvPr id="1" name=""/>
-        <p:cNvGrpSpPr/>
-        <p:nvPr/>
-      </p:nvGrpSpPr>
-      <p:grpSpPr>
-        <a:xfrm>
-          <a:off x="0" y="0"/>
-          <a:ext cx="0" cy="0"/>
-          <a:chOff x="0" y="0"/>
-          <a:chExt cx="0" cy="0"/>
-        </a:xfrm>
-      </p:grpSpPr>
-      <p:sp>
-        <p:nvSpPr>
-          <p:cNvPr id="2" name="Title 1">
-            <a:extLst>
-              <a:ext uri="{FF2B5EF4-FFF2-40B4-BE49-F238E27FC236}">
-                <a16:creationId xmlns:a16="http://schemas.microsoft.com/office/drawing/2014/main" id="{4F266FBD-D6FF-49DB-9211-E4018C3533AD}"/>
-              </a:ext>
-            </a:extLst>
-          </p:cNvPr>
-          <p:cNvSpPr txBox="1">
-            <a:spLocks/>
-          </p:cNvSpPr>
-          <p:nvPr/>
-        </p:nvSpPr>
-        <p:spPr>
-          <a:xfrm>
-            <a:off x="860214" y="2484120"/>
-            <a:ext cx="8596668" cy="1710808"/>
-          </a:xfrm>
-          <a:prstGeom prst="rect">
-            <a:avLst/>
-          </a:prstGeom>
-        </p:spPr>
-        <p:txBody>
-          <a:bodyPr/>
-          <a:lstStyle>
-            <a:lvl1pPr algn="l" defTabSz="457200" rtl="0" eaLnBrk="1" latinLnBrk="0" hangingPunct="1">
-              <a:spcBef>
-                <a:spcPct val="0"/>
-              </a:spcBef>
-              <a:buNone/>
-              <a:defRPr sz="3600" kern="1200">
-                <a:solidFill>
-                  <a:schemeClr val="accent1"/>
-                </a:solidFill>
-                <a:latin typeface="+mj-lt"/>
-                <a:ea typeface="+mj-ea"/>
-                <a:cs typeface="+mj-cs"/>
-              </a:defRPr>
-            </a:lvl1pPr>
-            <a:lvl2pPr eaLnBrk="1" hangingPunct="1">
-              <a:defRPr>
-                <a:solidFill>
-                  <a:schemeClr val="tx2"/>
-                </a:solidFill>
-              </a:defRPr>
-            </a:lvl2pPr>
-            <a:lvl3pPr eaLnBrk="1" hangingPunct="1">
-              <a:defRPr>
-                <a:solidFill>
-                  <a:schemeClr val="tx2"/>
-                </a:solidFill>
-              </a:defRPr>
-            </a:lvl3pPr>
-            <a:lvl4pPr eaLnBrk="1" hangingPunct="1">
-              <a:defRPr>
-                <a:solidFill>
-                  <a:schemeClr val="tx2"/>
-                </a:solidFill>
-              </a:defRPr>
-            </a:lvl4pPr>
-            <a:lvl5pPr eaLnBrk="1" hangingPunct="1">
-              <a:defRPr>
-                <a:solidFill>
-                  <a:schemeClr val="tx2"/>
-                </a:solidFill>
-              </a:defRPr>
-            </a:lvl5pPr>
-            <a:lvl6pPr eaLnBrk="1" hangingPunct="1">
-              <a:defRPr>
-                <a:solidFill>
-                  <a:schemeClr val="tx2"/>
-                </a:solidFill>
-              </a:defRPr>
-            </a:lvl6pPr>
-            <a:lvl7pPr eaLnBrk="1" hangingPunct="1">
-              <a:defRPr>
-                <a:solidFill>
-                  <a:schemeClr val="tx2"/>
-                </a:solidFill>
-              </a:defRPr>
-            </a:lvl7pPr>
-            <a:lvl8pPr eaLnBrk="1" hangingPunct="1">
-              <a:defRPr>
-                <a:solidFill>
-                  <a:schemeClr val="tx2"/>
-                </a:solidFill>
-              </a:defRPr>
-            </a:lvl8pPr>
-            <a:lvl9pPr eaLnBrk="1" hangingPunct="1">
-              <a:defRPr>
-                <a:solidFill>
-                  <a:schemeClr val="tx2"/>
-                </a:solidFill>
-              </a:defRPr>
-            </a:lvl9pPr>
-          </a:lstStyle>
-          <a:p>
-            <a:r>
-              <a:rPr lang="en-GB" dirty="0"/>
-              <a:t>Go to </a:t>
-            </a:r>
-            <a:r>
-              <a:rPr lang="en-GB" dirty="0" err="1"/>
-              <a:t>Rmarkdown</a:t>
-            </a:r>
-            <a:r>
-              <a:rPr lang="en-GB" dirty="0"/>
-              <a:t> tutorial:</a:t>
-            </a:r>
-          </a:p>
-          <a:p>
-            <a:endParaRPr lang="en-GB" dirty="0"/>
-          </a:p>
-          <a:p>
-            <a:r>
-              <a:rPr lang="en-GB" dirty="0"/>
-              <a:t>		Step 2: Build our corpus</a:t>
-            </a:r>
-          </a:p>
-        </p:txBody>
-      </p:sp>
-    </p:spTree>
-    <p:extLst>
-      <p:ext uri="{BB962C8B-B14F-4D97-AF65-F5344CB8AC3E}">
-        <p14:creationId xmlns:p14="http://schemas.microsoft.com/office/powerpoint/2010/main" val="919014314"/>
-      </p:ext>
-    </p:extLst>
-  </p:cSld>
-  <p:clrMapOvr>
-    <a:masterClrMapping/>
-  </p:clrMapOvr>
-</p:sld>
-</file>
-
-<file path=ppt/slides/slide9.xml><?xml version="1.0" encoding="utf-8"?>
-<p:sld xmlns:a="http://schemas.openxmlformats.org/drawingml/2006/main" xmlns:r="http://schemas.openxmlformats.org/officeDocument/2006/relationships" xmlns:p="http://schemas.openxmlformats.org/presentationml/2006/main">
-  <p:cSld>
-    <p:spTree>
-      <p:nvGrpSpPr>
-        <p:cNvPr id="1" name=""/>
-        <p:cNvGrpSpPr/>
-        <p:nvPr/>
-      </p:nvGrpSpPr>
-      <p:grpSpPr>
-        <a:xfrm>
-          <a:off x="0" y="0"/>
-          <a:ext cx="0" cy="0"/>
-          <a:chOff x="0" y="0"/>
-          <a:chExt cx="0" cy="0"/>
-        </a:xfrm>
-      </p:grpSpPr>
-      <p:sp>
-        <p:nvSpPr>
-          <p:cNvPr id="2" name="Title 1">
-            <a:extLst>
-              <a:ext uri="{FF2B5EF4-FFF2-40B4-BE49-F238E27FC236}">
-                <a16:creationId xmlns:a16="http://schemas.microsoft.com/office/drawing/2014/main" id="{34C31A18-DFE4-4878-814C-53AFD57BA8D8}"/>
-              </a:ext>
-            </a:extLst>
-          </p:cNvPr>
-          <p:cNvSpPr>
-            <a:spLocks noGrp="1"/>
-          </p:cNvSpPr>
-          <p:nvPr>
-            <p:ph type="title"/>
-          </p:nvPr>
-        </p:nvSpPr>
-        <p:spPr/>
-        <p:txBody>
-          <a:bodyPr/>
-          <a:lstStyle/>
-          <a:p>
-            <a:r>
-              <a:rPr lang="en-GB" dirty="0"/>
-              <a:t>What is a token /tokenisation?</a:t>
-            </a:r>
-          </a:p>
-        </p:txBody>
-      </p:sp>
-      <p:sp>
-        <p:nvSpPr>
-          <p:cNvPr id="3" name="Content Placeholder 2">
-            <a:extLst>
-              <a:ext uri="{FF2B5EF4-FFF2-40B4-BE49-F238E27FC236}">
-                <a16:creationId xmlns:a16="http://schemas.microsoft.com/office/drawing/2014/main" id="{AC5AC0E2-9AEC-4384-A074-F31E9C926873}"/>
-              </a:ext>
-            </a:extLst>
-          </p:cNvPr>
-          <p:cNvSpPr>
-            <a:spLocks noGrp="1"/>
-          </p:cNvSpPr>
-          <p:nvPr>
-            <p:ph idx="1"/>
-          </p:nvPr>
-        </p:nvSpPr>
-        <p:spPr>
-          <a:xfrm>
-            <a:off x="677334" y="1508289"/>
-            <a:ext cx="8596668" cy="4533073"/>
-          </a:xfrm>
-        </p:spPr>
-        <p:txBody>
-          <a:bodyPr>
-            <a:normAutofit/>
-          </a:bodyPr>
-          <a:lstStyle/>
-          <a:p>
-            <a:r>
-              <a:rPr lang="en-GB" sz="2000" dirty="0"/>
-              <a:t>Tokens are the individual units of meaning</a:t>
-            </a:r>
-          </a:p>
-          <a:p>
-            <a:pPr lvl="1"/>
-            <a:r>
-              <a:rPr lang="en-GB" sz="1800" dirty="0"/>
-              <a:t>Words, numbers, punctuation, phonemes, or even full sentences. </a:t>
-            </a:r>
-          </a:p>
-          <a:p>
-            <a:pPr lvl="1"/>
-            <a:r>
-              <a:rPr lang="en-GB" sz="1800" dirty="0"/>
-              <a:t>Tokenization is the process of breaking text documents apart into those pieces </a:t>
-            </a:r>
-          </a:p>
-          <a:p>
-            <a:r>
-              <a:rPr lang="en-GB" sz="2000" b="1" i="1" dirty="0" err="1"/>
-              <a:t>quanteda:tokens</a:t>
-            </a:r>
-            <a:r>
-              <a:rPr lang="en-GB" sz="2000" b="1" i="1" dirty="0"/>
-              <a:t>()</a:t>
-            </a:r>
-          </a:p>
-          <a:p>
-            <a:pPr lvl="1"/>
-            <a:r>
-              <a:rPr lang="en-GB" sz="1800" dirty="0"/>
-              <a:t>segments texts in a corpus into tokens by boundaries (separators)</a:t>
-            </a:r>
-          </a:p>
-          <a:p>
-            <a:pPr lvl="1"/>
-            <a:r>
-              <a:rPr lang="en-GB" sz="1800" dirty="0"/>
-              <a:t>Stored in a list of vectors</a:t>
-            </a:r>
-          </a:p>
-          <a:p>
-            <a:pPr lvl="1"/>
-            <a:r>
-              <a:rPr lang="en-GB" sz="1800" dirty="0"/>
-              <a:t>More efficient than character strings, preserves positions of words</a:t>
-            </a:r>
-          </a:p>
-          <a:p>
-            <a:pPr lvl="1"/>
-            <a:endParaRPr lang="en-GB" sz="1800" dirty="0"/>
-          </a:p>
-          <a:p>
-            <a:pPr lvl="1"/>
-            <a:endParaRPr lang="en-GB" dirty="0"/>
-          </a:p>
-        </p:txBody>
-      </p:sp>
-      <p:sp>
-        <p:nvSpPr>
-          <p:cNvPr id="5" name="Oval 4">
-            <a:extLst>
-              <a:ext uri="{FF2B5EF4-FFF2-40B4-BE49-F238E27FC236}">
-                <a16:creationId xmlns:a16="http://schemas.microsoft.com/office/drawing/2014/main" id="{BFD45A6E-1D50-4240-89A7-9D40642CC831}"/>
-              </a:ext>
-            </a:extLst>
-          </p:cNvPr>
-          <p:cNvSpPr/>
-          <p:nvPr/>
-        </p:nvSpPr>
-        <p:spPr>
-          <a:xfrm>
-            <a:off x="10279755" y="4019682"/>
-            <a:ext cx="1234911" cy="690880"/>
-          </a:xfrm>
-          <a:prstGeom prst="ellipse">
-            <a:avLst/>
-          </a:prstGeom>
-          <a:noFill/>
-          <a:ln w="41275"/>
-        </p:spPr>
-        <p:style>
-          <a:lnRef idx="2">
-            <a:schemeClr val="accent1">
-              <a:shade val="50000"/>
-            </a:schemeClr>
-          </a:lnRef>
-          <a:fillRef idx="1">
-            <a:schemeClr val="accent1"/>
-          </a:fillRef>
-          <a:effectRef idx="0">
-            <a:schemeClr val="accent1"/>
-          </a:effectRef>
-          <a:fontRef idx="minor">
-            <a:schemeClr val="lt1"/>
-          </a:fontRef>
-        </p:style>
-        <p:txBody>
-          <a:bodyPr rtlCol="0" anchor="ctr"/>
-          <a:lstStyle/>
-          <a:p>
-            <a:pPr algn="ctr"/>
-            <a:endParaRPr lang="en-GB"/>
-          </a:p>
-        </p:txBody>
-      </p:sp>
-      <p:grpSp>
-        <p:nvGrpSpPr>
-          <p:cNvPr id="10" name="Group 9">
-            <a:extLst>
-              <a:ext uri="{FF2B5EF4-FFF2-40B4-BE49-F238E27FC236}">
-                <a16:creationId xmlns:a16="http://schemas.microsoft.com/office/drawing/2014/main" id="{CD593CDE-B7BE-4848-9D26-534C2A77F906}"/>
-              </a:ext>
-            </a:extLst>
-          </p:cNvPr>
-          <p:cNvGrpSpPr/>
-          <p:nvPr/>
-        </p:nvGrpSpPr>
-        <p:grpSpPr>
-          <a:xfrm>
-            <a:off x="8473440" y="3555311"/>
-            <a:ext cx="3549649" cy="3062342"/>
-            <a:chOff x="8473440" y="3555311"/>
-            <a:chExt cx="3549649" cy="3062342"/>
-          </a:xfrm>
-        </p:grpSpPr>
-        <p:grpSp>
-          <p:nvGrpSpPr>
-            <p:cNvPr id="8" name="Group 7">
-              <a:extLst>
-                <a:ext uri="{FF2B5EF4-FFF2-40B4-BE49-F238E27FC236}">
-                  <a16:creationId xmlns:a16="http://schemas.microsoft.com/office/drawing/2014/main" id="{BD6E3E31-97AA-408C-8487-E3F86BD8CD68}"/>
-                </a:ext>
-              </a:extLst>
-            </p:cNvPr>
-            <p:cNvGrpSpPr/>
-            <p:nvPr/>
-          </p:nvGrpSpPr>
-          <p:grpSpPr>
-            <a:xfrm>
-              <a:off x="8473440" y="3555311"/>
-              <a:ext cx="3549649" cy="3062342"/>
-              <a:chOff x="8473440" y="3555311"/>
-              <a:chExt cx="3549649" cy="3062342"/>
-            </a:xfrm>
-          </p:grpSpPr>
-          <p:pic>
-            <p:nvPicPr>
-              <p:cNvPr id="4" name="Picture 3">
-                <a:extLst>
-                  <a:ext uri="{FF2B5EF4-FFF2-40B4-BE49-F238E27FC236}">
-                    <a16:creationId xmlns:a16="http://schemas.microsoft.com/office/drawing/2014/main" id="{D69F473C-1362-4410-85C6-E3743F50CFE2}"/>
-                  </a:ext>
-                </a:extLst>
-              </p:cNvPr>
-              <p:cNvPicPr>
-                <a:picLocks noChangeAspect="1"/>
-              </p:cNvPicPr>
-              <p:nvPr/>
-            </p:nvPicPr>
-            <p:blipFill>
-              <a:blip r:embed="rId2"/>
-              <a:stretch>
-                <a:fillRect/>
-              </a:stretch>
-            </p:blipFill>
-            <p:spPr>
-              <a:xfrm>
-                <a:off x="8473440" y="3555311"/>
-                <a:ext cx="3549649" cy="3062342"/>
-              </a:xfrm>
-              <a:prstGeom prst="rect">
-                <a:avLst/>
-              </a:prstGeom>
-            </p:spPr>
-          </p:pic>
-          <p:sp>
-            <p:nvSpPr>
-              <p:cNvPr id="6" name="Rectangle 5">
-                <a:extLst>
-                  <a:ext uri="{FF2B5EF4-FFF2-40B4-BE49-F238E27FC236}">
-                    <a16:creationId xmlns:a16="http://schemas.microsoft.com/office/drawing/2014/main" id="{FBFC9AFE-45E0-4BF9-A8A0-68502564733B}"/>
-                  </a:ext>
-                </a:extLst>
-              </p:cNvPr>
-              <p:cNvSpPr/>
-              <p:nvPr/>
-            </p:nvSpPr>
-            <p:spPr>
-              <a:xfrm>
-                <a:off x="8473440" y="4876800"/>
-                <a:ext cx="1473200" cy="1239520"/>
-              </a:xfrm>
-              <a:prstGeom prst="rect">
-                <a:avLst/>
-              </a:prstGeom>
-              <a:solidFill>
-                <a:schemeClr val="bg1"/>
-              </a:solidFill>
-              <a:ln>
-                <a:noFill/>
-              </a:ln>
-            </p:spPr>
-            <p:style>
-              <a:lnRef idx="2">
-                <a:schemeClr val="accent1">
-                  <a:shade val="50000"/>
-                </a:schemeClr>
-              </a:lnRef>
-              <a:fillRef idx="1">
-                <a:schemeClr val="accent1"/>
-              </a:fillRef>
-              <a:effectRef idx="0">
-                <a:schemeClr val="accent1"/>
-              </a:effectRef>
-              <a:fontRef idx="minor">
-                <a:schemeClr val="lt1"/>
-              </a:fontRef>
-            </p:style>
-            <p:txBody>
-              <a:bodyPr rtlCol="0" anchor="ctr"/>
-              <a:lstStyle/>
-              <a:p>
-                <a:pPr algn="ctr"/>
-                <a:endParaRPr lang="en-GB"/>
-              </a:p>
-            </p:txBody>
-          </p:sp>
-          <p:sp>
-            <p:nvSpPr>
-              <p:cNvPr id="7" name="Rectangle 6">
-                <a:extLst>
-                  <a:ext uri="{FF2B5EF4-FFF2-40B4-BE49-F238E27FC236}">
-                    <a16:creationId xmlns:a16="http://schemas.microsoft.com/office/drawing/2014/main" id="{8718CEDE-129E-45E1-9655-764FA5ACEF0E}"/>
-                  </a:ext>
-                </a:extLst>
-              </p:cNvPr>
-              <p:cNvSpPr/>
-              <p:nvPr/>
-            </p:nvSpPr>
-            <p:spPr>
-              <a:xfrm>
-                <a:off x="9743440" y="5476240"/>
-                <a:ext cx="721360" cy="565122"/>
-              </a:xfrm>
-              <a:prstGeom prst="rect">
-                <a:avLst/>
-              </a:prstGeom>
-              <a:solidFill>
-                <a:schemeClr val="bg1"/>
-              </a:solidFill>
-              <a:ln>
-                <a:noFill/>
-              </a:ln>
-            </p:spPr>
-            <p:style>
-              <a:lnRef idx="2">
-                <a:schemeClr val="accent1">
-                  <a:shade val="50000"/>
-                </a:schemeClr>
-              </a:lnRef>
-              <a:fillRef idx="1">
-                <a:schemeClr val="accent1"/>
-              </a:fillRef>
-              <a:effectRef idx="0">
-                <a:schemeClr val="accent1"/>
-              </a:effectRef>
-              <a:fontRef idx="minor">
-                <a:schemeClr val="lt1"/>
-              </a:fontRef>
-            </p:style>
-            <p:txBody>
-              <a:bodyPr rtlCol="0" anchor="ctr"/>
-              <a:lstStyle/>
-              <a:p>
-                <a:pPr algn="ctr"/>
-                <a:endParaRPr lang="en-GB"/>
-              </a:p>
-            </p:txBody>
-          </p:sp>
-        </p:grpSp>
-        <p:sp>
-          <p:nvSpPr>
-            <p:cNvPr id="9" name="Oval 8">
-              <a:extLst>
-                <a:ext uri="{FF2B5EF4-FFF2-40B4-BE49-F238E27FC236}">
-                  <a16:creationId xmlns:a16="http://schemas.microsoft.com/office/drawing/2014/main" id="{279ED239-9122-470A-B0C9-8F1D7E13B31B}"/>
-                </a:ext>
-              </a:extLst>
-            </p:cNvPr>
-            <p:cNvSpPr/>
-            <p:nvPr/>
-          </p:nvSpPr>
-          <p:spPr>
-            <a:xfrm>
-              <a:off x="9652000" y="4765200"/>
-              <a:ext cx="1107440" cy="656402"/>
-            </a:xfrm>
-            <a:prstGeom prst="ellipse">
-              <a:avLst/>
-            </a:prstGeom>
-            <a:noFill/>
-            <a:ln w="31750"/>
-          </p:spPr>
-          <p:style>
-            <a:lnRef idx="2">
-              <a:schemeClr val="accent1">
-                <a:shade val="50000"/>
-              </a:schemeClr>
-            </a:lnRef>
-            <a:fillRef idx="1">
-              <a:schemeClr val="accent1"/>
-            </a:fillRef>
-            <a:effectRef idx="0">
-              <a:schemeClr val="accent1"/>
-            </a:effectRef>
-            <a:fontRef idx="minor">
-              <a:schemeClr val="lt1"/>
-            </a:fontRef>
-          </p:style>
-          <p:txBody>
-            <a:bodyPr rtlCol="0" anchor="ctr"/>
-            <a:lstStyle/>
-            <a:p>
-              <a:pPr algn="ctr"/>
-              <a:endParaRPr lang="en-GB"/>
-            </a:p>
-          </p:txBody>
-        </p:sp>
-      </p:grpSp>
-    </p:spTree>
-    <p:extLst>
-      <p:ext uri="{BB962C8B-B14F-4D97-AF65-F5344CB8AC3E}">
-        <p14:creationId xmlns:p14="http://schemas.microsoft.com/office/powerpoint/2010/main" val="1635539682"/>
       </p:ext>
     </p:extLst>
   </p:cSld>

</xml_diff>